<commit_message>
Agregada la grafica de calificaciones
</commit_message>
<xml_diff>
--- a/CSOF5101 Ingeniera de Software/TSP/0330PostMortemTSPCiclo3.pptx
+++ b/CSOF5101 Ingeniera de Software/TSP/0330PostMortemTSPCiclo3.pptx
@@ -197,22 +197,22 @@
                   <c:v>0</c:v>
                 </c:pt>
                 <c:pt idx="1">
-                  <c:v>7.7235772357723706E-2</c:v>
+                  <c:v>7.723577235772372E-2</c:v>
                 </c:pt>
                 <c:pt idx="2">
-                  <c:v>7.7235772357723706E-2</c:v>
+                  <c:v>7.723577235772372E-2</c:v>
                 </c:pt>
                 <c:pt idx="3">
-                  <c:v>0.20121951219512232</c:v>
+                  <c:v>0.20121951219512238</c:v>
                 </c:pt>
                 <c:pt idx="4">
-                  <c:v>0.25813008130081344</c:v>
+                  <c:v>0.2581300813008135</c:v>
                 </c:pt>
                 <c:pt idx="5">
-                  <c:v>0.27032520325203307</c:v>
+                  <c:v>0.27032520325203313</c:v>
                 </c:pt>
                 <c:pt idx="6">
-                  <c:v>0.28861788617886242</c:v>
+                  <c:v>0.28861788617886247</c:v>
                 </c:pt>
               </c:numCache>
             </c:numRef>
@@ -234,10 +234,10 @@
                   <c:v>0</c:v>
                 </c:pt>
                 <c:pt idx="1">
-                  <c:v>2.8455284552845562E-2</c:v>
+                  <c:v>2.8455284552845565E-2</c:v>
                 </c:pt>
                 <c:pt idx="2">
-                  <c:v>2.8455284552845562E-2</c:v>
+                  <c:v>2.8455284552845565E-2</c:v>
                 </c:pt>
                 <c:pt idx="3">
                   <c:v>0.15853658536585374</c:v>
@@ -249,18 +249,18 @@
                   <c:v>0.241869918699187</c:v>
                 </c:pt>
                 <c:pt idx="6">
-                  <c:v>0.28861788617886236</c:v>
+                  <c:v>0.28861788617886242</c:v>
                 </c:pt>
               </c:numCache>
             </c:numRef>
           </c:val>
         </c:ser>
         <c:marker val="1"/>
-        <c:axId val="76156288"/>
-        <c:axId val="76252288"/>
+        <c:axId val="64968960"/>
+        <c:axId val="64995328"/>
       </c:lineChart>
       <c:catAx>
-        <c:axId val="76156288"/>
+        <c:axId val="64968960"/>
         <c:scaling>
           <c:orientation val="minMax"/>
         </c:scaling>
@@ -277,14 +277,14 @@
             <a:endParaRPr lang="es-CO"/>
           </a:p>
         </c:txPr>
-        <c:crossAx val="76252288"/>
+        <c:crossAx val="64995328"/>
         <c:crosses val="autoZero"/>
         <c:auto val="1"/>
         <c:lblAlgn val="ctr"/>
         <c:lblOffset val="100"/>
       </c:catAx>
       <c:valAx>
-        <c:axId val="76252288"/>
+        <c:axId val="64995328"/>
         <c:scaling>
           <c:orientation val="minMax"/>
         </c:scaling>
@@ -321,7 +321,7 @@
             <a:endParaRPr lang="es-CO"/>
           </a:p>
         </c:txPr>
-        <c:crossAx val="76156288"/>
+        <c:crossAx val="64968960"/>
         <c:crosses val="autoZero"/>
         <c:crossBetween val="between"/>
       </c:valAx>
@@ -350,7 +350,6 @@
 
 <file path=ppt/charts/chart2.xml><?xml version="1.0" encoding="utf-8"?>
 <c:chartSpace xmlns:c="http://schemas.openxmlformats.org/drawingml/2006/chart" xmlns:a="http://schemas.openxmlformats.org/drawingml/2006/main" xmlns:r="http://schemas.openxmlformats.org/officeDocument/2006/relationships">
-  <c:date1904 val="1"/>
   <c:lang val="es-CO"/>
   <c:style val="34"/>
   <c:chart>
@@ -361,7 +360,7 @@
           <a:lstStyle/>
           <a:p>
             <a:pPr>
-              <a:defRPr lang="en-US" sz="1100"/>
+              <a:defRPr sz="1100"/>
             </a:pPr>
             <a:r>
               <a:rPr lang="es-CO" sz="1100"/>
@@ -424,19 +423,19 @@
                 <c:formatCode>0.00</c:formatCode>
                 <c:ptCount val="6"/>
                 <c:pt idx="0">
-                  <c:v>4.5999999999999996</c:v>
+                  <c:v>4.4000000000000004</c:v>
                 </c:pt>
                 <c:pt idx="1">
                   <c:v>4.2</c:v>
                 </c:pt>
                 <c:pt idx="2">
-                  <c:v>4.5</c:v>
+                  <c:v>4.5999999999999996</c:v>
                 </c:pt>
                 <c:pt idx="3">
-                  <c:v>4</c:v>
+                  <c:v>4.2</c:v>
                 </c:pt>
                 <c:pt idx="4">
-                  <c:v>5</c:v>
+                  <c:v>4.8</c:v>
                 </c:pt>
                 <c:pt idx="5">
                   <c:v>5</c:v>
@@ -495,13 +494,13 @@
                   <c:v>4.8</c:v>
                 </c:pt>
                 <c:pt idx="1">
-                  <c:v>4.5999999999999996</c:v>
+                  <c:v>5</c:v>
                 </c:pt>
                 <c:pt idx="2">
-                  <c:v>5</c:v>
+                  <c:v>4.8</c:v>
                 </c:pt>
                 <c:pt idx="3">
-                  <c:v>4.8</c:v>
+                  <c:v>4.5999999999999996</c:v>
                 </c:pt>
                 <c:pt idx="4">
                   <c:v>5</c:v>
@@ -563,16 +562,16 @@
                   <c:v>4.8</c:v>
                 </c:pt>
                 <c:pt idx="1">
-                  <c:v>4.5999999999999996</c:v>
+                  <c:v>4.8</c:v>
                 </c:pt>
                 <c:pt idx="2">
-                  <c:v>4.5</c:v>
+                  <c:v>4.8</c:v>
                 </c:pt>
                 <c:pt idx="3">
-                  <c:v>4.5999999999999996</c:v>
+                  <c:v>4.8</c:v>
                 </c:pt>
                 <c:pt idx="4">
-                  <c:v>4.5999999999999996</c:v>
+                  <c:v>5</c:v>
                 </c:pt>
                 <c:pt idx="5">
                   <c:v>5</c:v>
@@ -628,19 +627,19 @@
                 <c:formatCode>0.00</c:formatCode>
                 <c:ptCount val="6"/>
                 <c:pt idx="0">
-                  <c:v>4.4000000000000004</c:v>
+                  <c:v>4.5999999999999996</c:v>
                 </c:pt>
                 <c:pt idx="1">
-                  <c:v>4.2</c:v>
+                  <c:v>4.8</c:v>
                 </c:pt>
                 <c:pt idx="2">
-                  <c:v>4</c:v>
+                  <c:v>4.8</c:v>
                 </c:pt>
                 <c:pt idx="3">
-                  <c:v>4.2</c:v>
+                  <c:v>4.8</c:v>
                 </c:pt>
                 <c:pt idx="4">
-                  <c:v>4.8</c:v>
+                  <c:v>4.5999999999999996</c:v>
                 </c:pt>
                 <c:pt idx="5">
                   <c:v>4.8</c:v>
@@ -649,11 +648,11 @@
             </c:numRef>
           </c:val>
         </c:ser>
-        <c:axId val="76285056"/>
-        <c:axId val="76286976"/>
+        <c:axId val="77922688"/>
+        <c:axId val="78359168"/>
       </c:barChart>
       <c:catAx>
-        <c:axId val="76285056"/>
+        <c:axId val="77922688"/>
         <c:scaling>
           <c:orientation val="minMax"/>
         </c:scaling>
@@ -665,7 +664,7 @@
               <a:lstStyle/>
               <a:p>
                 <a:pPr>
-                  <a:defRPr lang="en-US"/>
+                  <a:defRPr/>
                 </a:pPr>
                 <a:r>
                   <a:rPr lang="es-CO"/>
@@ -678,24 +677,14 @@
         </c:title>
         <c:numFmt formatCode="General" sourceLinked="1"/>
         <c:tickLblPos val="nextTo"/>
-        <c:txPr>
-          <a:bodyPr/>
-          <a:lstStyle/>
-          <a:p>
-            <a:pPr>
-              <a:defRPr lang="en-US"/>
-            </a:pPr>
-            <a:endParaRPr lang="es-CO"/>
-          </a:p>
-        </c:txPr>
-        <c:crossAx val="76286976"/>
+        <c:crossAx val="78359168"/>
         <c:crosses val="autoZero"/>
         <c:auto val="1"/>
         <c:lblAlgn val="ctr"/>
         <c:lblOffset val="100"/>
       </c:catAx>
       <c:valAx>
-        <c:axId val="76286976"/>
+        <c:axId val="78359168"/>
         <c:scaling>
           <c:orientation val="minMax"/>
           <c:max val="5"/>
@@ -710,7 +699,7 @@
               <a:lstStyle/>
               <a:p>
                 <a:pPr>
-                  <a:defRPr lang="en-US"/>
+                  <a:defRPr/>
                 </a:pPr>
                 <a:r>
                   <a:rPr lang="es-CO"/>
@@ -723,17 +712,7 @@
         </c:title>
         <c:numFmt formatCode="0.00" sourceLinked="1"/>
         <c:tickLblPos val="nextTo"/>
-        <c:txPr>
-          <a:bodyPr/>
-          <a:lstStyle/>
-          <a:p>
-            <a:pPr>
-              <a:defRPr lang="en-US"/>
-            </a:pPr>
-            <a:endParaRPr lang="es-CO"/>
-          </a:p>
-        </c:txPr>
-        <c:crossAx val="76285056"/>
+        <c:crossAx val="77922688"/>
         <c:crosses val="autoZero"/>
         <c:crossBetween val="between"/>
       </c:valAx>
@@ -741,16 +720,6 @@
     <c:legend>
       <c:legendPos val="r"/>
       <c:layout/>
-      <c:txPr>
-        <a:bodyPr/>
-        <a:lstStyle/>
-        <a:p>
-          <a:pPr>
-            <a:defRPr lang="en-US"/>
-          </a:pPr>
-          <a:endParaRPr lang="es-CO"/>
-        </a:p>
-      </c:txPr>
     </c:legend>
     <c:plotVisOnly val="1"/>
   </c:chart>
@@ -2010,7 +1979,7 @@
   <dgm:whole/>
   <dgm:extLst>
     <a:ext uri="http://schemas.microsoft.com/office/drawing/2008/diagram">
-      <dsp:dataModelExt xmlns:dsp="http://schemas.microsoft.com/office/drawing/2008/diagram" xmlns="" relId="rId6" minVer="http://schemas.openxmlformats.org/drawingml/2006/diagram"/>
+      <dsp:dataModelExt xmlns="" xmlns:dsp="http://schemas.microsoft.com/office/drawing/2008/diagram" relId="rId6" minVer="http://schemas.openxmlformats.org/drawingml/2006/diagram"/>
     </a:ext>
   </dgm:extLst>
 </dgm:dataModel>
@@ -8119,7 +8088,14 @@
                 </a:solidFill>
                 <a:latin typeface="Calibri"/>
               </a:rPr>
-              <a:t> Producir un producto dentro del tiempo </a:t>
+              <a:t> Producir un producto dentro del tiempo establecido</a:t>
+            </a:r>
+            <a:endParaRPr lang="es-CO" sz="1200" dirty="0" smtClean="0"/>
+          </a:p>
+          <a:p>
+            <a:r>
+              <a:rPr lang="es-CO" sz="1200" dirty="0" smtClean="0"/>
+              <a:t>	M1: </a:t>
             </a:r>
             <a:r>
               <a:rPr lang="es-CO" sz="1200" dirty="0" smtClean="0">
@@ -8128,14 +8104,14 @@
                 </a:solidFill>
                 <a:latin typeface="Calibri"/>
               </a:rPr>
-              <a:t>establecido</a:t>
+              <a:t>Implementar el 100% de los requerimientos</a:t>
             </a:r>
             <a:endParaRPr lang="es-CO" sz="1200" dirty="0" smtClean="0"/>
           </a:p>
           <a:p>
             <a:r>
               <a:rPr lang="es-CO" sz="1200" dirty="0" smtClean="0"/>
-              <a:t>	M1: </a:t>
+              <a:t>Obj2. </a:t>
             </a:r>
             <a:r>
               <a:rPr lang="es-CO" sz="1200" dirty="0" smtClean="0">
@@ -8144,7 +8120,14 @@
                 </a:solidFill>
                 <a:latin typeface="Calibri"/>
               </a:rPr>
-              <a:t>Implementar el 100% de los </a:t>
+              <a:t>Estimar de una manera acertada.</a:t>
+            </a:r>
+            <a:endParaRPr lang="es-CO" sz="1200" dirty="0" smtClean="0"/>
+          </a:p>
+          <a:p>
+            <a:r>
+              <a:rPr lang="es-CO" sz="1200" dirty="0" smtClean="0"/>
+              <a:t>	M1: </a:t>
             </a:r>
             <a:r>
               <a:rPr lang="es-CO" sz="1200" dirty="0" smtClean="0">
@@ -8153,61 +8136,7 @@
                 </a:solidFill>
                 <a:latin typeface="Calibri"/>
               </a:rPr>
-              <a:t>requerimientos</a:t>
-            </a:r>
-            <a:endParaRPr lang="es-CO" sz="1200" dirty="0" smtClean="0"/>
-          </a:p>
-          <a:p>
-            <a:r>
-              <a:rPr lang="es-CO" sz="1200" dirty="0" smtClean="0"/>
-              <a:t>Obj2</a:t>
-            </a:r>
-            <a:r>
-              <a:rPr lang="es-CO" sz="1200" dirty="0" smtClean="0"/>
-              <a:t>. </a:t>
-            </a:r>
-            <a:r>
-              <a:rPr lang="es-CO" sz="1200" dirty="0" smtClean="0">
-                <a:solidFill>
-                  <a:srgbClr val="000000"/>
-                </a:solidFill>
-                <a:latin typeface="Calibri"/>
-              </a:rPr>
-              <a:t>Estimar de una manera acertada</a:t>
-            </a:r>
-            <a:r>
-              <a:rPr lang="es-CO" sz="1200" dirty="0" smtClean="0">
-                <a:solidFill>
-                  <a:srgbClr val="000000"/>
-                </a:solidFill>
-                <a:latin typeface="Calibri"/>
-              </a:rPr>
-              <a:t>.</a:t>
-            </a:r>
-            <a:endParaRPr lang="es-CO" sz="1200" dirty="0" smtClean="0"/>
-          </a:p>
-          <a:p>
-            <a:r>
-              <a:rPr lang="es-CO" sz="1200" dirty="0" smtClean="0"/>
-              <a:t>	M1: </a:t>
-            </a:r>
-            <a:r>
-              <a:rPr lang="es-CO" sz="1200" dirty="0" smtClean="0">
-                <a:solidFill>
-                  <a:srgbClr val="000000"/>
-                </a:solidFill>
-                <a:latin typeface="Calibri"/>
-              </a:rPr>
-              <a:t>Tener una estimación que no supere el 20% de </a:t>
-            </a:r>
-            <a:r>
-              <a:rPr lang="es-CO" sz="1200" dirty="0" smtClean="0">
-                <a:solidFill>
-                  <a:srgbClr val="000000"/>
-                </a:solidFill>
-                <a:latin typeface="Calibri"/>
-              </a:rPr>
-              <a:t>desfase]</a:t>
+              <a:t>Tener una estimación que no supere el 20% de desfase]</a:t>
             </a:r>
             <a:endParaRPr lang="es-CO" sz="1200" dirty="0" smtClean="0"/>
           </a:p>
@@ -8228,7 +8157,13 @@
                 </a:solidFill>
                 <a:latin typeface="Calibri"/>
               </a:rPr>
-              <a:t> 3. Asignar </a:t>
+              <a:t> 3. Asignar labores de desarrollo de una manera equitativa</a:t>
+            </a:r>
+          </a:p>
+          <a:p>
+            <a:r>
+              <a:rPr lang="es-CO" sz="1200" dirty="0" smtClean="0"/>
+              <a:t>	M1: </a:t>
             </a:r>
             <a:r>
               <a:rPr lang="es-CO" sz="1200" dirty="0" smtClean="0">
@@ -8237,7 +8172,30 @@
                 </a:solidFill>
                 <a:latin typeface="Calibri"/>
               </a:rPr>
-              <a:t>labores de desarrollo de una manera </a:t>
+              <a:t>Cada integrante debería realizar 155,6 con un 20% de margen de error. [124,48 - 186,72]</a:t>
+            </a:r>
+          </a:p>
+          <a:p>
+            <a:endParaRPr lang="en-US" sz="1200" dirty="0" smtClean="0"/>
+          </a:p>
+          <a:p>
+            <a:r>
+              <a:rPr lang="es-CO" sz="1200" b="1" dirty="0" smtClean="0"/>
+              <a:t> </a:t>
+            </a:r>
+            <a:endParaRPr lang="en-US" sz="1200" dirty="0" smtClean="0"/>
+          </a:p>
+          <a:p>
+            <a:pPr lvl="0"/>
+            <a:r>
+              <a:rPr lang="es-CO" sz="1200" b="1" dirty="0" smtClean="0"/>
+              <a:t>Cumplimiento de los objetivos durante el ciclo: </a:t>
+            </a:r>
+          </a:p>
+          <a:p>
+            <a:r>
+              <a:rPr lang="es-CO" sz="1200" dirty="0" smtClean="0"/>
+              <a:t>Obj1: </a:t>
             </a:r>
             <a:r>
               <a:rPr lang="es-CO" sz="1200" dirty="0" smtClean="0">
@@ -8246,13 +8204,17 @@
                 </a:solidFill>
                 <a:latin typeface="Calibri"/>
               </a:rPr>
-              <a:t>equitativa</a:t>
-            </a:r>
+              <a:t>Objetivo Cumplido. 100% de los requerimientos implementados</a:t>
+            </a:r>
+          </a:p>
+          <a:p>
+            <a:pPr lvl="0"/>
+            <a:endParaRPr lang="es-CO" sz="1200" dirty="0" smtClean="0"/>
           </a:p>
           <a:p>
             <a:r>
               <a:rPr lang="es-CO" sz="1200" dirty="0" smtClean="0"/>
-              <a:t>	M1: </a:t>
+              <a:t>Obj2: 	</a:t>
             </a:r>
             <a:r>
               <a:rPr lang="es-CO" sz="1200" dirty="0" smtClean="0">
@@ -8261,95 +8223,7 @@
                 </a:solidFill>
                 <a:latin typeface="Calibri"/>
               </a:rPr>
-              <a:t>Cada integrante debería realizar 155,6 con un 20% de margen de error. [124,48 - 186,72</a:t>
-            </a:r>
-            <a:r>
-              <a:rPr lang="es-CO" sz="1200" dirty="0" smtClean="0">
-                <a:solidFill>
-                  <a:srgbClr val="000000"/>
-                </a:solidFill>
-                <a:latin typeface="Calibri"/>
-              </a:rPr>
-              <a:t>]</a:t>
-            </a:r>
-            <a:endParaRPr lang="es-CO" sz="1200" dirty="0" smtClean="0">
-              <a:solidFill>
-                <a:srgbClr val="000000"/>
-              </a:solidFill>
-              <a:latin typeface="Calibri"/>
-            </a:endParaRPr>
-          </a:p>
-          <a:p>
-            <a:endParaRPr lang="en-US" sz="1200" dirty="0" smtClean="0"/>
-          </a:p>
-          <a:p>
-            <a:r>
-              <a:rPr lang="es-CO" sz="1200" b="1" dirty="0" smtClean="0"/>
-              <a:t> </a:t>
-            </a:r>
-            <a:endParaRPr lang="en-US" sz="1200" dirty="0" smtClean="0"/>
-          </a:p>
-          <a:p>
-            <a:pPr lvl="0"/>
-            <a:r>
-              <a:rPr lang="es-CO" sz="1200" b="1" dirty="0" smtClean="0"/>
-              <a:t>Cumplimiento de los objetivos durante el ciclo: </a:t>
-            </a:r>
-          </a:p>
-          <a:p>
-            <a:r>
-              <a:rPr lang="es-CO" sz="1200" dirty="0" smtClean="0"/>
-              <a:t>Obj1: </a:t>
-            </a:r>
-            <a:r>
-              <a:rPr lang="es-CO" sz="1200" dirty="0" smtClean="0">
-                <a:solidFill>
-                  <a:srgbClr val="000000"/>
-                </a:solidFill>
-                <a:latin typeface="Calibri"/>
-              </a:rPr>
-              <a:t>Objetivo </a:t>
-            </a:r>
-            <a:r>
-              <a:rPr lang="es-CO" sz="1200" dirty="0" smtClean="0">
-                <a:solidFill>
-                  <a:srgbClr val="000000"/>
-                </a:solidFill>
-                <a:latin typeface="Calibri"/>
-              </a:rPr>
-              <a:t>Cumplido. 100% de los requerimientos implementados</a:t>
-            </a:r>
-          </a:p>
-          <a:p>
-            <a:pPr lvl="0"/>
-            <a:endParaRPr lang="es-CO" sz="1200" dirty="0" smtClean="0"/>
-          </a:p>
-          <a:p>
-            <a:r>
-              <a:rPr lang="es-CO" sz="1200" dirty="0" smtClean="0"/>
-              <a:t>Obj2: </a:t>
-            </a:r>
-            <a:r>
-              <a:rPr lang="es-CO" sz="1200" dirty="0" smtClean="0"/>
-              <a:t>	</a:t>
-            </a:r>
-            <a:r>
-              <a:rPr lang="es-CO" sz="1200" dirty="0" smtClean="0">
-                <a:solidFill>
-                  <a:srgbClr val="000000"/>
-                </a:solidFill>
-                <a:latin typeface="Calibri"/>
-              </a:rPr>
-              <a:t>LOC </a:t>
-            </a:r>
-            <a:r>
-              <a:rPr lang="es-CO" sz="1200" dirty="0" smtClean="0">
-                <a:solidFill>
-                  <a:srgbClr val="000000"/>
-                </a:solidFill>
-                <a:latin typeface="Calibri"/>
-              </a:rPr>
-              <a:t>Planeadas: 934</a:t>
+              <a:t>LOC Planeadas: 934</a:t>
             </a:r>
             <a:br>
               <a:rPr lang="es-CO" sz="1200" dirty="0" smtClean="0">
@@ -8366,16 +8240,7 @@
                 </a:solidFill>
                 <a:latin typeface="Calibri"/>
               </a:rPr>
-              <a:t>	LOC </a:t>
-            </a:r>
-            <a:r>
-              <a:rPr lang="es-CO" sz="1200" dirty="0" smtClean="0">
-                <a:solidFill>
-                  <a:srgbClr val="000000"/>
-                </a:solidFill>
-                <a:latin typeface="Calibri"/>
-              </a:rPr>
-              <a:t>Reales: 1140</a:t>
+              <a:t>	LOC Reales: 1140</a:t>
             </a:r>
             <a:br>
               <a:rPr lang="es-CO" sz="1200" dirty="0" smtClean="0">
@@ -8392,16 +8257,7 @@
                 </a:solidFill>
                 <a:latin typeface="Calibri"/>
               </a:rPr>
-              <a:t>	Porcentaje</a:t>
-            </a:r>
-            <a:r>
-              <a:rPr lang="es-CO" sz="1200" dirty="0" smtClean="0">
-                <a:solidFill>
-                  <a:srgbClr val="000000"/>
-                </a:solidFill>
-                <a:latin typeface="Calibri"/>
-              </a:rPr>
-              <a:t>: 22,05%</a:t>
+              <a:t>	Porcentaje: 22,05%</a:t>
             </a:r>
             <a:br>
               <a:rPr lang="es-CO" sz="1200" dirty="0" smtClean="0">
@@ -8418,7 +8274,17 @@
                 </a:solidFill>
                 <a:latin typeface="Calibri"/>
               </a:rPr>
-              <a:t>	Objetivo </a:t>
+              <a:t>	Objetivo muy cerca de cumplirse. No se cumplió</a:t>
+            </a:r>
+          </a:p>
+          <a:p>
+            <a:pPr lvl="0"/>
+            <a:endParaRPr lang="es-CO" sz="1200" dirty="0" smtClean="0"/>
+          </a:p>
+          <a:p>
+            <a:r>
+              <a:rPr lang="es-CO" sz="1200" dirty="0" smtClean="0"/>
+              <a:t>Obj3: 	</a:t>
             </a:r>
             <a:r>
               <a:rPr lang="es-CO" sz="1200" dirty="0" smtClean="0">
@@ -8427,50 +8293,7 @@
                 </a:solidFill>
                 <a:latin typeface="Calibri"/>
               </a:rPr>
-              <a:t>muy cerca de </a:t>
-            </a:r>
-            <a:r>
-              <a:rPr lang="es-CO" sz="1200" dirty="0" smtClean="0">
-                <a:solidFill>
-                  <a:srgbClr val="000000"/>
-                </a:solidFill>
-                <a:latin typeface="Calibri"/>
-              </a:rPr>
-              <a:t>cumplirse. No se cumplió</a:t>
-            </a:r>
-            <a:endParaRPr lang="es-CO" sz="1200" dirty="0" smtClean="0">
-              <a:solidFill>
-                <a:srgbClr val="000000"/>
-              </a:solidFill>
-              <a:latin typeface="Calibri"/>
-            </a:endParaRPr>
-          </a:p>
-          <a:p>
-            <a:pPr lvl="0"/>
-            <a:endParaRPr lang="es-CO" sz="1200" dirty="0" smtClean="0"/>
-          </a:p>
-          <a:p>
-            <a:r>
-              <a:rPr lang="es-CO" sz="1200" dirty="0" smtClean="0"/>
-              <a:t>Obj3: 	</a:t>
-            </a:r>
-            <a:r>
-              <a:rPr lang="es-CO" sz="1200" dirty="0" smtClean="0">
-                <a:solidFill>
-                  <a:srgbClr val="000000"/>
-                </a:solidFill>
-                <a:latin typeface="Calibri"/>
-              </a:rPr>
-              <a:t>Erik</a:t>
-            </a:r>
-            <a:r>
-              <a:rPr lang="es-CO" sz="1200" dirty="0" smtClean="0">
-                <a:solidFill>
-                  <a:srgbClr val="000000"/>
-                </a:solidFill>
-                <a:latin typeface="Calibri"/>
-              </a:rPr>
-              <a:t>: 260</a:t>
+              <a:t>Erik: 260</a:t>
             </a:r>
             <a:br>
               <a:rPr lang="es-CO" sz="1200" dirty="0" smtClean="0">
@@ -8487,16 +8310,7 @@
                 </a:solidFill>
                 <a:latin typeface="Calibri"/>
               </a:rPr>
-              <a:t>	Sandra</a:t>
-            </a:r>
-            <a:r>
-              <a:rPr lang="es-CO" sz="1200" dirty="0" smtClean="0">
-                <a:solidFill>
-                  <a:srgbClr val="000000"/>
-                </a:solidFill>
-                <a:latin typeface="Calibri"/>
-              </a:rPr>
-              <a:t>: 212</a:t>
+              <a:t>	Sandra: 212</a:t>
             </a:r>
             <a:br>
               <a:rPr lang="es-CO" sz="1200" dirty="0" smtClean="0">
@@ -8548,16 +8362,7 @@
                 </a:solidFill>
                 <a:latin typeface="Calibri"/>
               </a:rPr>
-              <a:t>	Carlos</a:t>
-            </a:r>
-            <a:r>
-              <a:rPr lang="es-CO" sz="1200" dirty="0" smtClean="0">
-                <a:solidFill>
-                  <a:srgbClr val="000000"/>
-                </a:solidFill>
-                <a:latin typeface="Calibri"/>
-              </a:rPr>
-              <a:t>: 155</a:t>
+              <a:t>	Carlos: 155</a:t>
             </a:r>
             <a:br>
               <a:rPr lang="es-CO" sz="1200" dirty="0" smtClean="0">
@@ -8574,16 +8379,7 @@
                 </a:solidFill>
                 <a:latin typeface="Calibri"/>
               </a:rPr>
-              <a:t>	David</a:t>
-            </a:r>
-            <a:r>
-              <a:rPr lang="es-CO" sz="1200" dirty="0" smtClean="0">
-                <a:solidFill>
-                  <a:srgbClr val="000000"/>
-                </a:solidFill>
-                <a:latin typeface="Calibri"/>
-              </a:rPr>
-              <a:t>: 127</a:t>
+              <a:t>	David: 127</a:t>
             </a:r>
             <a:br>
               <a:rPr lang="es-CO" sz="1200" dirty="0" smtClean="0">
@@ -8600,16 +8396,7 @@
                 </a:solidFill>
                 <a:latin typeface="Calibri"/>
               </a:rPr>
-              <a:t>	Mauricio</a:t>
-            </a:r>
-            <a:r>
-              <a:rPr lang="es-CO" sz="1200" dirty="0" smtClean="0">
-                <a:solidFill>
-                  <a:srgbClr val="000000"/>
-                </a:solidFill>
-                <a:latin typeface="Calibri"/>
-              </a:rPr>
-              <a:t>: 152</a:t>
+              <a:t>	Mauricio: 152</a:t>
             </a:r>
             <a:br>
               <a:rPr lang="es-CO" sz="1200" dirty="0" smtClean="0">
@@ -8626,16 +8413,7 @@
                 </a:solidFill>
                 <a:latin typeface="Calibri"/>
               </a:rPr>
-              <a:t>	Más </a:t>
-            </a:r>
-            <a:r>
-              <a:rPr lang="es-CO" sz="1200" dirty="0" smtClean="0">
-                <a:solidFill>
-                  <a:srgbClr val="000000"/>
-                </a:solidFill>
-                <a:latin typeface="Calibri"/>
-              </a:rPr>
-              <a:t>de lo esperado:  Erik, Sandra, </a:t>
+              <a:t>	Más de lo esperado:  Erik, Sandra, </a:t>
             </a:r>
             <a:r>
               <a:rPr lang="es-CO" sz="1200" dirty="0" err="1" smtClean="0">
@@ -8670,25 +8448,7 @@
                 </a:solidFill>
                 <a:latin typeface="Calibri"/>
               </a:rPr>
-              <a:t>	Objetivo </a:t>
-            </a:r>
-            <a:r>
-              <a:rPr lang="es-CO" sz="1200" dirty="0" smtClean="0">
-                <a:solidFill>
-                  <a:srgbClr val="000000"/>
-                </a:solidFill>
-                <a:latin typeface="Calibri"/>
-              </a:rPr>
-              <a:t>no </a:t>
-            </a:r>
-            <a:r>
-              <a:rPr lang="es-CO" sz="1200" dirty="0" smtClean="0">
-                <a:solidFill>
-                  <a:srgbClr val="000000"/>
-                </a:solidFill>
-                <a:latin typeface="Calibri"/>
-              </a:rPr>
-              <a:t>cumplido</a:t>
+              <a:t>	Objetivo no cumplido</a:t>
             </a:r>
             <a:endParaRPr lang="en-US" sz="1200" dirty="0" smtClean="0"/>
           </a:p>
@@ -8780,7 +8540,7 @@
           <p:nvPr/>
         </p:nvPicPr>
         <p:blipFill>
-          <a:blip r:embed="rId7" cstate="print"/>
+          <a:blip r:embed="rId6" cstate="print"/>
           <a:stretch>
             <a:fillRect/>
           </a:stretch>
@@ -10629,22 +10389,6 @@
       </p:pic>
       <p:graphicFrame>
         <p:nvGraphicFramePr>
-          <p:cNvPr id="5" name="4 Gráfico"/>
-          <p:cNvGraphicFramePr/>
-          <p:nvPr/>
-        </p:nvGraphicFramePr>
-        <p:xfrm>
-          <a:off x="152400" y="1600200"/>
-          <a:ext cx="6353175" cy="2552700"/>
-        </p:xfrm>
-        <a:graphic>
-          <a:graphicData uri="http://schemas.openxmlformats.org/drawingml/2006/chart">
-            <c:chart xmlns:c="http://schemas.openxmlformats.org/drawingml/2006/chart" xmlns:r="http://schemas.openxmlformats.org/officeDocument/2006/relationships" r:id="rId3"/>
-          </a:graphicData>
-        </a:graphic>
-      </p:graphicFrame>
-      <p:graphicFrame>
-        <p:nvGraphicFramePr>
           <p:cNvPr id="7" name="6 Tabla"/>
           <p:cNvGraphicFramePr>
             <a:graphicFrameLocks noGrp="1"/>
@@ -10652,22 +10396,22 @@
           <p:nvPr/>
         </p:nvGraphicFramePr>
         <p:xfrm>
-          <a:off x="2667000" y="4191000"/>
-          <a:ext cx="6096000" cy="2380560"/>
+          <a:off x="304800" y="4953000"/>
+          <a:ext cx="8458201" cy="1618560"/>
         </p:xfrm>
         <a:graphic>
           <a:graphicData uri="http://schemas.openxmlformats.org/drawingml/2006/table">
             <a:tbl>
               <a:tblPr/>
               <a:tblGrid>
-                <a:gridCol w="1250575"/>
-                <a:gridCol w="718214"/>
-                <a:gridCol w="718214"/>
-                <a:gridCol w="718214"/>
-                <a:gridCol w="718214"/>
-                <a:gridCol w="718214"/>
-                <a:gridCol w="718214"/>
-                <a:gridCol w="536141"/>
+                <a:gridCol w="2819401"/>
+                <a:gridCol w="914400"/>
+                <a:gridCol w="762000"/>
+                <a:gridCol w="838200"/>
+                <a:gridCol w="838200"/>
+                <a:gridCol w="838200"/>
+                <a:gridCol w="762000"/>
+                <a:gridCol w="685800"/>
               </a:tblGrid>
               <a:tr h="337687">
                 <a:tc>
@@ -11188,7 +10932,7 @@
                           <a:spcPts val="0"/>
                         </a:spcAft>
                       </a:pPr>
-                      <a:endParaRPr lang="es-CO" sz="1000">
+                      <a:endParaRPr lang="es-CO" sz="1000" dirty="0">
                         <a:solidFill>
                           <a:srgbClr val="000000"/>
                         </a:solidFill>
@@ -11697,7 +11441,7 @@
                   </a:tcPr>
                 </a:tc>
               </a:tr>
-              <a:tr h="488890">
+              <a:tr h="81840">
                 <a:tc>
                   <a:txBody>
                     <a:bodyPr/>
@@ -11774,31 +11518,19 @@
                     <a:bodyPr/>
                     <a:lstStyle/>
                     <a:p>
-                      <a:pPr algn="ctr">
-                        <a:spcAft>
-                          <a:spcPts val="0"/>
-                        </a:spcAft>
-                      </a:pPr>
+                      <a:pPr algn="ctr" fontAlgn="b"/>
                       <a:r>
-                        <a:rPr lang="es-CO" sz="1000">
+                        <a:rPr lang="es-CO" sz="1100" b="0" i="0" u="none" strike="noStrike" dirty="0">
                           <a:solidFill>
                             <a:srgbClr val="000000"/>
                           </a:solidFill>
                           <a:latin typeface="Calibri"/>
-                          <a:ea typeface="Arial"/>
                         </a:rPr>
-                        <a:t>4,60</a:t>
+                        <a:t>4,40</a:t>
                       </a:r>
-                      <a:endParaRPr lang="es-CO" sz="1000">
-                        <a:solidFill>
-                          <a:srgbClr val="000000"/>
-                        </a:solidFill>
-                        <a:latin typeface="Arial"/>
-                        <a:ea typeface="Arial"/>
-                      </a:endParaRPr>
                     </a:p>
                   </a:txBody>
-                  <a:tcPr marL="53551" marR="53551" marT="17640" marB="17640" anchor="ctr">
+                  <a:tcPr marL="0" marR="0" marT="0" marB="0" anchor="ctr">
                     <a:lnL w="19050" cap="flat" cmpd="sng" algn="ctr">
                       <a:solidFill>
                         <a:srgbClr val="000000"/>
@@ -11842,31 +11574,19 @@
                     <a:bodyPr/>
                     <a:lstStyle/>
                     <a:p>
-                      <a:pPr algn="ctr">
-                        <a:spcAft>
-                          <a:spcPts val="0"/>
-                        </a:spcAft>
-                      </a:pPr>
+                      <a:pPr algn="ctr" fontAlgn="b"/>
                       <a:r>
-                        <a:rPr lang="es-CO" sz="1000">
+                        <a:rPr lang="es-CO" sz="1100" b="0" i="0" u="none" strike="noStrike">
                           <a:solidFill>
                             <a:srgbClr val="000000"/>
                           </a:solidFill>
                           <a:latin typeface="Calibri"/>
-                          <a:ea typeface="Arial"/>
                         </a:rPr>
                         <a:t>4,20</a:t>
                       </a:r>
-                      <a:endParaRPr lang="es-CO" sz="1000">
-                        <a:solidFill>
-                          <a:srgbClr val="000000"/>
-                        </a:solidFill>
-                        <a:latin typeface="Arial"/>
-                        <a:ea typeface="Arial"/>
-                      </a:endParaRPr>
                     </a:p>
                   </a:txBody>
-                  <a:tcPr marL="53551" marR="53551" marT="17640" marB="17640" anchor="ctr">
+                  <a:tcPr marL="0" marR="0" marT="0" marB="0" anchor="ctr">
                     <a:lnL w="12700" cap="flat" cmpd="sng" algn="ctr">
                       <a:solidFill>
                         <a:srgbClr val="000000"/>
@@ -11910,31 +11630,19 @@
                     <a:bodyPr/>
                     <a:lstStyle/>
                     <a:p>
-                      <a:pPr algn="ctr">
-                        <a:spcAft>
-                          <a:spcPts val="0"/>
-                        </a:spcAft>
-                      </a:pPr>
+                      <a:pPr algn="ctr" fontAlgn="b"/>
                       <a:r>
-                        <a:rPr lang="es-CO" sz="1000">
+                        <a:rPr lang="es-CO" sz="1100" b="0" i="0" u="none" strike="noStrike">
                           <a:solidFill>
                             <a:srgbClr val="000000"/>
                           </a:solidFill>
                           <a:latin typeface="Calibri"/>
-                          <a:ea typeface="Arial"/>
                         </a:rPr>
-                        <a:t>4,50</a:t>
+                        <a:t>4,60</a:t>
                       </a:r>
-                      <a:endParaRPr lang="es-CO" sz="1000">
-                        <a:solidFill>
-                          <a:srgbClr val="000000"/>
-                        </a:solidFill>
-                        <a:latin typeface="Arial"/>
-                        <a:ea typeface="Arial"/>
-                      </a:endParaRPr>
                     </a:p>
                   </a:txBody>
-                  <a:tcPr marL="53551" marR="53551" marT="17640" marB="17640" anchor="ctr">
+                  <a:tcPr marL="0" marR="0" marT="0" marB="0" anchor="ctr">
                     <a:lnL w="12700" cap="flat" cmpd="sng" algn="ctr">
                       <a:solidFill>
                         <a:srgbClr val="000000"/>
@@ -11978,31 +11686,19 @@
                     <a:bodyPr/>
                     <a:lstStyle/>
                     <a:p>
-                      <a:pPr algn="ctr">
-                        <a:spcAft>
-                          <a:spcPts val="0"/>
-                        </a:spcAft>
-                      </a:pPr>
+                      <a:pPr algn="ctr" fontAlgn="b"/>
                       <a:r>
-                        <a:rPr lang="es-CO" sz="1000">
+                        <a:rPr lang="es-CO" sz="1100" b="0" i="0" u="none" strike="noStrike">
                           <a:solidFill>
                             <a:srgbClr val="000000"/>
                           </a:solidFill>
                           <a:latin typeface="Calibri"/>
-                          <a:ea typeface="Arial"/>
                         </a:rPr>
-                        <a:t>4,00</a:t>
+                        <a:t>4,20</a:t>
                       </a:r>
-                      <a:endParaRPr lang="es-CO" sz="1000">
-                        <a:solidFill>
-                          <a:srgbClr val="000000"/>
-                        </a:solidFill>
-                        <a:latin typeface="Arial"/>
-                        <a:ea typeface="Arial"/>
-                      </a:endParaRPr>
                     </a:p>
                   </a:txBody>
-                  <a:tcPr marL="53551" marR="53551" marT="17640" marB="17640" anchor="ctr">
+                  <a:tcPr marL="0" marR="0" marT="0" marB="0" anchor="ctr">
                     <a:lnL w="12700" cap="flat" cmpd="sng" algn="ctr">
                       <a:solidFill>
                         <a:srgbClr val="000000"/>
@@ -12046,31 +11742,19 @@
                     <a:bodyPr/>
                     <a:lstStyle/>
                     <a:p>
-                      <a:pPr algn="ctr">
-                        <a:spcAft>
-                          <a:spcPts val="0"/>
-                        </a:spcAft>
-                      </a:pPr>
+                      <a:pPr algn="ctr" fontAlgn="b"/>
                       <a:r>
-                        <a:rPr lang="es-CO" sz="1000">
+                        <a:rPr lang="es-CO" sz="1100" b="0" i="0" u="none" strike="noStrike">
                           <a:solidFill>
                             <a:srgbClr val="000000"/>
                           </a:solidFill>
                           <a:latin typeface="Calibri"/>
-                          <a:ea typeface="Arial"/>
                         </a:rPr>
-                        <a:t>5,00</a:t>
+                        <a:t>4,80</a:t>
                       </a:r>
-                      <a:endParaRPr lang="es-CO" sz="1000">
-                        <a:solidFill>
-                          <a:srgbClr val="000000"/>
-                        </a:solidFill>
-                        <a:latin typeface="Arial"/>
-                        <a:ea typeface="Arial"/>
-                      </a:endParaRPr>
                     </a:p>
                   </a:txBody>
-                  <a:tcPr marL="53551" marR="53551" marT="17640" marB="17640" anchor="ctr">
+                  <a:tcPr marL="0" marR="0" marT="0" marB="0" anchor="ctr">
                     <a:lnL w="12700" cap="flat" cmpd="sng" algn="ctr">
                       <a:solidFill>
                         <a:srgbClr val="000000"/>
@@ -12114,31 +11798,19 @@
                     <a:bodyPr/>
                     <a:lstStyle/>
                     <a:p>
-                      <a:pPr algn="ctr">
-                        <a:spcAft>
-                          <a:spcPts val="0"/>
-                        </a:spcAft>
-                      </a:pPr>
+                      <a:pPr algn="ctr" fontAlgn="b"/>
                       <a:r>
-                        <a:rPr lang="es-CO" sz="1000">
+                        <a:rPr lang="es-CO" sz="1100" b="0" i="0" u="none" strike="noStrike">
                           <a:solidFill>
                             <a:srgbClr val="000000"/>
                           </a:solidFill>
                           <a:latin typeface="Calibri"/>
-                          <a:ea typeface="Arial"/>
                         </a:rPr>
                         <a:t>5,00</a:t>
                       </a:r>
-                      <a:endParaRPr lang="es-CO" sz="1000">
-                        <a:solidFill>
-                          <a:srgbClr val="000000"/>
-                        </a:solidFill>
-                        <a:latin typeface="Arial"/>
-                        <a:ea typeface="Arial"/>
-                      </a:endParaRPr>
                     </a:p>
                   </a:txBody>
-                  <a:tcPr marL="53551" marR="53551" marT="17640" marB="17640" anchor="ctr">
+                  <a:tcPr marL="0" marR="0" marT="0" marB="0" anchor="ctr">
                     <a:lnL w="12700" cap="flat" cmpd="sng" algn="ctr">
                       <a:solidFill>
                         <a:srgbClr val="000000"/>
@@ -12182,31 +11854,19 @@
                     <a:bodyPr/>
                     <a:lstStyle/>
                     <a:p>
-                      <a:pPr algn="ctr">
-                        <a:spcAft>
-                          <a:spcPts val="0"/>
-                        </a:spcAft>
-                      </a:pPr>
+                      <a:pPr algn="ctr" fontAlgn="b"/>
                       <a:r>
-                        <a:rPr lang="es-CO" sz="1000" b="1">
+                        <a:rPr lang="es-CO" sz="1100" b="0" i="0" u="none" strike="noStrike">
                           <a:solidFill>
                             <a:srgbClr val="000000"/>
                           </a:solidFill>
                           <a:latin typeface="Calibri"/>
-                          <a:ea typeface="Arial"/>
                         </a:rPr>
-                        <a:t>4,55</a:t>
+                        <a:t>4,53</a:t>
                       </a:r>
-                      <a:endParaRPr lang="es-CO" sz="1000">
-                        <a:solidFill>
-                          <a:srgbClr val="000000"/>
-                        </a:solidFill>
-                        <a:latin typeface="Arial"/>
-                        <a:ea typeface="Arial"/>
-                      </a:endParaRPr>
                     </a:p>
                   </a:txBody>
-                  <a:tcPr marL="53551" marR="53551" marT="17640" marB="17640" anchor="ctr">
+                  <a:tcPr marL="0" marR="0" marT="0" marB="0" anchor="ctr">
                     <a:lnL w="19050" cap="flat" cmpd="sng" algn="ctr">
                       <a:solidFill>
                         <a:srgbClr val="000000"/>
@@ -12249,7 +11909,7 @@
                   </a:tcPr>
                 </a:tc>
               </a:tr>
-              <a:tr h="337687">
+              <a:tr h="0">
                 <a:tc>
                   <a:txBody>
                     <a:bodyPr/>
@@ -12326,31 +11986,19 @@
                     <a:bodyPr/>
                     <a:lstStyle/>
                     <a:p>
-                      <a:pPr algn="ctr">
-                        <a:spcAft>
-                          <a:spcPts val="0"/>
-                        </a:spcAft>
-                      </a:pPr>
+                      <a:pPr algn="ctr" fontAlgn="b"/>
                       <a:r>
-                        <a:rPr lang="es-CO" sz="1000">
+                        <a:rPr lang="es-CO" sz="1100" b="0" i="0" u="none" strike="noStrike">
                           <a:solidFill>
                             <a:srgbClr val="000000"/>
                           </a:solidFill>
                           <a:latin typeface="Calibri"/>
-                          <a:ea typeface="Arial"/>
                         </a:rPr>
                         <a:t>4,80</a:t>
                       </a:r>
-                      <a:endParaRPr lang="es-CO" sz="1000">
-                        <a:solidFill>
-                          <a:srgbClr val="000000"/>
-                        </a:solidFill>
-                        <a:latin typeface="Arial"/>
-                        <a:ea typeface="Arial"/>
-                      </a:endParaRPr>
                     </a:p>
                   </a:txBody>
-                  <a:tcPr marL="53551" marR="53551" marT="17640" marB="17640" anchor="ctr">
+                  <a:tcPr marL="0" marR="0" marT="0" marB="0" anchor="ctr">
                     <a:lnL w="19050" cap="flat" cmpd="sng" algn="ctr">
                       <a:solidFill>
                         <a:srgbClr val="000000"/>
@@ -12394,31 +12042,19 @@
                     <a:bodyPr/>
                     <a:lstStyle/>
                     <a:p>
-                      <a:pPr algn="ctr">
-                        <a:spcAft>
-                          <a:spcPts val="0"/>
-                        </a:spcAft>
-                      </a:pPr>
+                      <a:pPr algn="ctr" fontAlgn="b"/>
                       <a:r>
-                        <a:rPr lang="es-CO" sz="1000">
+                        <a:rPr lang="es-CO" sz="1100" b="0" i="0" u="none" strike="noStrike">
                           <a:solidFill>
                             <a:srgbClr val="000000"/>
                           </a:solidFill>
                           <a:latin typeface="Calibri"/>
-                          <a:ea typeface="Arial"/>
                         </a:rPr>
-                        <a:t>4,60</a:t>
+                        <a:t>5,00</a:t>
                       </a:r>
-                      <a:endParaRPr lang="es-CO" sz="1000">
-                        <a:solidFill>
-                          <a:srgbClr val="000000"/>
-                        </a:solidFill>
-                        <a:latin typeface="Arial"/>
-                        <a:ea typeface="Arial"/>
-                      </a:endParaRPr>
                     </a:p>
                   </a:txBody>
-                  <a:tcPr marL="53551" marR="53551" marT="17640" marB="17640" anchor="ctr">
+                  <a:tcPr marL="0" marR="0" marT="0" marB="0" anchor="ctr">
                     <a:lnL w="12700" cap="flat" cmpd="sng" algn="ctr">
                       <a:solidFill>
                         <a:srgbClr val="000000"/>
@@ -12462,31 +12098,19 @@
                     <a:bodyPr/>
                     <a:lstStyle/>
                     <a:p>
-                      <a:pPr algn="ctr">
-                        <a:spcAft>
-                          <a:spcPts val="0"/>
-                        </a:spcAft>
-                      </a:pPr>
+                      <a:pPr algn="ctr" fontAlgn="b"/>
                       <a:r>
-                        <a:rPr lang="es-CO" sz="1000">
+                        <a:rPr lang="es-CO" sz="1100" b="0" i="0" u="none" strike="noStrike">
                           <a:solidFill>
                             <a:srgbClr val="000000"/>
                           </a:solidFill>
                           <a:latin typeface="Calibri"/>
-                          <a:ea typeface="Arial"/>
                         </a:rPr>
-                        <a:t>5,00</a:t>
+                        <a:t>4,80</a:t>
                       </a:r>
-                      <a:endParaRPr lang="es-CO" sz="1000">
-                        <a:solidFill>
-                          <a:srgbClr val="000000"/>
-                        </a:solidFill>
-                        <a:latin typeface="Arial"/>
-                        <a:ea typeface="Arial"/>
-                      </a:endParaRPr>
                     </a:p>
                   </a:txBody>
-                  <a:tcPr marL="53551" marR="53551" marT="17640" marB="17640" anchor="ctr">
+                  <a:tcPr marL="0" marR="0" marT="0" marB="0" anchor="ctr">
                     <a:lnL w="12700" cap="flat" cmpd="sng" algn="ctr">
                       <a:solidFill>
                         <a:srgbClr val="000000"/>
@@ -12530,31 +12154,19 @@
                     <a:bodyPr/>
                     <a:lstStyle/>
                     <a:p>
-                      <a:pPr algn="ctr">
-                        <a:spcAft>
-                          <a:spcPts val="0"/>
-                        </a:spcAft>
-                      </a:pPr>
+                      <a:pPr algn="ctr" fontAlgn="b"/>
                       <a:r>
-                        <a:rPr lang="es-CO" sz="1000">
+                        <a:rPr lang="es-CO" sz="1100" b="0" i="0" u="none" strike="noStrike">
                           <a:solidFill>
                             <a:srgbClr val="000000"/>
                           </a:solidFill>
                           <a:latin typeface="Calibri"/>
-                          <a:ea typeface="Arial"/>
                         </a:rPr>
-                        <a:t>4,80</a:t>
+                        <a:t>4,60</a:t>
                       </a:r>
-                      <a:endParaRPr lang="es-CO" sz="1000">
-                        <a:solidFill>
-                          <a:srgbClr val="000000"/>
-                        </a:solidFill>
-                        <a:latin typeface="Arial"/>
-                        <a:ea typeface="Arial"/>
-                      </a:endParaRPr>
                     </a:p>
                   </a:txBody>
-                  <a:tcPr marL="53551" marR="53551" marT="17640" marB="17640" anchor="ctr">
+                  <a:tcPr marL="0" marR="0" marT="0" marB="0" anchor="ctr">
                     <a:lnL w="12700" cap="flat" cmpd="sng" algn="ctr">
                       <a:solidFill>
                         <a:srgbClr val="000000"/>
@@ -12598,31 +12210,19 @@
                     <a:bodyPr/>
                     <a:lstStyle/>
                     <a:p>
-                      <a:pPr algn="ctr">
-                        <a:spcAft>
-                          <a:spcPts val="0"/>
-                        </a:spcAft>
-                      </a:pPr>
+                      <a:pPr algn="ctr" fontAlgn="b"/>
                       <a:r>
-                        <a:rPr lang="es-CO" sz="1000">
+                        <a:rPr lang="es-CO" sz="1100" b="0" i="0" u="none" strike="noStrike">
                           <a:solidFill>
                             <a:srgbClr val="000000"/>
                           </a:solidFill>
                           <a:latin typeface="Calibri"/>
-                          <a:ea typeface="Arial"/>
                         </a:rPr>
                         <a:t>5,00</a:t>
                       </a:r>
-                      <a:endParaRPr lang="es-CO" sz="1000">
-                        <a:solidFill>
-                          <a:srgbClr val="000000"/>
-                        </a:solidFill>
-                        <a:latin typeface="Arial"/>
-                        <a:ea typeface="Arial"/>
-                      </a:endParaRPr>
                     </a:p>
                   </a:txBody>
-                  <a:tcPr marL="53551" marR="53551" marT="17640" marB="17640" anchor="ctr">
+                  <a:tcPr marL="0" marR="0" marT="0" marB="0" anchor="ctr">
                     <a:lnL w="12700" cap="flat" cmpd="sng" algn="ctr">
                       <a:solidFill>
                         <a:srgbClr val="000000"/>
@@ -12666,31 +12266,19 @@
                     <a:bodyPr/>
                     <a:lstStyle/>
                     <a:p>
-                      <a:pPr algn="ctr">
-                        <a:spcAft>
-                          <a:spcPts val="0"/>
-                        </a:spcAft>
-                      </a:pPr>
+                      <a:pPr algn="ctr" fontAlgn="b"/>
                       <a:r>
-                        <a:rPr lang="es-CO" sz="1000">
+                        <a:rPr lang="es-CO" sz="1100" b="0" i="0" u="none" strike="noStrike">
                           <a:solidFill>
                             <a:srgbClr val="000000"/>
                           </a:solidFill>
                           <a:latin typeface="Calibri"/>
-                          <a:ea typeface="Arial"/>
                         </a:rPr>
                         <a:t>5,00</a:t>
                       </a:r>
-                      <a:endParaRPr lang="es-CO" sz="1000">
-                        <a:solidFill>
-                          <a:srgbClr val="000000"/>
-                        </a:solidFill>
-                        <a:latin typeface="Arial"/>
-                        <a:ea typeface="Arial"/>
-                      </a:endParaRPr>
                     </a:p>
                   </a:txBody>
-                  <a:tcPr marL="53551" marR="53551" marT="17640" marB="17640" anchor="ctr">
+                  <a:tcPr marL="0" marR="0" marT="0" marB="0" anchor="ctr">
                     <a:lnL w="12700" cap="flat" cmpd="sng" algn="ctr">
                       <a:solidFill>
                         <a:srgbClr val="000000"/>
@@ -12734,31 +12322,19 @@
                     <a:bodyPr/>
                     <a:lstStyle/>
                     <a:p>
-                      <a:pPr algn="ctr">
-                        <a:spcAft>
-                          <a:spcPts val="0"/>
-                        </a:spcAft>
-                      </a:pPr>
+                      <a:pPr algn="ctr" fontAlgn="b"/>
                       <a:r>
-                        <a:rPr lang="es-CO" sz="1000" b="1">
+                        <a:rPr lang="es-CO" sz="1100" b="0" i="0" u="none" strike="noStrike">
                           <a:solidFill>
                             <a:srgbClr val="000000"/>
                           </a:solidFill>
                           <a:latin typeface="Calibri"/>
-                          <a:ea typeface="Arial"/>
                         </a:rPr>
                         <a:t>4,87</a:t>
                       </a:r>
-                      <a:endParaRPr lang="es-CO" sz="1000">
-                        <a:solidFill>
-                          <a:srgbClr val="000000"/>
-                        </a:solidFill>
-                        <a:latin typeface="Arial"/>
-                        <a:ea typeface="Arial"/>
-                      </a:endParaRPr>
                     </a:p>
                   </a:txBody>
-                  <a:tcPr marL="53551" marR="53551" marT="17640" marB="17640" anchor="ctr">
+                  <a:tcPr marL="0" marR="0" marT="0" marB="0" anchor="ctr">
                     <a:lnL w="19050" cap="flat" cmpd="sng" algn="ctr">
                       <a:solidFill>
                         <a:srgbClr val="000000"/>
@@ -12801,7 +12377,7 @@
                   </a:tcPr>
                 </a:tc>
               </a:tr>
-              <a:tr h="337687">
+              <a:tr h="87480">
                 <a:tc>
                   <a:txBody>
                     <a:bodyPr/>
@@ -12878,31 +12454,19 @@
                     <a:bodyPr/>
                     <a:lstStyle/>
                     <a:p>
-                      <a:pPr algn="ctr">
-                        <a:spcAft>
-                          <a:spcPts val="0"/>
-                        </a:spcAft>
-                      </a:pPr>
+                      <a:pPr algn="ctr" fontAlgn="b"/>
                       <a:r>
-                        <a:rPr lang="es-CO" sz="1000">
+                        <a:rPr lang="es-CO" sz="1100" b="0" i="0" u="none" strike="noStrike">
                           <a:solidFill>
                             <a:srgbClr val="000000"/>
                           </a:solidFill>
                           <a:latin typeface="Calibri"/>
-                          <a:ea typeface="Arial"/>
                         </a:rPr>
                         <a:t>4,80</a:t>
                       </a:r>
-                      <a:endParaRPr lang="es-CO" sz="1000">
-                        <a:solidFill>
-                          <a:srgbClr val="000000"/>
-                        </a:solidFill>
-                        <a:latin typeface="Arial"/>
-                        <a:ea typeface="Arial"/>
-                      </a:endParaRPr>
                     </a:p>
                   </a:txBody>
-                  <a:tcPr marL="53551" marR="53551" marT="17640" marB="17640" anchor="ctr">
+                  <a:tcPr marL="0" marR="0" marT="0" marB="0" anchor="ctr">
                     <a:lnL w="19050" cap="flat" cmpd="sng" algn="ctr">
                       <a:solidFill>
                         <a:srgbClr val="000000"/>
@@ -12946,31 +12510,19 @@
                     <a:bodyPr/>
                     <a:lstStyle/>
                     <a:p>
-                      <a:pPr algn="ctr">
-                        <a:spcAft>
-                          <a:spcPts val="0"/>
-                        </a:spcAft>
-                      </a:pPr>
+                      <a:pPr algn="ctr" fontAlgn="b"/>
                       <a:r>
-                        <a:rPr lang="es-CO" sz="1000">
+                        <a:rPr lang="es-CO" sz="1100" b="0" i="0" u="none" strike="noStrike">
                           <a:solidFill>
                             <a:srgbClr val="000000"/>
                           </a:solidFill>
                           <a:latin typeface="Calibri"/>
-                          <a:ea typeface="Arial"/>
                         </a:rPr>
-                        <a:t>4,60</a:t>
+                        <a:t>4,80</a:t>
                       </a:r>
-                      <a:endParaRPr lang="es-CO" sz="1000">
-                        <a:solidFill>
-                          <a:srgbClr val="000000"/>
-                        </a:solidFill>
-                        <a:latin typeface="Arial"/>
-                        <a:ea typeface="Arial"/>
-                      </a:endParaRPr>
                     </a:p>
                   </a:txBody>
-                  <a:tcPr marL="53551" marR="53551" marT="17640" marB="17640" anchor="ctr">
+                  <a:tcPr marL="0" marR="0" marT="0" marB="0" anchor="ctr">
                     <a:lnL w="12700" cap="flat" cmpd="sng" algn="ctr">
                       <a:solidFill>
                         <a:srgbClr val="000000"/>
@@ -13014,31 +12566,19 @@
                     <a:bodyPr/>
                     <a:lstStyle/>
                     <a:p>
-                      <a:pPr algn="ctr">
-                        <a:spcAft>
-                          <a:spcPts val="0"/>
-                        </a:spcAft>
-                      </a:pPr>
+                      <a:pPr algn="ctr" fontAlgn="b"/>
                       <a:r>
-                        <a:rPr lang="es-CO" sz="1000">
+                        <a:rPr lang="es-CO" sz="1100" b="0" i="0" u="none" strike="noStrike">
                           <a:solidFill>
                             <a:srgbClr val="000000"/>
                           </a:solidFill>
                           <a:latin typeface="Calibri"/>
-                          <a:ea typeface="Arial"/>
                         </a:rPr>
-                        <a:t>4,50</a:t>
+                        <a:t>4,80</a:t>
                       </a:r>
-                      <a:endParaRPr lang="es-CO" sz="1000">
-                        <a:solidFill>
-                          <a:srgbClr val="000000"/>
-                        </a:solidFill>
-                        <a:latin typeface="Arial"/>
-                        <a:ea typeface="Arial"/>
-                      </a:endParaRPr>
                     </a:p>
                   </a:txBody>
-                  <a:tcPr marL="53551" marR="53551" marT="17640" marB="17640" anchor="ctr">
+                  <a:tcPr marL="0" marR="0" marT="0" marB="0" anchor="ctr">
                     <a:lnL w="12700" cap="flat" cmpd="sng" algn="ctr">
                       <a:solidFill>
                         <a:srgbClr val="000000"/>
@@ -13082,31 +12622,19 @@
                     <a:bodyPr/>
                     <a:lstStyle/>
                     <a:p>
-                      <a:pPr algn="ctr">
-                        <a:spcAft>
-                          <a:spcPts val="0"/>
-                        </a:spcAft>
-                      </a:pPr>
+                      <a:pPr algn="ctr" fontAlgn="b"/>
                       <a:r>
-                        <a:rPr lang="es-CO" sz="1000">
+                        <a:rPr lang="es-CO" sz="1100" b="0" i="0" u="none" strike="noStrike">
                           <a:solidFill>
                             <a:srgbClr val="000000"/>
                           </a:solidFill>
                           <a:latin typeface="Calibri"/>
-                          <a:ea typeface="Arial"/>
                         </a:rPr>
-                        <a:t>4,60</a:t>
+                        <a:t>4,80</a:t>
                       </a:r>
-                      <a:endParaRPr lang="es-CO" sz="1000">
-                        <a:solidFill>
-                          <a:srgbClr val="000000"/>
-                        </a:solidFill>
-                        <a:latin typeface="Arial"/>
-                        <a:ea typeface="Arial"/>
-                      </a:endParaRPr>
                     </a:p>
                   </a:txBody>
-                  <a:tcPr marL="53551" marR="53551" marT="17640" marB="17640" anchor="ctr">
+                  <a:tcPr marL="0" marR="0" marT="0" marB="0" anchor="ctr">
                     <a:lnL w="12700" cap="flat" cmpd="sng" algn="ctr">
                       <a:solidFill>
                         <a:srgbClr val="000000"/>
@@ -13150,31 +12678,19 @@
                     <a:bodyPr/>
                     <a:lstStyle/>
                     <a:p>
-                      <a:pPr algn="ctr">
-                        <a:spcAft>
-                          <a:spcPts val="0"/>
-                        </a:spcAft>
-                      </a:pPr>
+                      <a:pPr algn="ctr" fontAlgn="b"/>
                       <a:r>
-                        <a:rPr lang="es-CO" sz="1000">
+                        <a:rPr lang="es-CO" sz="1100" b="0" i="0" u="none" strike="noStrike">
                           <a:solidFill>
                             <a:srgbClr val="000000"/>
                           </a:solidFill>
                           <a:latin typeface="Calibri"/>
-                          <a:ea typeface="Arial"/>
                         </a:rPr>
-                        <a:t>4,60</a:t>
+                        <a:t>5,00</a:t>
                       </a:r>
-                      <a:endParaRPr lang="es-CO" sz="1000">
-                        <a:solidFill>
-                          <a:srgbClr val="000000"/>
-                        </a:solidFill>
-                        <a:latin typeface="Arial"/>
-                        <a:ea typeface="Arial"/>
-                      </a:endParaRPr>
                     </a:p>
                   </a:txBody>
-                  <a:tcPr marL="53551" marR="53551" marT="17640" marB="17640" anchor="ctr">
+                  <a:tcPr marL="0" marR="0" marT="0" marB="0" anchor="ctr">
                     <a:lnL w="12700" cap="flat" cmpd="sng" algn="ctr">
                       <a:solidFill>
                         <a:srgbClr val="000000"/>
@@ -13218,31 +12734,19 @@
                     <a:bodyPr/>
                     <a:lstStyle/>
                     <a:p>
-                      <a:pPr algn="ctr">
-                        <a:spcAft>
-                          <a:spcPts val="0"/>
-                        </a:spcAft>
-                      </a:pPr>
+                      <a:pPr algn="ctr" fontAlgn="b"/>
                       <a:r>
-                        <a:rPr lang="es-CO" sz="1000">
+                        <a:rPr lang="es-CO" sz="1100" b="0" i="0" u="none" strike="noStrike">
                           <a:solidFill>
                             <a:srgbClr val="000000"/>
                           </a:solidFill>
                           <a:latin typeface="Calibri"/>
-                          <a:ea typeface="Arial"/>
                         </a:rPr>
                         <a:t>5,00</a:t>
                       </a:r>
-                      <a:endParaRPr lang="es-CO" sz="1000">
-                        <a:solidFill>
-                          <a:srgbClr val="000000"/>
-                        </a:solidFill>
-                        <a:latin typeface="Arial"/>
-                        <a:ea typeface="Arial"/>
-                      </a:endParaRPr>
                     </a:p>
                   </a:txBody>
-                  <a:tcPr marL="53551" marR="53551" marT="17640" marB="17640" anchor="ctr">
+                  <a:tcPr marL="0" marR="0" marT="0" marB="0" anchor="ctr">
                     <a:lnL w="12700" cap="flat" cmpd="sng" algn="ctr">
                       <a:solidFill>
                         <a:srgbClr val="000000"/>
@@ -13286,31 +12790,19 @@
                     <a:bodyPr/>
                     <a:lstStyle/>
                     <a:p>
-                      <a:pPr algn="ctr">
-                        <a:spcAft>
-                          <a:spcPts val="0"/>
-                        </a:spcAft>
-                      </a:pPr>
+                      <a:pPr algn="ctr" fontAlgn="b"/>
                       <a:r>
-                        <a:rPr lang="es-CO" sz="1000" b="1">
+                        <a:rPr lang="es-CO" sz="1100" b="0" i="0" u="none" strike="noStrike">
                           <a:solidFill>
                             <a:srgbClr val="000000"/>
                           </a:solidFill>
                           <a:latin typeface="Calibri"/>
-                          <a:ea typeface="Arial"/>
                         </a:rPr>
-                        <a:t>4,68</a:t>
+                        <a:t>4,87</a:t>
                       </a:r>
-                      <a:endParaRPr lang="es-CO" sz="1000">
-                        <a:solidFill>
-                          <a:srgbClr val="000000"/>
-                        </a:solidFill>
-                        <a:latin typeface="Arial"/>
-                        <a:ea typeface="Arial"/>
-                      </a:endParaRPr>
                     </a:p>
                   </a:txBody>
-                  <a:tcPr marL="53551" marR="53551" marT="17640" marB="17640" anchor="ctr">
+                  <a:tcPr marL="0" marR="0" marT="0" marB="0" anchor="ctr">
                     <a:lnL w="19050" cap="flat" cmpd="sng" algn="ctr">
                       <a:solidFill>
                         <a:srgbClr val="000000"/>
@@ -13353,7 +12845,7 @@
                   </a:tcPr>
                 </a:tc>
               </a:tr>
-              <a:tr h="337687">
+              <a:tr h="0">
                 <a:tc>
                   <a:txBody>
                     <a:bodyPr/>
@@ -13430,31 +12922,19 @@
                     <a:bodyPr/>
                     <a:lstStyle/>
                     <a:p>
-                      <a:pPr algn="ctr">
-                        <a:spcAft>
-                          <a:spcPts val="0"/>
-                        </a:spcAft>
-                      </a:pPr>
+                      <a:pPr algn="ctr" fontAlgn="b"/>
                       <a:r>
-                        <a:rPr lang="es-CO" sz="1000">
+                        <a:rPr lang="es-CO" sz="1100" b="0" i="0" u="none" strike="noStrike">
                           <a:solidFill>
                             <a:srgbClr val="000000"/>
                           </a:solidFill>
                           <a:latin typeface="Calibri"/>
-                          <a:ea typeface="Arial"/>
                         </a:rPr>
-                        <a:t>4,40</a:t>
+                        <a:t>4,60</a:t>
                       </a:r>
-                      <a:endParaRPr lang="es-CO" sz="1000">
-                        <a:solidFill>
-                          <a:srgbClr val="000000"/>
-                        </a:solidFill>
-                        <a:latin typeface="Arial"/>
-                        <a:ea typeface="Arial"/>
-                      </a:endParaRPr>
                     </a:p>
                   </a:txBody>
-                  <a:tcPr marL="53551" marR="53551" marT="17640" marB="17640" anchor="ctr">
+                  <a:tcPr marL="0" marR="0" marT="0" marB="0" anchor="ctr">
                     <a:lnL w="19050" cap="flat" cmpd="sng" algn="ctr">
                       <a:solidFill>
                         <a:srgbClr val="000000"/>
@@ -13498,31 +12978,19 @@
                     <a:bodyPr/>
                     <a:lstStyle/>
                     <a:p>
-                      <a:pPr algn="ctr">
-                        <a:spcAft>
-                          <a:spcPts val="0"/>
-                        </a:spcAft>
-                      </a:pPr>
+                      <a:pPr algn="ctr" fontAlgn="b"/>
                       <a:r>
-                        <a:rPr lang="es-CO" sz="1000">
+                        <a:rPr lang="es-CO" sz="1100" b="0" i="0" u="none" strike="noStrike">
                           <a:solidFill>
                             <a:srgbClr val="000000"/>
                           </a:solidFill>
                           <a:latin typeface="Calibri"/>
-                          <a:ea typeface="Arial"/>
                         </a:rPr>
-                        <a:t>4,20</a:t>
+                        <a:t>4,80</a:t>
                       </a:r>
-                      <a:endParaRPr lang="es-CO" sz="1000">
-                        <a:solidFill>
-                          <a:srgbClr val="000000"/>
-                        </a:solidFill>
-                        <a:latin typeface="Arial"/>
-                        <a:ea typeface="Arial"/>
-                      </a:endParaRPr>
                     </a:p>
                   </a:txBody>
-                  <a:tcPr marL="53551" marR="53551" marT="17640" marB="17640" anchor="ctr">
+                  <a:tcPr marL="0" marR="0" marT="0" marB="0" anchor="ctr">
                     <a:lnL w="12700" cap="flat" cmpd="sng" algn="ctr">
                       <a:solidFill>
                         <a:srgbClr val="000000"/>
@@ -13566,31 +13034,19 @@
                     <a:bodyPr/>
                     <a:lstStyle/>
                     <a:p>
-                      <a:pPr algn="ctr">
-                        <a:spcAft>
-                          <a:spcPts val="0"/>
-                        </a:spcAft>
-                      </a:pPr>
+                      <a:pPr algn="ctr" fontAlgn="b"/>
                       <a:r>
-                        <a:rPr lang="es-CO" sz="1000">
+                        <a:rPr lang="es-CO" sz="1100" b="0" i="0" u="none" strike="noStrike">
                           <a:solidFill>
                             <a:srgbClr val="000000"/>
                           </a:solidFill>
                           <a:latin typeface="Calibri"/>
-                          <a:ea typeface="Arial"/>
                         </a:rPr>
-                        <a:t>4,00</a:t>
+                        <a:t>4,80</a:t>
                       </a:r>
-                      <a:endParaRPr lang="es-CO" sz="1000">
-                        <a:solidFill>
-                          <a:srgbClr val="000000"/>
-                        </a:solidFill>
-                        <a:latin typeface="Arial"/>
-                        <a:ea typeface="Arial"/>
-                      </a:endParaRPr>
                     </a:p>
                   </a:txBody>
-                  <a:tcPr marL="53551" marR="53551" marT="17640" marB="17640" anchor="ctr">
+                  <a:tcPr marL="0" marR="0" marT="0" marB="0" anchor="ctr">
                     <a:lnL w="12700" cap="flat" cmpd="sng" algn="ctr">
                       <a:solidFill>
                         <a:srgbClr val="000000"/>
@@ -13634,31 +13090,19 @@
                     <a:bodyPr/>
                     <a:lstStyle/>
                     <a:p>
-                      <a:pPr algn="ctr">
-                        <a:spcAft>
-                          <a:spcPts val="0"/>
-                        </a:spcAft>
-                      </a:pPr>
+                      <a:pPr algn="ctr" fontAlgn="b"/>
                       <a:r>
-                        <a:rPr lang="es-CO" sz="1000">
+                        <a:rPr lang="es-CO" sz="1100" b="0" i="0" u="none" strike="noStrike">
                           <a:solidFill>
                             <a:srgbClr val="000000"/>
                           </a:solidFill>
                           <a:latin typeface="Calibri"/>
-                          <a:ea typeface="Arial"/>
                         </a:rPr>
-                        <a:t>4,20</a:t>
+                        <a:t>4,80</a:t>
                       </a:r>
-                      <a:endParaRPr lang="es-CO" sz="1000">
-                        <a:solidFill>
-                          <a:srgbClr val="000000"/>
-                        </a:solidFill>
-                        <a:latin typeface="Arial"/>
-                        <a:ea typeface="Arial"/>
-                      </a:endParaRPr>
                     </a:p>
                   </a:txBody>
-                  <a:tcPr marL="53551" marR="53551" marT="17640" marB="17640" anchor="ctr">
+                  <a:tcPr marL="0" marR="0" marT="0" marB="0" anchor="ctr">
                     <a:lnL w="12700" cap="flat" cmpd="sng" algn="ctr">
                       <a:solidFill>
                         <a:srgbClr val="000000"/>
@@ -13702,31 +13146,19 @@
                     <a:bodyPr/>
                     <a:lstStyle/>
                     <a:p>
-                      <a:pPr algn="ctr">
-                        <a:spcAft>
-                          <a:spcPts val="0"/>
-                        </a:spcAft>
-                      </a:pPr>
+                      <a:pPr algn="ctr" fontAlgn="b"/>
                       <a:r>
-                        <a:rPr lang="es-CO" sz="1000">
+                        <a:rPr lang="es-CO" sz="1100" b="0" i="0" u="none" strike="noStrike">
                           <a:solidFill>
                             <a:srgbClr val="000000"/>
                           </a:solidFill>
                           <a:latin typeface="Calibri"/>
-                          <a:ea typeface="Arial"/>
                         </a:rPr>
-                        <a:t>4,80</a:t>
+                        <a:t>4,60</a:t>
                       </a:r>
-                      <a:endParaRPr lang="es-CO" sz="1000">
-                        <a:solidFill>
-                          <a:srgbClr val="000000"/>
-                        </a:solidFill>
-                        <a:latin typeface="Arial"/>
-                        <a:ea typeface="Arial"/>
-                      </a:endParaRPr>
                     </a:p>
                   </a:txBody>
-                  <a:tcPr marL="53551" marR="53551" marT="17640" marB="17640" anchor="ctr">
+                  <a:tcPr marL="0" marR="0" marT="0" marB="0" anchor="ctr">
                     <a:lnL w="12700" cap="flat" cmpd="sng" algn="ctr">
                       <a:solidFill>
                         <a:srgbClr val="000000"/>
@@ -13770,31 +13202,19 @@
                     <a:bodyPr/>
                     <a:lstStyle/>
                     <a:p>
-                      <a:pPr algn="ctr">
-                        <a:spcAft>
-                          <a:spcPts val="0"/>
-                        </a:spcAft>
-                      </a:pPr>
+                      <a:pPr algn="ctr" fontAlgn="b"/>
                       <a:r>
-                        <a:rPr lang="es-CO" sz="1000">
+                        <a:rPr lang="es-CO" sz="1100" b="0" i="0" u="none" strike="noStrike">
                           <a:solidFill>
                             <a:srgbClr val="000000"/>
                           </a:solidFill>
                           <a:latin typeface="Calibri"/>
-                          <a:ea typeface="Arial"/>
                         </a:rPr>
                         <a:t>4,80</a:t>
                       </a:r>
-                      <a:endParaRPr lang="es-CO" sz="1000">
-                        <a:solidFill>
-                          <a:srgbClr val="000000"/>
-                        </a:solidFill>
-                        <a:latin typeface="Arial"/>
-                        <a:ea typeface="Arial"/>
-                      </a:endParaRPr>
                     </a:p>
                   </a:txBody>
-                  <a:tcPr marL="53551" marR="53551" marT="17640" marB="17640" anchor="ctr">
+                  <a:tcPr marL="0" marR="0" marT="0" marB="0" anchor="ctr">
                     <a:lnL w="12700" cap="flat" cmpd="sng" algn="ctr">
                       <a:solidFill>
                         <a:srgbClr val="000000"/>
@@ -13838,31 +13258,19 @@
                     <a:bodyPr/>
                     <a:lstStyle/>
                     <a:p>
-                      <a:pPr algn="ctr">
-                        <a:spcAft>
-                          <a:spcPts val="0"/>
-                        </a:spcAft>
-                      </a:pPr>
+                      <a:pPr algn="ctr" fontAlgn="b"/>
                       <a:r>
-                        <a:rPr lang="es-CO" sz="1000" b="1">
+                        <a:rPr lang="es-CO" sz="1100" b="0" i="0" u="none" strike="noStrike">
                           <a:solidFill>
                             <a:srgbClr val="000000"/>
                           </a:solidFill>
                           <a:latin typeface="Calibri"/>
-                          <a:ea typeface="Arial"/>
                         </a:rPr>
-                        <a:t>4,40</a:t>
+                        <a:t>4,73</a:t>
                       </a:r>
-                      <a:endParaRPr lang="es-CO" sz="1000">
-                        <a:solidFill>
-                          <a:srgbClr val="000000"/>
-                        </a:solidFill>
-                        <a:latin typeface="Arial"/>
-                        <a:ea typeface="Arial"/>
-                      </a:endParaRPr>
                     </a:p>
                   </a:txBody>
-                  <a:tcPr marL="53551" marR="53551" marT="17640" marB="17640" anchor="ctr">
+                  <a:tcPr marL="0" marR="0" marT="0" marB="0" anchor="ctr">
                     <a:lnL w="19050" cap="flat" cmpd="sng" algn="ctr">
                       <a:solidFill>
                         <a:srgbClr val="000000"/>
@@ -13957,31 +13365,19 @@
                     <a:bodyPr/>
                     <a:lstStyle/>
                     <a:p>
-                      <a:pPr algn="ctr">
-                        <a:spcAft>
-                          <a:spcPts val="0"/>
-                        </a:spcAft>
-                      </a:pPr>
+                      <a:pPr algn="ctr" fontAlgn="b"/>
                       <a:r>
-                        <a:rPr lang="es-CO" sz="1000" b="1">
+                        <a:rPr lang="es-CO" sz="1100" b="0" i="0" u="none" strike="noStrike">
                           <a:solidFill>
                             <a:srgbClr val="000000"/>
                           </a:solidFill>
                           <a:latin typeface="Calibri"/>
-                          <a:ea typeface="Arial"/>
                         </a:rPr>
                         <a:t>4,65</a:t>
                       </a:r>
-                      <a:endParaRPr lang="es-CO" sz="1000">
-                        <a:solidFill>
-                          <a:srgbClr val="000000"/>
-                        </a:solidFill>
-                        <a:latin typeface="Arial"/>
-                        <a:ea typeface="Arial"/>
-                      </a:endParaRPr>
                     </a:p>
                   </a:txBody>
-                  <a:tcPr marL="53551" marR="53551" marT="17640" marB="17640" anchor="ctr">
+                  <a:tcPr marL="0" marR="0" marT="0" marB="0" anchor="ctr">
                     <a:lnL w="19050" cap="flat" cmpd="sng" algn="ctr">
                       <a:solidFill>
                         <a:srgbClr val="000000"/>
@@ -14028,31 +13424,19 @@
                     <a:bodyPr/>
                     <a:lstStyle/>
                     <a:p>
-                      <a:pPr algn="ctr">
-                        <a:spcAft>
-                          <a:spcPts val="0"/>
-                        </a:spcAft>
-                      </a:pPr>
+                      <a:pPr algn="ctr" fontAlgn="b"/>
                       <a:r>
-                        <a:rPr lang="es-CO" sz="1000" b="1">
+                        <a:rPr lang="es-CO" sz="1100" b="0" i="0" u="none" strike="noStrike">
                           <a:solidFill>
                             <a:srgbClr val="000000"/>
                           </a:solidFill>
                           <a:latin typeface="Calibri"/>
-                          <a:ea typeface="Arial"/>
                         </a:rPr>
-                        <a:t>4,40</a:t>
+                        <a:t>4,70</a:t>
                       </a:r>
-                      <a:endParaRPr lang="es-CO" sz="1000">
-                        <a:solidFill>
-                          <a:srgbClr val="000000"/>
-                        </a:solidFill>
-                        <a:latin typeface="Arial"/>
-                        <a:ea typeface="Arial"/>
-                      </a:endParaRPr>
                     </a:p>
                   </a:txBody>
-                  <a:tcPr marL="53551" marR="53551" marT="17640" marB="17640" anchor="ctr">
+                  <a:tcPr marL="0" marR="0" marT="0" marB="0" anchor="ctr">
                     <a:lnL w="12700" cap="flat" cmpd="sng" algn="ctr">
                       <a:solidFill>
                         <a:srgbClr val="000000"/>
@@ -14099,31 +13483,19 @@
                     <a:bodyPr/>
                     <a:lstStyle/>
                     <a:p>
-                      <a:pPr algn="ctr">
-                        <a:spcAft>
-                          <a:spcPts val="0"/>
-                        </a:spcAft>
-                      </a:pPr>
+                      <a:pPr algn="ctr" fontAlgn="b"/>
                       <a:r>
-                        <a:rPr lang="es-CO" sz="1000" b="1">
+                        <a:rPr lang="es-CO" sz="1100" b="0" i="0" u="none" strike="noStrike">
                           <a:solidFill>
                             <a:srgbClr val="000000"/>
                           </a:solidFill>
                           <a:latin typeface="Calibri"/>
-                          <a:ea typeface="Arial"/>
                         </a:rPr>
-                        <a:t>4,50</a:t>
+                        <a:t>4,75</a:t>
                       </a:r>
-                      <a:endParaRPr lang="es-CO" sz="1000">
-                        <a:solidFill>
-                          <a:srgbClr val="000000"/>
-                        </a:solidFill>
-                        <a:latin typeface="Arial"/>
-                        <a:ea typeface="Arial"/>
-                      </a:endParaRPr>
                     </a:p>
                   </a:txBody>
-                  <a:tcPr marL="53551" marR="53551" marT="17640" marB="17640" anchor="ctr">
+                  <a:tcPr marL="0" marR="0" marT="0" marB="0" anchor="ctr">
                     <a:lnL w="12700" cap="flat" cmpd="sng" algn="ctr">
                       <a:solidFill>
                         <a:srgbClr val="000000"/>
@@ -14170,31 +13542,19 @@
                     <a:bodyPr/>
                     <a:lstStyle/>
                     <a:p>
-                      <a:pPr algn="ctr">
-                        <a:spcAft>
-                          <a:spcPts val="0"/>
-                        </a:spcAft>
-                      </a:pPr>
+                      <a:pPr algn="ctr" fontAlgn="b"/>
                       <a:r>
-                        <a:rPr lang="es-CO" sz="1000" b="1">
+                        <a:rPr lang="es-CO" sz="1100" b="0" i="0" u="none" strike="noStrike">
                           <a:solidFill>
                             <a:srgbClr val="000000"/>
                           </a:solidFill>
                           <a:latin typeface="Calibri"/>
-                          <a:ea typeface="Arial"/>
                         </a:rPr>
-                        <a:t>4,40</a:t>
+                        <a:t>4,60</a:t>
                       </a:r>
-                      <a:endParaRPr lang="es-CO" sz="1000">
-                        <a:solidFill>
-                          <a:srgbClr val="000000"/>
-                        </a:solidFill>
-                        <a:latin typeface="Arial"/>
-                        <a:ea typeface="Arial"/>
-                      </a:endParaRPr>
                     </a:p>
                   </a:txBody>
-                  <a:tcPr marL="53551" marR="53551" marT="17640" marB="17640" anchor="ctr">
+                  <a:tcPr marL="0" marR="0" marT="0" marB="0" anchor="ctr">
                     <a:lnL w="12700" cap="flat" cmpd="sng" algn="ctr">
                       <a:solidFill>
                         <a:srgbClr val="000000"/>
@@ -14241,31 +13601,19 @@
                     <a:bodyPr/>
                     <a:lstStyle/>
                     <a:p>
-                      <a:pPr algn="ctr">
-                        <a:spcAft>
-                          <a:spcPts val="0"/>
-                        </a:spcAft>
-                      </a:pPr>
+                      <a:pPr algn="ctr" fontAlgn="b"/>
                       <a:r>
-                        <a:rPr lang="es-CO" sz="1000" b="1">
+                        <a:rPr lang="es-CO" sz="1100" b="0" i="0" u="none" strike="noStrike">
                           <a:solidFill>
                             <a:srgbClr val="000000"/>
                           </a:solidFill>
                           <a:latin typeface="Calibri"/>
-                          <a:ea typeface="Arial"/>
                         </a:rPr>
                         <a:t>4,85</a:t>
                       </a:r>
-                      <a:endParaRPr lang="es-CO" sz="1000">
-                        <a:solidFill>
-                          <a:srgbClr val="000000"/>
-                        </a:solidFill>
-                        <a:latin typeface="Arial"/>
-                        <a:ea typeface="Arial"/>
-                      </a:endParaRPr>
                     </a:p>
                   </a:txBody>
-                  <a:tcPr marL="53551" marR="53551" marT="17640" marB="17640" anchor="ctr">
+                  <a:tcPr marL="0" marR="0" marT="0" marB="0" anchor="ctr">
                     <a:lnL w="12700" cap="flat" cmpd="sng" algn="ctr">
                       <a:solidFill>
                         <a:srgbClr val="000000"/>
@@ -14312,31 +13660,19 @@
                     <a:bodyPr/>
                     <a:lstStyle/>
                     <a:p>
-                      <a:pPr algn="ctr">
-                        <a:spcAft>
-                          <a:spcPts val="0"/>
-                        </a:spcAft>
-                      </a:pPr>
+                      <a:pPr algn="ctr" fontAlgn="b"/>
                       <a:r>
-                        <a:rPr lang="es-CO" sz="1000" b="1">
+                        <a:rPr lang="es-CO" sz="1100" b="0" i="0" u="none" strike="noStrike">
                           <a:solidFill>
                             <a:srgbClr val="000000"/>
                           </a:solidFill>
                           <a:latin typeface="Calibri"/>
-                          <a:ea typeface="Arial"/>
                         </a:rPr>
                         <a:t>4,95</a:t>
                       </a:r>
-                      <a:endParaRPr lang="es-CO" sz="1000">
-                        <a:solidFill>
-                          <a:srgbClr val="000000"/>
-                        </a:solidFill>
-                        <a:latin typeface="Arial"/>
-                        <a:ea typeface="Arial"/>
-                      </a:endParaRPr>
                     </a:p>
                   </a:txBody>
-                  <a:tcPr marL="53551" marR="53551" marT="17640" marB="17640" anchor="ctr">
+                  <a:tcPr marL="0" marR="0" marT="0" marB="0" anchor="ctr">
                     <a:lnL w="12700" cap="flat" cmpd="sng" algn="ctr">
                       <a:solidFill>
                         <a:srgbClr val="000000"/>
@@ -14383,21 +13719,16 @@
                     <a:bodyPr/>
                     <a:lstStyle/>
                     <a:p>
-                      <a:pPr algn="ctr">
-                        <a:spcAft>
-                          <a:spcPts val="0"/>
-                        </a:spcAft>
-                      </a:pPr>
-                      <a:endParaRPr lang="es-CO" sz="1000" dirty="0">
+                      <a:pPr algn="ctr" fontAlgn="b"/>
+                      <a:endParaRPr lang="es-CO" sz="1100" b="0" i="0" u="none" strike="noStrike" dirty="0">
                         <a:solidFill>
                           <a:srgbClr val="000000"/>
                         </a:solidFill>
                         <a:latin typeface="Calibri"/>
-                        <a:ea typeface="Arial"/>
                       </a:endParaRPr>
                     </a:p>
                   </a:txBody>
-                  <a:tcPr marL="53551" marR="53551" marT="17640" marB="17640" anchor="ctr">
+                  <a:tcPr marL="0" marR="0" marT="0" marB="0" anchor="ctr">
                     <a:lnL w="19050" cap="flat" cmpd="sng" algn="ctr">
                       <a:solidFill>
                         <a:srgbClr val="000000"/>
@@ -14426,6 +13757,22 @@
                 </a:tc>
               </a:tr>
             </a:tbl>
+          </a:graphicData>
+        </a:graphic>
+      </p:graphicFrame>
+      <p:graphicFrame>
+        <p:nvGraphicFramePr>
+          <p:cNvPr id="6" name="2 Gráfico"/>
+          <p:cNvGraphicFramePr/>
+          <p:nvPr/>
+        </p:nvGraphicFramePr>
+        <p:xfrm>
+          <a:off x="304800" y="1600200"/>
+          <a:ext cx="8610600" cy="3352800"/>
+        </p:xfrm>
+        <a:graphic>
+          <a:graphicData uri="http://schemas.openxmlformats.org/drawingml/2006/chart">
+            <c:chart xmlns:c="http://schemas.openxmlformats.org/drawingml/2006/chart" xmlns:r="http://schemas.openxmlformats.org/officeDocument/2006/relationships" r:id="rId3"/>
           </a:graphicData>
         </a:graphic>
       </p:graphicFrame>

</xml_diff>

<commit_message>
Slide con calidad y proceso
</commit_message>
<xml_diff>
--- a/CSOF5101 Ingeniera de Software/TSP/0330PostMortemTSPCiclo3.pptx
+++ b/CSOF5101 Ingeniera de Software/TSP/0330PostMortemTSPCiclo3.pptx
@@ -123,7 +123,8 @@
 
 <file path=ppt/charts/chart1.xml><?xml version="1.0" encoding="utf-8"?>
 <c:chartSpace xmlns:c="http://schemas.openxmlformats.org/drawingml/2006/chart" xmlns:a="http://schemas.openxmlformats.org/drawingml/2006/main" xmlns:r="http://schemas.openxmlformats.org/officeDocument/2006/relationships">
-  <c:lang val="en-US"/>
+  <c:date1904 val="1"/>
+  <c:lang val="es-CO"/>
   <c:chart>
     <c:autoTitleDeleted val="1"/>
     <c:plotArea>
@@ -218,25 +219,25 @@
                   <c:v>0</c:v>
                 </c:pt>
                 <c:pt idx="1">
-                  <c:v>7.1183333333333348E-2</c:v>
+                  <c:v>7.1183333333333362E-2</c:v>
                 </c:pt>
                 <c:pt idx="2">
                   <c:v>0.1423666666666667</c:v>
                 </c:pt>
                 <c:pt idx="3">
-                  <c:v>0.21355000000000005</c:v>
+                  <c:v>0.21355000000000007</c:v>
                 </c:pt>
                 <c:pt idx="4">
-                  <c:v>0.28473333333333328</c:v>
+                  <c:v>0.28473333333333323</c:v>
                 </c:pt>
                 <c:pt idx="5">
-                  <c:v>0.35591666666666677</c:v>
+                  <c:v>0.35591666666666688</c:v>
                 </c:pt>
                 <c:pt idx="6">
-                  <c:v>0.42710000000000004</c:v>
+                  <c:v>0.42710000000000009</c:v>
                 </c:pt>
                 <c:pt idx="7">
-                  <c:v>0.42710000000000004</c:v>
+                  <c:v>0.42710000000000009</c:v>
                 </c:pt>
                 <c:pt idx="8">
                   <c:v>0.50433577235772353</c:v>
@@ -245,7 +246,7 @@
                   <c:v>0.50433577235772353</c:v>
                 </c:pt>
                 <c:pt idx="10">
-                  <c:v>0.62831951219512205</c:v>
+                  <c:v>0.62831951219512217</c:v>
                 </c:pt>
                 <c:pt idx="11">
                   <c:v>0.68523008130081309</c:v>
@@ -254,10 +255,10 @@
                   <c:v>0.69742520325203272</c:v>
                 </c:pt>
                 <c:pt idx="13">
-                  <c:v>0.7157178861788619</c:v>
+                  <c:v>0.71571788617886201</c:v>
                 </c:pt>
                 <c:pt idx="14">
-                  <c:v>0.7157178861788619</c:v>
+                  <c:v>0.71571788617886201</c:v>
                 </c:pt>
                 <c:pt idx="15">
                   <c:v>0.7441731707317073</c:v>
@@ -266,13 +267,13 @@
                   <c:v>0.7441731707317073</c:v>
                 </c:pt>
                 <c:pt idx="17">
-                  <c:v>0.81734390243902444</c:v>
+                  <c:v>0.81734390243902455</c:v>
                 </c:pt>
                 <c:pt idx="18">
-                  <c:v>0.95758780487804862</c:v>
+                  <c:v>0.95758780487804851</c:v>
                 </c:pt>
                 <c:pt idx="19">
-                  <c:v>0.97791300813008131</c:v>
+                  <c:v>0.97791300813008142</c:v>
                 </c:pt>
                 <c:pt idx="20">
                   <c:v>1</c:v>
@@ -369,49 +370,49 @@
                   <c:v>0</c:v>
                 </c:pt>
                 <c:pt idx="1">
-                  <c:v>7.1183333333333348E-2</c:v>
+                  <c:v>7.1183333333333362E-2</c:v>
                 </c:pt>
                 <c:pt idx="2">
                   <c:v>0.1423666666666667</c:v>
                 </c:pt>
                 <c:pt idx="3">
-                  <c:v>0.21355000000000005</c:v>
+                  <c:v>0.21355000000000007</c:v>
                 </c:pt>
                 <c:pt idx="4">
-                  <c:v>0.28473333333333328</c:v>
+                  <c:v>0.28473333333333323</c:v>
                 </c:pt>
                 <c:pt idx="5">
-                  <c:v>0.35591666666666677</c:v>
+                  <c:v>0.35591666666666688</c:v>
                 </c:pt>
                 <c:pt idx="6">
-                  <c:v>0.42710000000000004</c:v>
+                  <c:v>0.42710000000000009</c:v>
                 </c:pt>
                 <c:pt idx="7">
-                  <c:v>0.42710000000000004</c:v>
+                  <c:v>0.42710000000000009</c:v>
                 </c:pt>
                 <c:pt idx="8">
-                  <c:v>0.45555528455284555</c:v>
+                  <c:v>0.45555528455284561</c:v>
                 </c:pt>
                 <c:pt idx="9">
-                  <c:v>0.45555528455284555</c:v>
+                  <c:v>0.45555528455284561</c:v>
                 </c:pt>
                 <c:pt idx="10">
-                  <c:v>0.5856365853658535</c:v>
+                  <c:v>0.58563658536585339</c:v>
                 </c:pt>
                 <c:pt idx="11">
-                  <c:v>0.61002682926829277</c:v>
+                  <c:v>0.61002682926829288</c:v>
                 </c:pt>
                 <c:pt idx="12">
-                  <c:v>0.66896991869918732</c:v>
+                  <c:v>0.66896991869918765</c:v>
                 </c:pt>
                 <c:pt idx="13">
-                  <c:v>0.7157178861788619</c:v>
+                  <c:v>0.71571788617886201</c:v>
                 </c:pt>
                 <c:pt idx="14">
-                  <c:v>0.7157178861788619</c:v>
+                  <c:v>0.71571788617886201</c:v>
                 </c:pt>
                 <c:pt idx="15">
-                  <c:v>0.7157178861788619</c:v>
+                  <c:v>0.71571788617886201</c:v>
                 </c:pt>
                 <c:pt idx="16">
                   <c:v>0.7462056910569107</c:v>
@@ -420,7 +421,7 @@
                   <c:v>0.90677479674796757</c:v>
                 </c:pt>
                 <c:pt idx="18">
-                  <c:v>0.93319756097560969</c:v>
+                  <c:v>0.93319756097560957</c:v>
                 </c:pt>
                 <c:pt idx="19">
                   <c:v>0.96978292682926837</c:v>
@@ -433,11 +434,11 @@
           </c:val>
         </c:ser>
         <c:marker val="1"/>
-        <c:axId val="35962880"/>
-        <c:axId val="35964416"/>
+        <c:axId val="74641792"/>
+        <c:axId val="76633600"/>
       </c:lineChart>
       <c:catAx>
-        <c:axId val="35962880"/>
+        <c:axId val="74641792"/>
         <c:scaling>
           <c:orientation val="minMax"/>
         </c:scaling>
@@ -445,14 +446,14 @@
         <c:numFmt formatCode="General" sourceLinked="1"/>
         <c:majorTickMark val="none"/>
         <c:tickLblPos val="nextTo"/>
-        <c:crossAx val="35964416"/>
+        <c:crossAx val="76633600"/>
         <c:crosses val="autoZero"/>
         <c:auto val="1"/>
         <c:lblAlgn val="ctr"/>
         <c:lblOffset val="100"/>
       </c:catAx>
       <c:valAx>
-        <c:axId val="35964416"/>
+        <c:axId val="76633600"/>
         <c:scaling>
           <c:orientation val="minMax"/>
         </c:scaling>
@@ -479,7 +480,7 @@
         <c:numFmt formatCode="0.0%" sourceLinked="1"/>
         <c:majorTickMark val="none"/>
         <c:tickLblPos val="nextTo"/>
-        <c:crossAx val="35962880"/>
+        <c:crossAx val="74641792"/>
         <c:crosses val="autoZero"/>
         <c:crossBetween val="between"/>
       </c:valAx>
@@ -498,7 +499,7 @@
 
 <file path=ppt/charts/chart2.xml><?xml version="1.0" encoding="utf-8"?>
 <c:chartSpace xmlns:c="http://schemas.openxmlformats.org/drawingml/2006/chart" xmlns:a="http://schemas.openxmlformats.org/drawingml/2006/main" xmlns:r="http://schemas.openxmlformats.org/officeDocument/2006/relationships">
-  <c:lang val="en-US"/>
+  <c:lang val="es-CO"/>
   <c:style val="34"/>
   <c:chart>
     <c:title>
@@ -796,11 +797,11 @@
             </c:numRef>
           </c:val>
         </c:ser>
-        <c:axId val="36593664"/>
-        <c:axId val="36595584"/>
+        <c:axId val="80432128"/>
+        <c:axId val="80549376"/>
       </c:barChart>
       <c:catAx>
-        <c:axId val="36593664"/>
+        <c:axId val="80432128"/>
         <c:scaling>
           <c:orientation val="minMax"/>
         </c:scaling>
@@ -825,14 +826,14 @@
         </c:title>
         <c:numFmt formatCode="General" sourceLinked="1"/>
         <c:tickLblPos val="nextTo"/>
-        <c:crossAx val="36595584"/>
+        <c:crossAx val="80549376"/>
         <c:crosses val="autoZero"/>
         <c:auto val="1"/>
         <c:lblAlgn val="ctr"/>
         <c:lblOffset val="100"/>
       </c:catAx>
       <c:valAx>
-        <c:axId val="36595584"/>
+        <c:axId val="80549376"/>
         <c:scaling>
           <c:orientation val="minMax"/>
           <c:max val="5"/>
@@ -860,7 +861,7 @@
         </c:title>
         <c:numFmt formatCode="0.00" sourceLinked="1"/>
         <c:tickLblPos val="nextTo"/>
-        <c:crossAx val="36593664"/>
+        <c:crossAx val="80432128"/>
         <c:crosses val="autoZero"/>
         <c:crossBetween val="between"/>
       </c:valAx>
@@ -2081,6 +2082,353 @@
       <dsp:cNvGrpSpPr/>
     </dsp:nvGrpSpPr>
     <dsp:grpSpPr/>
+    <dsp:sp modelId="{53B78E65-C7F0-4BC6-BB4D-B597B7CEED7F}">
+      <dsp:nvSpPr>
+        <dsp:cNvPr id="0" name=""/>
+        <dsp:cNvSpPr/>
+      </dsp:nvSpPr>
+      <dsp:spPr>
+        <a:xfrm>
+          <a:off x="617219" y="0"/>
+          <a:ext cx="6995160" cy="4625975"/>
+        </a:xfrm>
+        <a:prstGeom prst="rightArrow">
+          <a:avLst/>
+        </a:prstGeom>
+        <a:solidFill>
+          <a:schemeClr val="accent2">
+            <a:tint val="40000"/>
+            <a:hueOff val="0"/>
+            <a:satOff val="0"/>
+            <a:lumOff val="0"/>
+            <a:alphaOff val="0"/>
+          </a:schemeClr>
+        </a:solidFill>
+        <a:ln>
+          <a:noFill/>
+        </a:ln>
+        <a:effectLst/>
+      </dsp:spPr>
+      <dsp:style>
+        <a:lnRef idx="0">
+          <a:scrgbClr r="0" g="0" b="0"/>
+        </a:lnRef>
+        <a:fillRef idx="1">
+          <a:scrgbClr r="0" g="0" b="0"/>
+        </a:fillRef>
+        <a:effectRef idx="0">
+          <a:scrgbClr r="0" g="0" b="0"/>
+        </a:effectRef>
+        <a:fontRef idx="minor"/>
+      </dsp:style>
+    </dsp:sp>
+    <dsp:sp modelId="{704390C2-2794-4AB4-A69C-F2CCD078B61A}">
+      <dsp:nvSpPr>
+        <dsp:cNvPr id="0" name=""/>
+        <dsp:cNvSpPr/>
+      </dsp:nvSpPr>
+      <dsp:spPr>
+        <a:xfrm>
+          <a:off x="4118" y="1387792"/>
+          <a:ext cx="1981051" cy="1850390"/>
+        </a:xfrm>
+        <a:prstGeom prst="roundRect">
+          <a:avLst/>
+        </a:prstGeom>
+        <a:solidFill>
+          <a:schemeClr val="accent2">
+            <a:hueOff val="0"/>
+            <a:satOff val="0"/>
+            <a:lumOff val="0"/>
+            <a:alphaOff val="0"/>
+          </a:schemeClr>
+        </a:solidFill>
+        <a:ln w="48000" cap="flat" cmpd="thickThin" algn="ctr">
+          <a:solidFill>
+            <a:schemeClr val="lt1">
+              <a:hueOff val="0"/>
+              <a:satOff val="0"/>
+              <a:lumOff val="0"/>
+              <a:alphaOff val="0"/>
+            </a:schemeClr>
+          </a:solidFill>
+          <a:prstDash val="solid"/>
+        </a:ln>
+        <a:effectLst/>
+      </dsp:spPr>
+      <dsp:style>
+        <a:lnRef idx="2">
+          <a:scrgbClr r="0" g="0" b="0"/>
+        </a:lnRef>
+        <a:fillRef idx="1">
+          <a:scrgbClr r="0" g="0" b="0"/>
+        </a:fillRef>
+        <a:effectRef idx="0">
+          <a:scrgbClr r="0" g="0" b="0"/>
+        </a:effectRef>
+        <a:fontRef idx="minor">
+          <a:schemeClr val="lt1"/>
+        </a:fontRef>
+      </dsp:style>
+      <dsp:txBody>
+        <a:bodyPr spcFirstLastPara="0" vert="horz" wrap="square" lIns="68580" tIns="68580" rIns="68580" bIns="68580" numCol="1" spcCol="1270" anchor="ctr" anchorCtr="0">
+          <a:noAutofit/>
+        </a:bodyPr>
+        <a:lstStyle/>
+        <a:p>
+          <a:pPr lvl="0" algn="ctr" defTabSz="800100">
+            <a:lnSpc>
+              <a:spcPct val="90000"/>
+            </a:lnSpc>
+            <a:spcBef>
+              <a:spcPct val="0"/>
+            </a:spcBef>
+            <a:spcAft>
+              <a:spcPct val="35000"/>
+            </a:spcAft>
+          </a:pPr>
+          <a:r>
+            <a:rPr lang="es-ES" sz="1800" kern="1200" dirty="0" smtClean="0"/>
+            <a:t>Se debe dejar mejor el proceso de calidad</a:t>
+          </a:r>
+        </a:p>
+      </dsp:txBody>
+      <dsp:txXfrm>
+        <a:off x="4118" y="1387792"/>
+        <a:ext cx="1981051" cy="1850390"/>
+      </dsp:txXfrm>
+    </dsp:sp>
+    <dsp:sp modelId="{12C09DCA-0C10-48D0-8766-4808AA9061E1}">
+      <dsp:nvSpPr>
+        <dsp:cNvPr id="0" name=""/>
+        <dsp:cNvSpPr/>
+      </dsp:nvSpPr>
+      <dsp:spPr>
+        <a:xfrm>
+          <a:off x="2084222" y="1387792"/>
+          <a:ext cx="1981051" cy="1850390"/>
+        </a:xfrm>
+        <a:prstGeom prst="roundRect">
+          <a:avLst/>
+        </a:prstGeom>
+        <a:solidFill>
+          <a:schemeClr val="accent3">
+            <a:hueOff val="0"/>
+            <a:satOff val="0"/>
+            <a:lumOff val="0"/>
+            <a:alphaOff val="0"/>
+          </a:schemeClr>
+        </a:solidFill>
+        <a:ln w="48000" cap="flat" cmpd="thickThin" algn="ctr">
+          <a:solidFill>
+            <a:schemeClr val="lt1">
+              <a:hueOff val="0"/>
+              <a:satOff val="0"/>
+              <a:lumOff val="0"/>
+              <a:alphaOff val="0"/>
+            </a:schemeClr>
+          </a:solidFill>
+          <a:prstDash val="solid"/>
+        </a:ln>
+        <a:effectLst/>
+      </dsp:spPr>
+      <dsp:style>
+        <a:lnRef idx="2">
+          <a:scrgbClr r="0" g="0" b="0"/>
+        </a:lnRef>
+        <a:fillRef idx="1">
+          <a:scrgbClr r="0" g="0" b="0"/>
+        </a:fillRef>
+        <a:effectRef idx="0">
+          <a:scrgbClr r="0" g="0" b="0"/>
+        </a:effectRef>
+        <a:fontRef idx="minor">
+          <a:schemeClr val="lt1"/>
+        </a:fontRef>
+      </dsp:style>
+      <dsp:txBody>
+        <a:bodyPr spcFirstLastPara="0" vert="horz" wrap="square" lIns="68580" tIns="68580" rIns="68580" bIns="68580" numCol="1" spcCol="1270" anchor="ctr" anchorCtr="0">
+          <a:noAutofit/>
+        </a:bodyPr>
+        <a:lstStyle/>
+        <a:p>
+          <a:pPr lvl="0" algn="ctr" defTabSz="800100">
+            <a:lnSpc>
+              <a:spcPct val="90000"/>
+            </a:lnSpc>
+            <a:spcBef>
+              <a:spcPct val="0"/>
+            </a:spcBef>
+            <a:spcAft>
+              <a:spcPct val="35000"/>
+            </a:spcAft>
+          </a:pPr>
+          <a:r>
+            <a:rPr lang="es-ES" sz="1800" kern="1200" dirty="0" smtClean="0"/>
+            <a:t>Se deben ajustar los horarios de del equipo</a:t>
+          </a:r>
+          <a:endParaRPr lang="en-US" sz="1800" kern="1200" dirty="0"/>
+        </a:p>
+      </dsp:txBody>
+      <dsp:txXfrm>
+        <a:off x="2084222" y="1387792"/>
+        <a:ext cx="1981051" cy="1850390"/>
+      </dsp:txXfrm>
+    </dsp:sp>
+    <dsp:sp modelId="{042A50B7-8882-4B38-9503-8850A051F634}">
+      <dsp:nvSpPr>
+        <dsp:cNvPr id="0" name=""/>
+        <dsp:cNvSpPr/>
+      </dsp:nvSpPr>
+      <dsp:spPr>
+        <a:xfrm>
+          <a:off x="4164326" y="1387792"/>
+          <a:ext cx="1981051" cy="1850390"/>
+        </a:xfrm>
+        <a:prstGeom prst="roundRect">
+          <a:avLst/>
+        </a:prstGeom>
+        <a:solidFill>
+          <a:schemeClr val="accent4">
+            <a:hueOff val="0"/>
+            <a:satOff val="0"/>
+            <a:lumOff val="0"/>
+            <a:alphaOff val="0"/>
+          </a:schemeClr>
+        </a:solidFill>
+        <a:ln w="48000" cap="flat" cmpd="thickThin" algn="ctr">
+          <a:solidFill>
+            <a:schemeClr val="lt1">
+              <a:hueOff val="0"/>
+              <a:satOff val="0"/>
+              <a:lumOff val="0"/>
+              <a:alphaOff val="0"/>
+            </a:schemeClr>
+          </a:solidFill>
+          <a:prstDash val="solid"/>
+        </a:ln>
+        <a:effectLst/>
+      </dsp:spPr>
+      <dsp:style>
+        <a:lnRef idx="2">
+          <a:scrgbClr r="0" g="0" b="0"/>
+        </a:lnRef>
+        <a:fillRef idx="1">
+          <a:scrgbClr r="0" g="0" b="0"/>
+        </a:fillRef>
+        <a:effectRef idx="0">
+          <a:scrgbClr r="0" g="0" b="0"/>
+        </a:effectRef>
+        <a:fontRef idx="minor">
+          <a:schemeClr val="lt1"/>
+        </a:fontRef>
+      </dsp:style>
+      <dsp:txBody>
+        <a:bodyPr spcFirstLastPara="0" vert="horz" wrap="square" lIns="68580" tIns="68580" rIns="68580" bIns="68580" numCol="1" spcCol="1270" anchor="ctr" anchorCtr="0">
+          <a:noAutofit/>
+        </a:bodyPr>
+        <a:lstStyle/>
+        <a:p>
+          <a:pPr lvl="0" algn="ctr" defTabSz="800100">
+            <a:lnSpc>
+              <a:spcPct val="90000"/>
+            </a:lnSpc>
+            <a:spcBef>
+              <a:spcPct val="0"/>
+            </a:spcBef>
+            <a:spcAft>
+              <a:spcPct val="35000"/>
+            </a:spcAft>
+          </a:pPr>
+          <a:r>
+            <a:rPr lang="es-ES" sz="1800" kern="1200" dirty="0" smtClean="0"/>
+            <a:t>Realizar la distribución de la carga de trabajo junto a todo el equipo</a:t>
+          </a:r>
+          <a:endParaRPr lang="en-US" sz="1800" kern="1200" dirty="0"/>
+        </a:p>
+      </dsp:txBody>
+      <dsp:txXfrm>
+        <a:off x="4164326" y="1387792"/>
+        <a:ext cx="1981051" cy="1850390"/>
+      </dsp:txXfrm>
+    </dsp:sp>
+    <dsp:sp modelId="{CD51EEBA-09BF-47BE-A858-BF3B2C14C858}">
+      <dsp:nvSpPr>
+        <dsp:cNvPr id="0" name=""/>
+        <dsp:cNvSpPr/>
+      </dsp:nvSpPr>
+      <dsp:spPr>
+        <a:xfrm>
+          <a:off x="6244430" y="1387792"/>
+          <a:ext cx="1981051" cy="1850390"/>
+        </a:xfrm>
+        <a:prstGeom prst="roundRect">
+          <a:avLst/>
+        </a:prstGeom>
+        <a:solidFill>
+          <a:schemeClr val="accent5">
+            <a:hueOff val="0"/>
+            <a:satOff val="0"/>
+            <a:lumOff val="0"/>
+            <a:alphaOff val="0"/>
+          </a:schemeClr>
+        </a:solidFill>
+        <a:ln w="48000" cap="flat" cmpd="thickThin" algn="ctr">
+          <a:solidFill>
+            <a:schemeClr val="lt1">
+              <a:hueOff val="0"/>
+              <a:satOff val="0"/>
+              <a:lumOff val="0"/>
+              <a:alphaOff val="0"/>
+            </a:schemeClr>
+          </a:solidFill>
+          <a:prstDash val="solid"/>
+        </a:ln>
+        <a:effectLst/>
+      </dsp:spPr>
+      <dsp:style>
+        <a:lnRef idx="2">
+          <a:scrgbClr r="0" g="0" b="0"/>
+        </a:lnRef>
+        <a:fillRef idx="1">
+          <a:scrgbClr r="0" g="0" b="0"/>
+        </a:fillRef>
+        <a:effectRef idx="0">
+          <a:scrgbClr r="0" g="0" b="0"/>
+        </a:effectRef>
+        <a:fontRef idx="minor">
+          <a:schemeClr val="lt1"/>
+        </a:fontRef>
+      </dsp:style>
+      <dsp:txBody>
+        <a:bodyPr spcFirstLastPara="0" vert="horz" wrap="square" lIns="68580" tIns="68580" rIns="68580" bIns="68580" numCol="1" spcCol="1270" anchor="ctr" anchorCtr="0">
+          <a:noAutofit/>
+        </a:bodyPr>
+        <a:lstStyle/>
+        <a:p>
+          <a:pPr lvl="0" algn="ctr" defTabSz="800100">
+            <a:lnSpc>
+              <a:spcPct val="90000"/>
+            </a:lnSpc>
+            <a:spcBef>
+              <a:spcPct val="0"/>
+            </a:spcBef>
+            <a:spcAft>
+              <a:spcPct val="35000"/>
+            </a:spcAft>
+          </a:pPr>
+          <a:r>
+            <a:rPr lang="es-CO" sz="1800" kern="1200" dirty="0" smtClean="0"/>
+            <a:t>Dedicar mas tiempo a la planeación para tener una ejecución mas ordenada</a:t>
+          </a:r>
+          <a:endParaRPr lang="en-US" sz="1800" kern="1200" dirty="0"/>
+        </a:p>
+      </dsp:txBody>
+      <dsp:txXfrm>
+        <a:off x="6244430" y="1387792"/>
+        <a:ext cx="1981051" cy="1850390"/>
+      </dsp:txXfrm>
+    </dsp:sp>
   </dsp:spTree>
 </dsp:drawing>
 </file>
@@ -7767,6 +8115,258 @@
           </a:prstGeom>
         </p:spPr>
       </p:pic>
+      <p:sp>
+        <p:nvSpPr>
+          <p:cNvPr id="5" name="4 CuadroTexto"/>
+          <p:cNvSpPr txBox="1"/>
+          <p:nvPr/>
+        </p:nvSpPr>
+        <p:spPr>
+          <a:xfrm>
+            <a:off x="304800" y="1981200"/>
+            <a:ext cx="8534400" cy="4062651"/>
+          </a:xfrm>
+          <a:prstGeom prst="rect">
+            <a:avLst/>
+          </a:prstGeom>
+          <a:noFill/>
+        </p:spPr>
+        <p:txBody>
+          <a:bodyPr wrap="square" rtlCol="0">
+            <a:spAutoFit/>
+          </a:bodyPr>
+          <a:lstStyle/>
+          <a:p>
+            <a:pPr lvl="0">
+              <a:lnSpc>
+                <a:spcPct val="150000"/>
+              </a:lnSpc>
+            </a:pPr>
+            <a:r>
+              <a:rPr lang="es-CO" sz="1200" b="1" dirty="0" smtClean="0"/>
+              <a:t>Objetivos: </a:t>
+            </a:r>
+          </a:p>
+          <a:p>
+            <a:pPr>
+              <a:lnSpc>
+                <a:spcPct val="150000"/>
+              </a:lnSpc>
+              <a:buFont typeface="Arial" pitchFamily="34" charset="0"/>
+              <a:buChar char="•"/>
+            </a:pPr>
+            <a:r>
+              <a:rPr lang="es-CO" sz="1200" b="1" dirty="0" smtClean="0"/>
+              <a:t>O1 </a:t>
+            </a:r>
+            <a:r>
+              <a:rPr lang="es-CO" sz="1200" dirty="0" smtClean="0"/>
+              <a:t>T</a:t>
+            </a:r>
+            <a:r>
+              <a:rPr lang="es-CO" sz="1200" dirty="0" smtClean="0"/>
+              <a:t>odos </a:t>
+            </a:r>
+            <a:r>
+              <a:rPr lang="es-CO" sz="1200" dirty="0" smtClean="0"/>
+              <a:t>los miembros reportan los datos de las actividades con </a:t>
+            </a:r>
+            <a:r>
+              <a:rPr lang="es-CO" sz="1200" dirty="0" smtClean="0"/>
+              <a:t>exactitud.</a:t>
+            </a:r>
+          </a:p>
+          <a:p>
+            <a:pPr lvl="1">
+              <a:lnSpc>
+                <a:spcPct val="150000"/>
+              </a:lnSpc>
+              <a:buFont typeface="Arial" pitchFamily="34" charset="0"/>
+              <a:buChar char="•"/>
+            </a:pPr>
+            <a:r>
+              <a:rPr lang="es-CO" sz="1200" dirty="0" smtClean="0"/>
+              <a:t>M1: Reportar el 100%  de las tareas realizadas</a:t>
+            </a:r>
+          </a:p>
+          <a:p>
+            <a:pPr>
+              <a:lnSpc>
+                <a:spcPct val="150000"/>
+              </a:lnSpc>
+              <a:buFont typeface="Arial" pitchFamily="34" charset="0"/>
+              <a:buChar char="•"/>
+            </a:pPr>
+            <a:r>
+              <a:rPr lang="es-CO" sz="1200" b="1" dirty="0" smtClean="0"/>
+              <a:t>O2 </a:t>
+            </a:r>
+            <a:r>
+              <a:rPr lang="es-CO" sz="1200" dirty="0" smtClean="0"/>
+              <a:t>El </a:t>
+            </a:r>
+            <a:r>
+              <a:rPr lang="es-CO" sz="1200" dirty="0" smtClean="0"/>
+              <a:t>equipo sigue el </a:t>
+            </a:r>
+            <a:r>
+              <a:rPr lang="es-CO" sz="1200" dirty="0" err="1" smtClean="0"/>
+              <a:t>TSPi</a:t>
+            </a:r>
+            <a:r>
+              <a:rPr lang="es-CO" sz="1200" dirty="0" smtClean="0"/>
+              <a:t> y produce un plan de </a:t>
+            </a:r>
+            <a:r>
+              <a:rPr lang="es-CO" sz="1200" dirty="0" smtClean="0"/>
+              <a:t>cualidad.</a:t>
+            </a:r>
+          </a:p>
+          <a:p>
+            <a:pPr marL="457200" lvl="2">
+              <a:lnSpc>
+                <a:spcPct val="150000"/>
+              </a:lnSpc>
+              <a:buFont typeface="Arial" pitchFamily="34" charset="0"/>
+              <a:buChar char="•"/>
+            </a:pPr>
+            <a:r>
+              <a:rPr lang="es-CO" sz="1200" dirty="0" smtClean="0"/>
+              <a:t>M2:Cumplir con las reglas , horarios y tareas en mas del 90%  y producir el plan de calidad</a:t>
+            </a:r>
+            <a:endParaRPr lang="es-CO" sz="1200" dirty="0" smtClean="0"/>
+          </a:p>
+          <a:p>
+            <a:pPr>
+              <a:lnSpc>
+                <a:spcPct val="150000"/>
+              </a:lnSpc>
+              <a:buFont typeface="Arial" pitchFamily="34" charset="0"/>
+              <a:buChar char="•"/>
+            </a:pPr>
+            <a:r>
+              <a:rPr lang="es-CO" sz="1200" b="1" dirty="0" smtClean="0"/>
+              <a:t>O3</a:t>
+            </a:r>
+            <a:r>
+              <a:rPr lang="es-CO" sz="1200" dirty="0" smtClean="0"/>
+              <a:t>Todo </a:t>
+            </a:r>
+            <a:r>
+              <a:rPr lang="es-CO" sz="1200" dirty="0" smtClean="0"/>
+              <a:t>el equipo de inspección son correctamente moderado y </a:t>
+            </a:r>
+            <a:r>
+              <a:rPr lang="es-CO" sz="1200" dirty="0" smtClean="0"/>
+              <a:t>reportado.</a:t>
+            </a:r>
+          </a:p>
+          <a:p>
+            <a:pPr marL="457200" lvl="3">
+              <a:lnSpc>
+                <a:spcPct val="150000"/>
+              </a:lnSpc>
+              <a:buFont typeface="Arial" pitchFamily="34" charset="0"/>
+              <a:buChar char="•"/>
+            </a:pPr>
+            <a:r>
+              <a:rPr lang="es-CO" sz="1200" dirty="0" smtClean="0"/>
+              <a:t>M3:Reportar el 70% de los defectos en codificación y que el resultado sea confiable.</a:t>
+            </a:r>
+            <a:r>
+              <a:rPr lang="es-CO" sz="1200" b="1" dirty="0" smtClean="0"/>
+              <a:t> </a:t>
+            </a:r>
+            <a:endParaRPr lang="es-CO" sz="1200" b="1" dirty="0" smtClean="0"/>
+          </a:p>
+          <a:p>
+            <a:pPr marL="457200" lvl="3">
+              <a:lnSpc>
+                <a:spcPct val="150000"/>
+              </a:lnSpc>
+              <a:buFont typeface="Arial" pitchFamily="34" charset="0"/>
+              <a:buChar char="•"/>
+            </a:pPr>
+            <a:endParaRPr lang="es-CO" sz="1200" dirty="0" smtClean="0"/>
+          </a:p>
+          <a:p>
+            <a:pPr lvl="0">
+              <a:lnSpc>
+                <a:spcPct val="150000"/>
+              </a:lnSpc>
+            </a:pPr>
+            <a:r>
+              <a:rPr lang="es-CO" sz="1200" b="1" dirty="0" smtClean="0"/>
+              <a:t>Resultados:</a:t>
+            </a:r>
+          </a:p>
+          <a:p>
+            <a:pPr>
+              <a:lnSpc>
+                <a:spcPct val="150000"/>
+              </a:lnSpc>
+              <a:buFont typeface="Arial" pitchFamily="34" charset="0"/>
+              <a:buChar char="•"/>
+            </a:pPr>
+            <a:r>
+              <a:rPr lang="es-CO" sz="1200" b="1" dirty="0" smtClean="0"/>
+              <a:t>R1 </a:t>
+            </a:r>
+            <a:r>
+              <a:rPr lang="es-CO" sz="1200" dirty="0" smtClean="0"/>
+              <a:t>Se reportaron el 100% de las tareas realizadas</a:t>
+            </a:r>
+            <a:endParaRPr lang="es-CO" sz="1200" dirty="0" smtClean="0"/>
+          </a:p>
+          <a:p>
+            <a:pPr>
+              <a:lnSpc>
+                <a:spcPct val="150000"/>
+              </a:lnSpc>
+              <a:buFont typeface="Arial" pitchFamily="34" charset="0"/>
+              <a:buChar char="•"/>
+            </a:pPr>
+            <a:r>
+              <a:rPr lang="es-CO" sz="1200" b="1" dirty="0" smtClean="0"/>
+              <a:t>R2 </a:t>
+            </a:r>
+            <a:r>
+              <a:rPr lang="es-CO" sz="1200" dirty="0" smtClean="0"/>
+              <a:t>Se produjo el plan de calidad y se cumplieron con las tareas , reglas y horarios en mas de 90 %</a:t>
+            </a:r>
+            <a:endParaRPr lang="es-CO" sz="1200" dirty="0" smtClean="0"/>
+          </a:p>
+          <a:p>
+            <a:pPr>
+              <a:lnSpc>
+                <a:spcPct val="150000"/>
+              </a:lnSpc>
+              <a:buFont typeface="Arial" pitchFamily="34" charset="0"/>
+              <a:buChar char="•"/>
+            </a:pPr>
+            <a:r>
+              <a:rPr lang="es-CO" sz="1200" b="1" dirty="0" smtClean="0"/>
+              <a:t>R3 </a:t>
+            </a:r>
+            <a:r>
+              <a:rPr lang="es-CO" sz="1200" dirty="0" smtClean="0"/>
+              <a:t>Se reporto mas de l 70 %  de los defectos planeado para la inspección, pero el reporte no es confiable porque las coincidencias de defectos entre los inspectores no alcanzo el 70%</a:t>
+            </a:r>
+          </a:p>
+          <a:p>
+            <a:pPr lvl="0"/>
+            <a:endParaRPr lang="es-CO" sz="1200" b="1" dirty="0" smtClean="0"/>
+          </a:p>
+          <a:p>
+            <a:pPr lvl="0"/>
+            <a:r>
+              <a:rPr lang="en-US" sz="1200" b="1" dirty="0" smtClean="0"/>
+              <a:t>	</a:t>
+            </a:r>
+            <a:endParaRPr lang="es-CO" sz="1200" b="1" dirty="0" smtClean="0"/>
+          </a:p>
+        </p:txBody>
+      </p:sp>
     </p:spTree>
   </p:cSld>
   <p:clrMapOvr>

</xml_diff>

<commit_message>
Ajuste de la presentacion
</commit_message>
<xml_diff>
--- a/CSOF5101 Ingeniera de Software/TSP/0330PostMortemTSPCiclo3.pptx
+++ b/CSOF5101 Ingeniera de Software/TSP/0330PostMortemTSPCiclo3.pptx
@@ -11,15 +11,17 @@
     <p:sldId id="292" r:id="rId5"/>
     <p:sldId id="275" r:id="rId6"/>
     <p:sldId id="263" r:id="rId7"/>
-    <p:sldId id="283" r:id="rId8"/>
-    <p:sldId id="281" r:id="rId9"/>
-    <p:sldId id="286" r:id="rId10"/>
-    <p:sldId id="287" r:id="rId11"/>
-    <p:sldId id="288" r:id="rId12"/>
-    <p:sldId id="278" r:id="rId13"/>
-    <p:sldId id="285" r:id="rId14"/>
-    <p:sldId id="289" r:id="rId15"/>
-    <p:sldId id="261" r:id="rId16"/>
+    <p:sldId id="294" r:id="rId8"/>
+    <p:sldId id="293" r:id="rId9"/>
+    <p:sldId id="283" r:id="rId10"/>
+    <p:sldId id="281" r:id="rId11"/>
+    <p:sldId id="286" r:id="rId12"/>
+    <p:sldId id="287" r:id="rId13"/>
+    <p:sldId id="288" r:id="rId14"/>
+    <p:sldId id="278" r:id="rId15"/>
+    <p:sldId id="285" r:id="rId16"/>
+    <p:sldId id="289" r:id="rId17"/>
+    <p:sldId id="261" r:id="rId18"/>
   </p:sldIdLst>
   <p:sldSz cx="9144000" cy="6858000" type="screen4x3"/>
   <p:notesSz cx="6858000" cy="9144000"/>
@@ -219,25 +221,25 @@
                   <c:v>0</c:v>
                 </c:pt>
                 <c:pt idx="1">
-                  <c:v>7.1183333333333362E-2</c:v>
+                  <c:v>7.1183333333333376E-2</c:v>
                 </c:pt>
                 <c:pt idx="2">
                   <c:v>0.1423666666666667</c:v>
                 </c:pt>
                 <c:pt idx="3">
-                  <c:v>0.21355000000000007</c:v>
+                  <c:v>0.2135500000000001</c:v>
                 </c:pt>
                 <c:pt idx="4">
                   <c:v>0.28473333333333323</c:v>
                 </c:pt>
                 <c:pt idx="5">
-                  <c:v>0.35591666666666688</c:v>
+                  <c:v>0.35591666666666694</c:v>
                 </c:pt>
                 <c:pt idx="6">
-                  <c:v>0.42710000000000009</c:v>
+                  <c:v>0.42710000000000015</c:v>
                 </c:pt>
                 <c:pt idx="7">
-                  <c:v>0.42710000000000009</c:v>
+                  <c:v>0.42710000000000015</c:v>
                 </c:pt>
                 <c:pt idx="8">
                   <c:v>0.50433577235772353</c:v>
@@ -246,19 +248,19 @@
                   <c:v>0.50433577235772353</c:v>
                 </c:pt>
                 <c:pt idx="10">
-                  <c:v>0.62831951219512217</c:v>
+                  <c:v>0.62831951219512239</c:v>
                 </c:pt>
                 <c:pt idx="11">
-                  <c:v>0.68523008130081309</c:v>
+                  <c:v>0.6852300813008132</c:v>
                 </c:pt>
                 <c:pt idx="12">
-                  <c:v>0.69742520325203272</c:v>
+                  <c:v>0.69742520325203283</c:v>
                 </c:pt>
                 <c:pt idx="13">
-                  <c:v>0.71571788617886201</c:v>
+                  <c:v>0.71571788617886212</c:v>
                 </c:pt>
                 <c:pt idx="14">
-                  <c:v>0.71571788617886201</c:v>
+                  <c:v>0.71571788617886212</c:v>
                 </c:pt>
                 <c:pt idx="15">
                   <c:v>0.7441731707317073</c:v>
@@ -267,7 +269,7 @@
                   <c:v>0.7441731707317073</c:v>
                 </c:pt>
                 <c:pt idx="17">
-                  <c:v>0.81734390243902455</c:v>
+                  <c:v>0.81734390243902466</c:v>
                 </c:pt>
                 <c:pt idx="18">
                   <c:v>0.95758780487804851</c:v>
@@ -370,49 +372,49 @@
                   <c:v>0</c:v>
                 </c:pt>
                 <c:pt idx="1">
-                  <c:v>7.1183333333333362E-2</c:v>
+                  <c:v>7.1183333333333376E-2</c:v>
                 </c:pt>
                 <c:pt idx="2">
                   <c:v>0.1423666666666667</c:v>
                 </c:pt>
                 <c:pt idx="3">
-                  <c:v>0.21355000000000007</c:v>
+                  <c:v>0.2135500000000001</c:v>
                 </c:pt>
                 <c:pt idx="4">
                   <c:v>0.28473333333333323</c:v>
                 </c:pt>
                 <c:pt idx="5">
-                  <c:v>0.35591666666666688</c:v>
+                  <c:v>0.35591666666666694</c:v>
                 </c:pt>
                 <c:pt idx="6">
-                  <c:v>0.42710000000000009</c:v>
+                  <c:v>0.42710000000000015</c:v>
                 </c:pt>
                 <c:pt idx="7">
-                  <c:v>0.42710000000000009</c:v>
+                  <c:v>0.42710000000000015</c:v>
                 </c:pt>
                 <c:pt idx="8">
-                  <c:v>0.45555528455284561</c:v>
+                  <c:v>0.45555528455284566</c:v>
                 </c:pt>
                 <c:pt idx="9">
-                  <c:v>0.45555528455284561</c:v>
+                  <c:v>0.45555528455284566</c:v>
                 </c:pt>
                 <c:pt idx="10">
                   <c:v>0.58563658536585339</c:v>
                 </c:pt>
                 <c:pt idx="11">
-                  <c:v>0.61002682926829288</c:v>
+                  <c:v>0.61002682926829299</c:v>
                 </c:pt>
                 <c:pt idx="12">
-                  <c:v>0.66896991869918765</c:v>
+                  <c:v>0.66896991869918787</c:v>
                 </c:pt>
                 <c:pt idx="13">
-                  <c:v>0.71571788617886201</c:v>
+                  <c:v>0.71571788617886212</c:v>
                 </c:pt>
                 <c:pt idx="14">
-                  <c:v>0.71571788617886201</c:v>
+                  <c:v>0.71571788617886212</c:v>
                 </c:pt>
                 <c:pt idx="15">
-                  <c:v>0.71571788617886201</c:v>
+                  <c:v>0.71571788617886212</c:v>
                 </c:pt>
                 <c:pt idx="16">
                   <c:v>0.7462056910569107</c:v>
@@ -434,11 +436,11 @@
           </c:val>
         </c:ser>
         <c:marker val="1"/>
-        <c:axId val="74641792"/>
-        <c:axId val="76633600"/>
+        <c:axId val="65088128"/>
+        <c:axId val="65110400"/>
       </c:lineChart>
       <c:catAx>
-        <c:axId val="74641792"/>
+        <c:axId val="65088128"/>
         <c:scaling>
           <c:orientation val="minMax"/>
         </c:scaling>
@@ -446,14 +448,14 @@
         <c:numFmt formatCode="General" sourceLinked="1"/>
         <c:majorTickMark val="none"/>
         <c:tickLblPos val="nextTo"/>
-        <c:crossAx val="76633600"/>
+        <c:crossAx val="65110400"/>
         <c:crosses val="autoZero"/>
         <c:auto val="1"/>
         <c:lblAlgn val="ctr"/>
         <c:lblOffset val="100"/>
       </c:catAx>
       <c:valAx>
-        <c:axId val="76633600"/>
+        <c:axId val="65110400"/>
         <c:scaling>
           <c:orientation val="minMax"/>
         </c:scaling>
@@ -480,7 +482,7 @@
         <c:numFmt formatCode="0.0%" sourceLinked="1"/>
         <c:majorTickMark val="none"/>
         <c:tickLblPos val="nextTo"/>
-        <c:crossAx val="74641792"/>
+        <c:crossAx val="65088128"/>
         <c:crosses val="autoZero"/>
         <c:crossBetween val="between"/>
       </c:valAx>
@@ -797,11 +799,11 @@
             </c:numRef>
           </c:val>
         </c:ser>
-        <c:axId val="80432128"/>
-        <c:axId val="80549376"/>
+        <c:axId val="66951808"/>
+        <c:axId val="66958080"/>
       </c:barChart>
       <c:catAx>
-        <c:axId val="80432128"/>
+        <c:axId val="66951808"/>
         <c:scaling>
           <c:orientation val="minMax"/>
         </c:scaling>
@@ -826,14 +828,14 @@
         </c:title>
         <c:numFmt formatCode="General" sourceLinked="1"/>
         <c:tickLblPos val="nextTo"/>
-        <c:crossAx val="80549376"/>
+        <c:crossAx val="66958080"/>
         <c:crosses val="autoZero"/>
         <c:auto val="1"/>
         <c:lblAlgn val="ctr"/>
         <c:lblOffset val="100"/>
       </c:catAx>
       <c:valAx>
-        <c:axId val="80549376"/>
+        <c:axId val="66958080"/>
         <c:scaling>
           <c:orientation val="minMax"/>
           <c:max val="5"/>
@@ -861,7 +863,7 @@
         </c:title>
         <c:numFmt formatCode="0.00" sourceLinked="1"/>
         <c:tickLblPos val="nextTo"/>
-        <c:crossAx val="80432128"/>
+        <c:crossAx val="66951808"/>
         <c:crosses val="autoZero"/>
         <c:crossBetween val="between"/>
       </c:valAx>
@@ -2068,7 +2070,7 @@
   <dgm:whole/>
   <dgm:extLst>
     <a:ext uri="http://schemas.microsoft.com/office/drawing/2008/diagram">
-      <dsp:dataModelExt xmlns:dsp="http://schemas.microsoft.com/office/drawing/2008/diagram" xmlns="" relId="rId6" minVer="http://schemas.openxmlformats.org/drawingml/2006/diagram"/>
+      <dsp:dataModelExt xmlns="" xmlns:dsp="http://schemas.microsoft.com/office/drawing/2008/diagram" relId="rId6" minVer="http://schemas.openxmlformats.org/drawingml/2006/diagram"/>
     </a:ext>
   </dgm:extLst>
 </dgm:dataModel>
@@ -7485,6 +7487,424 @@
               <a:rPr lang="es-CO" sz="2400" dirty="0" smtClean="0"/>
             </a:br>
             <a:r>
+              <a:rPr lang="es-CO" sz="2400" dirty="0" err="1" smtClean="0"/>
+              <a:t>lider</a:t>
+            </a:r>
+            <a:r>
+              <a:rPr lang="es-CO" sz="2400" dirty="0" smtClean="0"/>
+              <a:t> de planeación</a:t>
+            </a:r>
+            <a:endParaRPr lang="en-US" sz="2400" dirty="0"/>
+          </a:p>
+        </p:txBody>
+      </p:sp>
+      <p:pic>
+        <p:nvPicPr>
+          <p:cNvPr id="4" name="3 Imagen" descr="ingenium-logo.png"/>
+          <p:cNvPicPr>
+            <a:picLocks noChangeAspect="1"/>
+          </p:cNvPicPr>
+          <p:nvPr/>
+        </p:nvPicPr>
+        <p:blipFill>
+          <a:blip r:embed="rId2" cstate="print"/>
+          <a:stretch>
+            <a:fillRect/>
+          </a:stretch>
+        </p:blipFill>
+        <p:spPr>
+          <a:xfrm>
+            <a:off x="5867400" y="228600"/>
+            <a:ext cx="3048006" cy="1021082"/>
+          </a:xfrm>
+          <a:prstGeom prst="rect">
+            <a:avLst/>
+          </a:prstGeom>
+        </p:spPr>
+      </p:pic>
+      <p:sp>
+        <p:nvSpPr>
+          <p:cNvPr id="6" name="5 CuadroTexto"/>
+          <p:cNvSpPr txBox="1"/>
+          <p:nvPr/>
+        </p:nvSpPr>
+        <p:spPr>
+          <a:xfrm>
+            <a:off x="228600" y="1676400"/>
+            <a:ext cx="8534400" cy="4524315"/>
+          </a:xfrm>
+          <a:prstGeom prst="rect">
+            <a:avLst/>
+          </a:prstGeom>
+          <a:noFill/>
+        </p:spPr>
+        <p:txBody>
+          <a:bodyPr wrap="square" rtlCol="0">
+            <a:spAutoFit/>
+          </a:bodyPr>
+          <a:lstStyle/>
+          <a:p>
+            <a:r>
+              <a:rPr lang="es-CO" sz="1200" b="1" dirty="0" smtClean="0"/>
+              <a:t>Objetivos Definidos por Rol: </a:t>
+            </a:r>
+            <a:r>
+              <a:rPr lang="es-CO" sz="1200" dirty="0" smtClean="0"/>
+              <a:t/>
+            </a:r>
+            <a:br>
+              <a:rPr lang="es-CO" sz="1200" dirty="0" smtClean="0"/>
+            </a:br>
+            <a:r>
+              <a:rPr lang="es-CO" sz="1200" dirty="0" smtClean="0"/>
+              <a:t>Obj1. Aplicar al ciclo 3 mejoras de acuerdo a la retroalimentación del primer ciclo</a:t>
+            </a:r>
+          </a:p>
+          <a:p>
+            <a:r>
+              <a:rPr lang="es-CO" sz="1200" dirty="0" smtClean="0"/>
+              <a:t>	M1: El desfase de tiempo  estimado del ciclo 3 debe ser menor al 30%</a:t>
+            </a:r>
+          </a:p>
+          <a:p>
+            <a:r>
+              <a:rPr lang="es-CO" sz="1200" dirty="0" smtClean="0"/>
+              <a:t>	M2: El desfase de tiempo  estimado por fase debe ser menor al 30%</a:t>
+            </a:r>
+          </a:p>
+          <a:p>
+            <a:r>
+              <a:rPr lang="es-CO" sz="1200" dirty="0" smtClean="0"/>
+              <a:t>Obj2. Realizar seguimiento para el cumplimiento  de actividades</a:t>
+            </a:r>
+          </a:p>
+          <a:p>
+            <a:r>
+              <a:rPr lang="es-CO" sz="1200" dirty="0" smtClean="0"/>
+              <a:t>	M1: Todos los integrantes deberán entregar sus asignaciones máximo con un día de retraso de la fecha  de entrega 	planeada.</a:t>
+            </a:r>
+            <a:endParaRPr lang="en-US" sz="1200" dirty="0" smtClean="0"/>
+          </a:p>
+          <a:p>
+            <a:r>
+              <a:rPr lang="es-CO" sz="1200" b="1" dirty="0" smtClean="0"/>
+              <a:t> </a:t>
+            </a:r>
+            <a:endParaRPr lang="en-US" sz="1200" dirty="0" smtClean="0"/>
+          </a:p>
+          <a:p>
+            <a:pPr lvl="0"/>
+            <a:r>
+              <a:rPr lang="es-CO" sz="1200" b="1" dirty="0" smtClean="0"/>
+              <a:t>Cumplimiento de los objetivos durante el ciclo: </a:t>
+            </a:r>
+          </a:p>
+          <a:p>
+            <a:pPr lvl="0"/>
+            <a:r>
+              <a:rPr lang="es-CO" sz="1200" dirty="0" smtClean="0"/>
+              <a:t>Obj1: No se cumplió ya que fue del 37%</a:t>
+            </a:r>
+          </a:p>
+          <a:p>
+            <a:pPr lvl="0"/>
+            <a:r>
+              <a:rPr lang="es-CO" sz="1200" dirty="0" smtClean="0"/>
+              <a:t>Obj2: Se cumplió exitosamente</a:t>
+            </a:r>
+          </a:p>
+          <a:p>
+            <a:pPr lvl="0"/>
+            <a:r>
+              <a:rPr lang="es-CO" sz="1200" b="1" dirty="0" smtClean="0"/>
+              <a:t> </a:t>
+            </a:r>
+            <a:endParaRPr lang="en-US" sz="1200" dirty="0" smtClean="0"/>
+          </a:p>
+          <a:p>
+            <a:pPr lvl="0"/>
+            <a:r>
+              <a:rPr lang="es-CO" sz="1200" b="1" dirty="0" smtClean="0"/>
+              <a:t>Inconvenientes:  </a:t>
+            </a:r>
+            <a:r>
+              <a:rPr lang="es-CO" sz="1200" dirty="0" smtClean="0"/>
+              <a:t>Disponibilidad de los integrantes, registro de actividades por el formulario general.</a:t>
+            </a:r>
+          </a:p>
+          <a:p>
+            <a:pPr lvl="0"/>
+            <a:endParaRPr lang="es-CO" sz="1200" b="1" dirty="0" smtClean="0"/>
+          </a:p>
+          <a:p>
+            <a:pPr lvl="0"/>
+            <a:r>
+              <a:rPr lang="es-CO" sz="1200" b="1" dirty="0" smtClean="0"/>
+              <a:t>Aspectos a Mejorar: </a:t>
+            </a:r>
+            <a:r>
+              <a:rPr lang="es-CO" sz="1200" dirty="0" smtClean="0"/>
+              <a:t>Seguimiento del registro de actividades, y consultar disponibilidad de tiempos de cada integrante.</a:t>
+            </a:r>
+          </a:p>
+          <a:p>
+            <a:endParaRPr lang="es-CO" sz="1200" dirty="0" smtClean="0"/>
+          </a:p>
+          <a:p>
+            <a:pPr lvl="0"/>
+            <a:r>
+              <a:rPr lang="es-CO" sz="1200" b="1" dirty="0" smtClean="0"/>
+              <a:t>¿Qué nos faltó como grupo en este ciclo?: </a:t>
+            </a:r>
+            <a:r>
+              <a:rPr lang="es-CO" sz="1200" dirty="0" smtClean="0"/>
+              <a:t>Todos los integrantes  mostraron un alto  interés y acompañamiento a los demás integrantes..</a:t>
+            </a:r>
+            <a:endParaRPr lang="en-US" sz="1200" dirty="0" smtClean="0"/>
+          </a:p>
+          <a:p>
+            <a:pPr lvl="0"/>
+            <a:endParaRPr lang="es-CO" sz="1200" b="1" dirty="0" smtClean="0"/>
+          </a:p>
+          <a:p>
+            <a:r>
+              <a:rPr lang="es-CO" sz="1200" b="1" dirty="0" smtClean="0"/>
+              <a:t>¿Qué etapas fueron las más difíciles? Porqué? : </a:t>
+            </a:r>
+            <a:r>
+              <a:rPr lang="es-CO" sz="1200" dirty="0" smtClean="0"/>
+              <a:t>Retroalimentación debido al análisis que se debía hacer del ciclo anterior y encontrar los puntos que se deben mejorar de acuerdo a eso.</a:t>
+            </a:r>
+          </a:p>
+          <a:p>
+            <a:pPr lvl="0"/>
+            <a:r>
+              <a:rPr lang="es-CO" sz="1200" dirty="0" smtClean="0"/>
+              <a:t/>
+            </a:r>
+            <a:br>
+              <a:rPr lang="es-CO" sz="1200" dirty="0" smtClean="0"/>
+            </a:br>
+            <a:r>
+              <a:rPr lang="es-CO" sz="1200" b="1" dirty="0" smtClean="0"/>
+              <a:t>¿Qué no me gustó del ciclo?: </a:t>
+            </a:r>
+            <a:r>
+              <a:rPr lang="es-CO" sz="1200" dirty="0" smtClean="0"/>
+              <a:t>Colaboración por parte de los integrantes, y  seguridad en el desarrollo de las actividades debido a un diseño más estable.</a:t>
+            </a:r>
+            <a:endParaRPr lang="en-US" sz="1200" dirty="0" smtClean="0"/>
+          </a:p>
+        </p:txBody>
+      </p:sp>
+    </p:spTree>
+  </p:cSld>
+  <p:clrMapOvr>
+    <a:masterClrMapping/>
+  </p:clrMapOvr>
+  <p:timing>
+    <p:tnLst>
+      <p:par>
+        <p:cTn id="1" dur="indefinite" restart="never" nodeType="tmRoot"/>
+      </p:par>
+    </p:tnLst>
+  </p:timing>
+</p:sld>
+</file>
+
+<file path=ppt/slides/slide11.xml><?xml version="1.0" encoding="utf-8"?>
+<p:sld xmlns:a="http://schemas.openxmlformats.org/drawingml/2006/main" xmlns:r="http://schemas.openxmlformats.org/officeDocument/2006/relationships" xmlns:p="http://schemas.openxmlformats.org/presentationml/2006/main">
+  <p:cSld>
+    <p:spTree>
+      <p:nvGrpSpPr>
+        <p:cNvPr id="1" name=""/>
+        <p:cNvGrpSpPr/>
+        <p:nvPr/>
+      </p:nvGrpSpPr>
+      <p:grpSpPr>
+        <a:xfrm>
+          <a:off x="0" y="0"/>
+          <a:ext cx="0" cy="0"/>
+          <a:chOff x="0" y="0"/>
+          <a:chExt cx="0" cy="0"/>
+        </a:xfrm>
+      </p:grpSpPr>
+      <p:sp>
+        <p:nvSpPr>
+          <p:cNvPr id="2" name="1 Título"/>
+          <p:cNvSpPr>
+            <a:spLocks noGrp="1"/>
+          </p:cNvSpPr>
+          <p:nvPr>
+            <p:ph type="title"/>
+          </p:nvPr>
+        </p:nvSpPr>
+        <p:spPr/>
+        <p:txBody>
+          <a:bodyPr>
+            <a:normAutofit/>
+          </a:bodyPr>
+          <a:lstStyle/>
+          <a:p>
+            <a:r>
+              <a:rPr lang="es-CO" sz="2400" dirty="0" smtClean="0"/>
+              <a:t>EQUIPO</a:t>
+            </a:r>
+            <a:br>
+              <a:rPr lang="es-CO" sz="2400" dirty="0" smtClean="0"/>
+            </a:br>
+            <a:r>
+              <a:rPr lang="es-CO" sz="2400" dirty="0" smtClean="0"/>
+              <a:t> Progreso en el ajuste de datos</a:t>
+            </a:r>
+            <a:endParaRPr lang="en-US" sz="2400" dirty="0"/>
+          </a:p>
+        </p:txBody>
+      </p:sp>
+      <p:pic>
+        <p:nvPicPr>
+          <p:cNvPr id="4" name="3 Imagen" descr="ingenium-logo.png"/>
+          <p:cNvPicPr>
+            <a:picLocks noChangeAspect="1"/>
+          </p:cNvPicPr>
+          <p:nvPr/>
+        </p:nvPicPr>
+        <p:blipFill>
+          <a:blip r:embed="rId2" cstate="print"/>
+          <a:stretch>
+            <a:fillRect/>
+          </a:stretch>
+        </p:blipFill>
+        <p:spPr>
+          <a:xfrm>
+            <a:off x="5867400" y="228600"/>
+            <a:ext cx="3048006" cy="1021082"/>
+          </a:xfrm>
+          <a:prstGeom prst="rect">
+            <a:avLst/>
+          </a:prstGeom>
+        </p:spPr>
+      </p:pic>
+      <p:pic>
+        <p:nvPicPr>
+          <p:cNvPr id="1026" name="Picture 2"/>
+          <p:cNvPicPr>
+            <a:picLocks noChangeAspect="1" noChangeArrowheads="1"/>
+          </p:cNvPicPr>
+          <p:nvPr/>
+        </p:nvPicPr>
+        <p:blipFill>
+          <a:blip r:embed="rId3" cstate="print"/>
+          <a:srcRect/>
+          <a:stretch>
+            <a:fillRect/>
+          </a:stretch>
+        </p:blipFill>
+        <p:spPr bwMode="auto">
+          <a:xfrm>
+            <a:off x="1328738" y="2466975"/>
+            <a:ext cx="6486525" cy="4010025"/>
+          </a:xfrm>
+          <a:prstGeom prst="rect">
+            <a:avLst/>
+          </a:prstGeom>
+          <a:noFill/>
+          <a:ln w="9525">
+            <a:noFill/>
+            <a:miter lim="800000"/>
+            <a:headEnd/>
+            <a:tailEnd/>
+          </a:ln>
+          <a:effectLst/>
+        </p:spPr>
+      </p:pic>
+      <p:sp>
+        <p:nvSpPr>
+          <p:cNvPr id="6" name="5 CuadroTexto"/>
+          <p:cNvSpPr txBox="1"/>
+          <p:nvPr/>
+        </p:nvSpPr>
+        <p:spPr>
+          <a:xfrm>
+            <a:off x="609600" y="1752600"/>
+            <a:ext cx="825867" cy="369332"/>
+          </a:xfrm>
+          <a:prstGeom prst="rect">
+            <a:avLst/>
+          </a:prstGeom>
+          <a:noFill/>
+        </p:spPr>
+        <p:txBody>
+          <a:bodyPr wrap="none" rtlCol="0">
+            <a:spAutoFit/>
+          </a:bodyPr>
+          <a:lstStyle/>
+          <a:p>
+            <a:r>
+              <a:rPr lang="es-CO" b="1" dirty="0" smtClean="0"/>
+              <a:t>Ciclo 1</a:t>
+            </a:r>
+            <a:endParaRPr lang="es-CO" b="1" dirty="0"/>
+          </a:p>
+        </p:txBody>
+      </p:sp>
+    </p:spTree>
+  </p:cSld>
+  <p:clrMapOvr>
+    <a:masterClrMapping/>
+  </p:clrMapOvr>
+  <p:timing>
+    <p:tnLst>
+      <p:par>
+        <p:cTn id="1" dur="indefinite" restart="never" nodeType="tmRoot"/>
+      </p:par>
+    </p:tnLst>
+  </p:timing>
+</p:sld>
+</file>
+
+<file path=ppt/slides/slide12.xml><?xml version="1.0" encoding="utf-8"?>
+<p:sld xmlns:a="http://schemas.openxmlformats.org/drawingml/2006/main" xmlns:r="http://schemas.openxmlformats.org/officeDocument/2006/relationships" xmlns:p="http://schemas.openxmlformats.org/presentationml/2006/main">
+  <p:cSld>
+    <p:spTree>
+      <p:nvGrpSpPr>
+        <p:cNvPr id="1" name=""/>
+        <p:cNvGrpSpPr/>
+        <p:nvPr/>
+      </p:nvGrpSpPr>
+      <p:grpSpPr>
+        <a:xfrm>
+          <a:off x="0" y="0"/>
+          <a:ext cx="0" cy="0"/>
+          <a:chOff x="0" y="0"/>
+          <a:chExt cx="0" cy="0"/>
+        </a:xfrm>
+      </p:grpSpPr>
+      <p:sp>
+        <p:nvSpPr>
+          <p:cNvPr id="2" name="1 Título"/>
+          <p:cNvSpPr>
+            <a:spLocks noGrp="1"/>
+          </p:cNvSpPr>
+          <p:nvPr>
+            <p:ph type="title"/>
+          </p:nvPr>
+        </p:nvSpPr>
+        <p:spPr/>
+        <p:txBody>
+          <a:bodyPr>
+            <a:normAutofit/>
+          </a:bodyPr>
+          <a:lstStyle/>
+          <a:p>
+            <a:r>
+              <a:rPr lang="es-CO" sz="2400" dirty="0" smtClean="0"/>
+              <a:t>EQUIPO</a:t>
+            </a:r>
+            <a:br>
+              <a:rPr lang="es-CO" sz="2400" dirty="0" smtClean="0"/>
+            </a:br>
+            <a:r>
               <a:rPr lang="es-CO" sz="2400" dirty="0" smtClean="0"/>
               <a:t>Progreso en el ajuste de datos</a:t>
             </a:r>
@@ -7594,7 +8014,7 @@
 </p:sld>
 </file>
 
-<file path=ppt/slides/slide11.xml><?xml version="1.0" encoding="utf-8"?>
+<file path=ppt/slides/slide13.xml><?xml version="1.0" encoding="utf-8"?>
 <p:sld xmlns:a="http://schemas.openxmlformats.org/drawingml/2006/main" xmlns:r="http://schemas.openxmlformats.org/officeDocument/2006/relationships" xmlns:p="http://schemas.openxmlformats.org/presentationml/2006/main">
   <p:cSld>
     <p:spTree>
@@ -7745,7 +8165,7 @@
 </p:sld>
 </file>
 
-<file path=ppt/slides/slide12.xml><?xml version="1.0" encoding="utf-8"?>
+<file path=ppt/slides/slide14.xml><?xml version="1.0" encoding="utf-8"?>
 <p:sld xmlns:a="http://schemas.openxmlformats.org/drawingml/2006/main" xmlns:r="http://schemas.openxmlformats.org/officeDocument/2006/relationships" xmlns:p="http://schemas.openxmlformats.org/presentationml/2006/main">
   <p:cSld>
     <p:spTree>
@@ -8018,852 +8438,6 @@
             <a:r>
               <a:rPr lang="es-CO" sz="1200" dirty="0" smtClean="0"/>
               <a:t> lo es para poder realizar una evaluación exhaustiva del ciclo, el equipo y el producto.</a:t>
-            </a:r>
-            <a:endParaRPr lang="en-US" sz="1200" dirty="0" smtClean="0"/>
-          </a:p>
-        </p:txBody>
-      </p:sp>
-    </p:spTree>
-  </p:cSld>
-  <p:clrMapOvr>
-    <a:masterClrMapping/>
-  </p:clrMapOvr>
-  <p:timing>
-    <p:tnLst>
-      <p:par>
-        <p:cTn id="1" dur="indefinite" restart="never" nodeType="tmRoot"/>
-      </p:par>
-    </p:tnLst>
-  </p:timing>
-</p:sld>
-</file>
-
-<file path=ppt/slides/slide13.xml><?xml version="1.0" encoding="utf-8"?>
-<p:sld xmlns:a="http://schemas.openxmlformats.org/drawingml/2006/main" xmlns:r="http://schemas.openxmlformats.org/officeDocument/2006/relationships" xmlns:p="http://schemas.openxmlformats.org/presentationml/2006/main">
-  <p:cSld>
-    <p:spTree>
-      <p:nvGrpSpPr>
-        <p:cNvPr id="1" name=""/>
-        <p:cNvGrpSpPr/>
-        <p:nvPr/>
-      </p:nvGrpSpPr>
-      <p:grpSpPr>
-        <a:xfrm>
-          <a:off x="0" y="0"/>
-          <a:ext cx="0" cy="0"/>
-          <a:chOff x="0" y="0"/>
-          <a:chExt cx="0" cy="0"/>
-        </a:xfrm>
-      </p:grpSpPr>
-      <p:sp>
-        <p:nvSpPr>
-          <p:cNvPr id="2" name="1 Título"/>
-          <p:cNvSpPr>
-            <a:spLocks noGrp="1"/>
-          </p:cNvSpPr>
-          <p:nvPr>
-            <p:ph type="title"/>
-          </p:nvPr>
-        </p:nvSpPr>
-        <p:spPr/>
-        <p:txBody>
-          <a:bodyPr>
-            <a:normAutofit/>
-          </a:bodyPr>
-          <a:lstStyle/>
-          <a:p>
-            <a:r>
-              <a:rPr lang="es-CO" sz="2400" dirty="0" smtClean="0"/>
-              <a:t>EQUIPO</a:t>
-            </a:r>
-            <a:br>
-              <a:rPr lang="es-CO" sz="2400" dirty="0" smtClean="0"/>
-            </a:br>
-            <a:r>
-              <a:rPr lang="es-CO" sz="2400" dirty="0" err="1" smtClean="0"/>
-              <a:t>lider</a:t>
-            </a:r>
-            <a:r>
-              <a:rPr lang="es-CO" sz="2400" dirty="0" smtClean="0"/>
-              <a:t> de calidad y proceso</a:t>
-            </a:r>
-            <a:endParaRPr lang="en-US" sz="2400" dirty="0"/>
-          </a:p>
-        </p:txBody>
-      </p:sp>
-      <p:pic>
-        <p:nvPicPr>
-          <p:cNvPr id="4" name="3 Imagen" descr="ingenium-logo.png"/>
-          <p:cNvPicPr>
-            <a:picLocks noChangeAspect="1"/>
-          </p:cNvPicPr>
-          <p:nvPr/>
-        </p:nvPicPr>
-        <p:blipFill>
-          <a:blip r:embed="rId2" cstate="print"/>
-          <a:stretch>
-            <a:fillRect/>
-          </a:stretch>
-        </p:blipFill>
-        <p:spPr>
-          <a:xfrm>
-            <a:off x="5867400" y="228600"/>
-            <a:ext cx="3048006" cy="1021082"/>
-          </a:xfrm>
-          <a:prstGeom prst="rect">
-            <a:avLst/>
-          </a:prstGeom>
-        </p:spPr>
-      </p:pic>
-      <p:sp>
-        <p:nvSpPr>
-          <p:cNvPr id="5" name="4 CuadroTexto"/>
-          <p:cNvSpPr txBox="1"/>
-          <p:nvPr/>
-        </p:nvSpPr>
-        <p:spPr>
-          <a:xfrm>
-            <a:off x="304800" y="1981200"/>
-            <a:ext cx="8534400" cy="4062651"/>
-          </a:xfrm>
-          <a:prstGeom prst="rect">
-            <a:avLst/>
-          </a:prstGeom>
-          <a:noFill/>
-        </p:spPr>
-        <p:txBody>
-          <a:bodyPr wrap="square" rtlCol="0">
-            <a:spAutoFit/>
-          </a:bodyPr>
-          <a:lstStyle/>
-          <a:p>
-            <a:pPr lvl="0">
-              <a:lnSpc>
-                <a:spcPct val="150000"/>
-              </a:lnSpc>
-            </a:pPr>
-            <a:r>
-              <a:rPr lang="es-CO" sz="1200" b="1" dirty="0" smtClean="0"/>
-              <a:t>Objetivos: </a:t>
-            </a:r>
-          </a:p>
-          <a:p>
-            <a:pPr>
-              <a:lnSpc>
-                <a:spcPct val="150000"/>
-              </a:lnSpc>
-              <a:buFont typeface="Arial" pitchFamily="34" charset="0"/>
-              <a:buChar char="•"/>
-            </a:pPr>
-            <a:r>
-              <a:rPr lang="es-CO" sz="1200" b="1" dirty="0" smtClean="0"/>
-              <a:t>O1 </a:t>
-            </a:r>
-            <a:r>
-              <a:rPr lang="es-CO" sz="1200" dirty="0" smtClean="0"/>
-              <a:t>T</a:t>
-            </a:r>
-            <a:r>
-              <a:rPr lang="es-CO" sz="1200" dirty="0" smtClean="0"/>
-              <a:t>odos </a:t>
-            </a:r>
-            <a:r>
-              <a:rPr lang="es-CO" sz="1200" dirty="0" smtClean="0"/>
-              <a:t>los miembros reportan los datos de las actividades con </a:t>
-            </a:r>
-            <a:r>
-              <a:rPr lang="es-CO" sz="1200" dirty="0" smtClean="0"/>
-              <a:t>exactitud.</a:t>
-            </a:r>
-          </a:p>
-          <a:p>
-            <a:pPr lvl="1">
-              <a:lnSpc>
-                <a:spcPct val="150000"/>
-              </a:lnSpc>
-              <a:buFont typeface="Arial" pitchFamily="34" charset="0"/>
-              <a:buChar char="•"/>
-            </a:pPr>
-            <a:r>
-              <a:rPr lang="es-CO" sz="1200" dirty="0" smtClean="0"/>
-              <a:t>M1: Reportar el 100%  de las tareas realizadas</a:t>
-            </a:r>
-          </a:p>
-          <a:p>
-            <a:pPr>
-              <a:lnSpc>
-                <a:spcPct val="150000"/>
-              </a:lnSpc>
-              <a:buFont typeface="Arial" pitchFamily="34" charset="0"/>
-              <a:buChar char="•"/>
-            </a:pPr>
-            <a:r>
-              <a:rPr lang="es-CO" sz="1200" b="1" dirty="0" smtClean="0"/>
-              <a:t>O2 </a:t>
-            </a:r>
-            <a:r>
-              <a:rPr lang="es-CO" sz="1200" dirty="0" smtClean="0"/>
-              <a:t>El </a:t>
-            </a:r>
-            <a:r>
-              <a:rPr lang="es-CO" sz="1200" dirty="0" smtClean="0"/>
-              <a:t>equipo sigue el </a:t>
-            </a:r>
-            <a:r>
-              <a:rPr lang="es-CO" sz="1200" dirty="0" err="1" smtClean="0"/>
-              <a:t>TSPi</a:t>
-            </a:r>
-            <a:r>
-              <a:rPr lang="es-CO" sz="1200" dirty="0" smtClean="0"/>
-              <a:t> y produce un plan de </a:t>
-            </a:r>
-            <a:r>
-              <a:rPr lang="es-CO" sz="1200" dirty="0" smtClean="0"/>
-              <a:t>cualidad.</a:t>
-            </a:r>
-          </a:p>
-          <a:p>
-            <a:pPr marL="457200" lvl="2">
-              <a:lnSpc>
-                <a:spcPct val="150000"/>
-              </a:lnSpc>
-              <a:buFont typeface="Arial" pitchFamily="34" charset="0"/>
-              <a:buChar char="•"/>
-            </a:pPr>
-            <a:r>
-              <a:rPr lang="es-CO" sz="1200" dirty="0" smtClean="0"/>
-              <a:t>M2:Cumplir con las reglas , horarios y tareas en mas del 90%  y producir el plan de calidad</a:t>
-            </a:r>
-            <a:endParaRPr lang="es-CO" sz="1200" dirty="0" smtClean="0"/>
-          </a:p>
-          <a:p>
-            <a:pPr>
-              <a:lnSpc>
-                <a:spcPct val="150000"/>
-              </a:lnSpc>
-              <a:buFont typeface="Arial" pitchFamily="34" charset="0"/>
-              <a:buChar char="•"/>
-            </a:pPr>
-            <a:r>
-              <a:rPr lang="es-CO" sz="1200" b="1" dirty="0" smtClean="0"/>
-              <a:t>O3</a:t>
-            </a:r>
-            <a:r>
-              <a:rPr lang="es-CO" sz="1200" dirty="0" smtClean="0"/>
-              <a:t>Todo </a:t>
-            </a:r>
-            <a:r>
-              <a:rPr lang="es-CO" sz="1200" dirty="0" smtClean="0"/>
-              <a:t>el equipo de inspección son correctamente moderado y </a:t>
-            </a:r>
-            <a:r>
-              <a:rPr lang="es-CO" sz="1200" dirty="0" smtClean="0"/>
-              <a:t>reportado.</a:t>
-            </a:r>
-          </a:p>
-          <a:p>
-            <a:pPr marL="457200" lvl="3">
-              <a:lnSpc>
-                <a:spcPct val="150000"/>
-              </a:lnSpc>
-              <a:buFont typeface="Arial" pitchFamily="34" charset="0"/>
-              <a:buChar char="•"/>
-            </a:pPr>
-            <a:r>
-              <a:rPr lang="es-CO" sz="1200" dirty="0" smtClean="0"/>
-              <a:t>M3:Reportar el 70% de los defectos en codificación y que el resultado sea confiable.</a:t>
-            </a:r>
-            <a:r>
-              <a:rPr lang="es-CO" sz="1200" b="1" dirty="0" smtClean="0"/>
-              <a:t> </a:t>
-            </a:r>
-            <a:endParaRPr lang="es-CO" sz="1200" b="1" dirty="0" smtClean="0"/>
-          </a:p>
-          <a:p>
-            <a:pPr marL="457200" lvl="3">
-              <a:lnSpc>
-                <a:spcPct val="150000"/>
-              </a:lnSpc>
-              <a:buFont typeface="Arial" pitchFamily="34" charset="0"/>
-              <a:buChar char="•"/>
-            </a:pPr>
-            <a:endParaRPr lang="es-CO" sz="1200" dirty="0" smtClean="0"/>
-          </a:p>
-          <a:p>
-            <a:pPr lvl="0">
-              <a:lnSpc>
-                <a:spcPct val="150000"/>
-              </a:lnSpc>
-            </a:pPr>
-            <a:r>
-              <a:rPr lang="es-CO" sz="1200" b="1" dirty="0" smtClean="0"/>
-              <a:t>Resultados:</a:t>
-            </a:r>
-          </a:p>
-          <a:p>
-            <a:pPr>
-              <a:lnSpc>
-                <a:spcPct val="150000"/>
-              </a:lnSpc>
-              <a:buFont typeface="Arial" pitchFamily="34" charset="0"/>
-              <a:buChar char="•"/>
-            </a:pPr>
-            <a:r>
-              <a:rPr lang="es-CO" sz="1200" b="1" dirty="0" smtClean="0"/>
-              <a:t>R1 </a:t>
-            </a:r>
-            <a:r>
-              <a:rPr lang="es-CO" sz="1200" dirty="0" smtClean="0"/>
-              <a:t>Se reportaron el 100% de las tareas realizadas</a:t>
-            </a:r>
-            <a:endParaRPr lang="es-CO" sz="1200" dirty="0" smtClean="0"/>
-          </a:p>
-          <a:p>
-            <a:pPr>
-              <a:lnSpc>
-                <a:spcPct val="150000"/>
-              </a:lnSpc>
-              <a:buFont typeface="Arial" pitchFamily="34" charset="0"/>
-              <a:buChar char="•"/>
-            </a:pPr>
-            <a:r>
-              <a:rPr lang="es-CO" sz="1200" b="1" dirty="0" smtClean="0"/>
-              <a:t>R2 </a:t>
-            </a:r>
-            <a:r>
-              <a:rPr lang="es-CO" sz="1200" dirty="0" smtClean="0"/>
-              <a:t>Se produjo el plan de calidad y se cumplieron con las tareas , reglas y horarios en mas de 90 %</a:t>
-            </a:r>
-            <a:endParaRPr lang="es-CO" sz="1200" dirty="0" smtClean="0"/>
-          </a:p>
-          <a:p>
-            <a:pPr>
-              <a:lnSpc>
-                <a:spcPct val="150000"/>
-              </a:lnSpc>
-              <a:buFont typeface="Arial" pitchFamily="34" charset="0"/>
-              <a:buChar char="•"/>
-            </a:pPr>
-            <a:r>
-              <a:rPr lang="es-CO" sz="1200" b="1" dirty="0" smtClean="0"/>
-              <a:t>R3 </a:t>
-            </a:r>
-            <a:r>
-              <a:rPr lang="es-CO" sz="1200" dirty="0" smtClean="0"/>
-              <a:t>Se reporto mas de l 70 %  de los defectos planeado para la inspección, pero el reporte no es confiable porque las coincidencias de defectos entre los inspectores no alcanzo el 70%</a:t>
-            </a:r>
-          </a:p>
-          <a:p>
-            <a:pPr lvl="0"/>
-            <a:endParaRPr lang="es-CO" sz="1200" b="1" dirty="0" smtClean="0"/>
-          </a:p>
-          <a:p>
-            <a:pPr lvl="0"/>
-            <a:r>
-              <a:rPr lang="en-US" sz="1200" b="1" dirty="0" smtClean="0"/>
-              <a:t>	</a:t>
-            </a:r>
-            <a:endParaRPr lang="es-CO" sz="1200" b="1" dirty="0" smtClean="0"/>
-          </a:p>
-        </p:txBody>
-      </p:sp>
-    </p:spTree>
-  </p:cSld>
-  <p:clrMapOvr>
-    <a:masterClrMapping/>
-  </p:clrMapOvr>
-  <p:timing>
-    <p:tnLst>
-      <p:par>
-        <p:cTn id="1" dur="indefinite" restart="never" nodeType="tmRoot"/>
-      </p:par>
-    </p:tnLst>
-  </p:timing>
-</p:sld>
-</file>
-
-<file path=ppt/slides/slide14.xml><?xml version="1.0" encoding="utf-8"?>
-<p:sld xmlns:a="http://schemas.openxmlformats.org/drawingml/2006/main" xmlns:r="http://schemas.openxmlformats.org/officeDocument/2006/relationships" xmlns:p="http://schemas.openxmlformats.org/presentationml/2006/main">
-  <p:cSld>
-    <p:spTree>
-      <p:nvGrpSpPr>
-        <p:cNvPr id="1" name=""/>
-        <p:cNvGrpSpPr/>
-        <p:nvPr/>
-      </p:nvGrpSpPr>
-      <p:grpSpPr>
-        <a:xfrm>
-          <a:off x="0" y="0"/>
-          <a:ext cx="0" cy="0"/>
-          <a:chOff x="0" y="0"/>
-          <a:chExt cx="0" cy="0"/>
-        </a:xfrm>
-      </p:grpSpPr>
-      <p:sp>
-        <p:nvSpPr>
-          <p:cNvPr id="2" name="1 Título"/>
-          <p:cNvSpPr>
-            <a:spLocks noGrp="1"/>
-          </p:cNvSpPr>
-          <p:nvPr>
-            <p:ph type="title"/>
-          </p:nvPr>
-        </p:nvSpPr>
-        <p:spPr/>
-        <p:txBody>
-          <a:bodyPr>
-            <a:normAutofit/>
-          </a:bodyPr>
-          <a:lstStyle/>
-          <a:p>
-            <a:r>
-              <a:rPr lang="es-CO" sz="2400" dirty="0" smtClean="0"/>
-              <a:t>EQUIPO</a:t>
-            </a:r>
-            <a:br>
-              <a:rPr lang="es-CO" sz="2400" dirty="0" smtClean="0"/>
-            </a:br>
-            <a:r>
-              <a:rPr lang="es-CO" sz="2400" dirty="0" err="1" smtClean="0"/>
-              <a:t>lider</a:t>
-            </a:r>
-            <a:r>
-              <a:rPr lang="es-CO" sz="2400" dirty="0" smtClean="0"/>
-              <a:t> de desarrollo</a:t>
-            </a:r>
-            <a:endParaRPr lang="en-US" sz="2400" dirty="0"/>
-          </a:p>
-        </p:txBody>
-      </p:sp>
-      <p:pic>
-        <p:nvPicPr>
-          <p:cNvPr id="4" name="3 Imagen" descr="ingenium-logo.png"/>
-          <p:cNvPicPr>
-            <a:picLocks noChangeAspect="1"/>
-          </p:cNvPicPr>
-          <p:nvPr/>
-        </p:nvPicPr>
-        <p:blipFill>
-          <a:blip r:embed="rId2" cstate="print"/>
-          <a:stretch>
-            <a:fillRect/>
-          </a:stretch>
-        </p:blipFill>
-        <p:spPr>
-          <a:xfrm>
-            <a:off x="5867400" y="228600"/>
-            <a:ext cx="3048006" cy="1021082"/>
-          </a:xfrm>
-          <a:prstGeom prst="rect">
-            <a:avLst/>
-          </a:prstGeom>
-        </p:spPr>
-      </p:pic>
-      <p:sp>
-        <p:nvSpPr>
-          <p:cNvPr id="5" name="4 CuadroTexto"/>
-          <p:cNvSpPr txBox="1"/>
-          <p:nvPr/>
-        </p:nvSpPr>
-        <p:spPr>
-          <a:xfrm>
-            <a:off x="228600" y="1676400"/>
-            <a:ext cx="8534400" cy="4708981"/>
-          </a:xfrm>
-          <a:prstGeom prst="rect">
-            <a:avLst/>
-          </a:prstGeom>
-          <a:noFill/>
-        </p:spPr>
-        <p:txBody>
-          <a:bodyPr wrap="square" rtlCol="0">
-            <a:spAutoFit/>
-          </a:bodyPr>
-          <a:lstStyle/>
-          <a:p>
-            <a:r>
-              <a:rPr lang="es-CO" sz="1200" b="1" dirty="0" smtClean="0"/>
-              <a:t>Objetivos Definidos por Rol: </a:t>
-            </a:r>
-            <a:r>
-              <a:rPr lang="es-CO" sz="1200" dirty="0" smtClean="0"/>
-              <a:t/>
-            </a:r>
-            <a:br>
-              <a:rPr lang="es-CO" sz="1200" dirty="0" smtClean="0"/>
-            </a:br>
-            <a:r>
-              <a:rPr lang="es-CO" sz="1200" dirty="0" smtClean="0"/>
-              <a:t>Obj1</a:t>
-            </a:r>
-            <a:r>
-              <a:rPr lang="es-CO" sz="1200" dirty="0" smtClean="0">
-                <a:solidFill>
-                  <a:srgbClr val="000000"/>
-                </a:solidFill>
-                <a:latin typeface="Calibri"/>
-              </a:rPr>
-              <a:t> Producir un producto dentro del tiempo establecido</a:t>
-            </a:r>
-            <a:endParaRPr lang="es-CO" sz="1200" dirty="0" smtClean="0"/>
-          </a:p>
-          <a:p>
-            <a:r>
-              <a:rPr lang="es-CO" sz="1200" dirty="0" smtClean="0"/>
-              <a:t>	M1: </a:t>
-            </a:r>
-            <a:r>
-              <a:rPr lang="es-CO" sz="1200" dirty="0" smtClean="0">
-                <a:solidFill>
-                  <a:srgbClr val="000000"/>
-                </a:solidFill>
-                <a:latin typeface="Calibri"/>
-              </a:rPr>
-              <a:t>Implementar el 100% de los requerimientos</a:t>
-            </a:r>
-            <a:endParaRPr lang="es-CO" sz="1200" dirty="0" smtClean="0"/>
-          </a:p>
-          <a:p>
-            <a:r>
-              <a:rPr lang="es-CO" sz="1200" dirty="0" smtClean="0"/>
-              <a:t>Obj2. </a:t>
-            </a:r>
-            <a:r>
-              <a:rPr lang="es-CO" sz="1200" dirty="0" smtClean="0">
-                <a:solidFill>
-                  <a:srgbClr val="000000"/>
-                </a:solidFill>
-                <a:latin typeface="Calibri"/>
-              </a:rPr>
-              <a:t>Estimar de una manera acertada.</a:t>
-            </a:r>
-            <a:endParaRPr lang="es-CO" sz="1200" dirty="0" smtClean="0"/>
-          </a:p>
-          <a:p>
-            <a:r>
-              <a:rPr lang="es-CO" sz="1200" dirty="0" smtClean="0"/>
-              <a:t>	M1: </a:t>
-            </a:r>
-            <a:r>
-              <a:rPr lang="es-CO" sz="1200" dirty="0" smtClean="0">
-                <a:solidFill>
-                  <a:srgbClr val="000000"/>
-                </a:solidFill>
-                <a:latin typeface="Calibri"/>
-              </a:rPr>
-              <a:t>Tener una estimación que no supere el 20% de desfase]</a:t>
-            </a:r>
-            <a:endParaRPr lang="es-CO" sz="1200" dirty="0" smtClean="0"/>
-          </a:p>
-          <a:p>
-            <a:r>
-              <a:rPr lang="es-CO" sz="1200" dirty="0" err="1" smtClean="0">
-                <a:solidFill>
-                  <a:srgbClr val="000000"/>
-                </a:solidFill>
-                <a:latin typeface="Calibri"/>
-              </a:rPr>
-              <a:t>Obj</a:t>
-            </a:r>
-            <a:r>
-              <a:rPr lang="es-CO" sz="1200" dirty="0" smtClean="0">
-                <a:solidFill>
-                  <a:srgbClr val="000000"/>
-                </a:solidFill>
-                <a:latin typeface="Calibri"/>
-              </a:rPr>
-              <a:t> 3. Asignar labores de desarrollo de una manera equitativa</a:t>
-            </a:r>
-          </a:p>
-          <a:p>
-            <a:r>
-              <a:rPr lang="es-CO" sz="1200" dirty="0" smtClean="0"/>
-              <a:t>	M1: </a:t>
-            </a:r>
-            <a:r>
-              <a:rPr lang="es-CO" sz="1200" dirty="0" smtClean="0">
-                <a:solidFill>
-                  <a:srgbClr val="000000"/>
-                </a:solidFill>
-                <a:latin typeface="Calibri"/>
-              </a:rPr>
-              <a:t>Cada integrante debería realizar 155,6 con un 20% de margen de error. [124,48 - 186,72]</a:t>
-            </a:r>
-          </a:p>
-          <a:p>
-            <a:endParaRPr lang="en-US" sz="1200" dirty="0" smtClean="0"/>
-          </a:p>
-          <a:p>
-            <a:r>
-              <a:rPr lang="es-CO" sz="1200" b="1" dirty="0" smtClean="0"/>
-              <a:t> </a:t>
-            </a:r>
-            <a:endParaRPr lang="en-US" sz="1200" dirty="0" smtClean="0"/>
-          </a:p>
-          <a:p>
-            <a:pPr lvl="0"/>
-            <a:r>
-              <a:rPr lang="es-CO" sz="1200" b="1" dirty="0" smtClean="0"/>
-              <a:t>Cumplimiento de los objetivos durante el ciclo: </a:t>
-            </a:r>
-          </a:p>
-          <a:p>
-            <a:r>
-              <a:rPr lang="es-CO" sz="1200" dirty="0" smtClean="0"/>
-              <a:t>Obj1: </a:t>
-            </a:r>
-            <a:r>
-              <a:rPr lang="es-CO" sz="1200" dirty="0" smtClean="0">
-                <a:solidFill>
-                  <a:srgbClr val="000000"/>
-                </a:solidFill>
-                <a:latin typeface="Calibri"/>
-              </a:rPr>
-              <a:t>Objetivo Cumplido. 100% de los requerimientos implementados</a:t>
-            </a:r>
-          </a:p>
-          <a:p>
-            <a:pPr lvl="0"/>
-            <a:endParaRPr lang="es-CO" sz="1200" dirty="0" smtClean="0"/>
-          </a:p>
-          <a:p>
-            <a:r>
-              <a:rPr lang="es-CO" sz="1200" dirty="0" smtClean="0"/>
-              <a:t>Obj2: 	</a:t>
-            </a:r>
-            <a:r>
-              <a:rPr lang="es-CO" sz="1200" dirty="0" smtClean="0">
-                <a:solidFill>
-                  <a:srgbClr val="000000"/>
-                </a:solidFill>
-                <a:latin typeface="Calibri"/>
-              </a:rPr>
-              <a:t>LOC Planeadas: 934</a:t>
-            </a:r>
-            <a:br>
-              <a:rPr lang="es-CO" sz="1200" dirty="0" smtClean="0">
-                <a:solidFill>
-                  <a:srgbClr val="000000"/>
-                </a:solidFill>
-                <a:latin typeface="Calibri"/>
-              </a:rPr>
-            </a:br>
-            <a:r>
-              <a:rPr lang="es-CO" sz="1200" dirty="0" smtClean="0">
-                <a:solidFill>
-                  <a:srgbClr val="000000"/>
-                </a:solidFill>
-                <a:latin typeface="Calibri"/>
-              </a:rPr>
-              <a:t>	LOC Reales: 1140</a:t>
-            </a:r>
-            <a:br>
-              <a:rPr lang="es-CO" sz="1200" dirty="0" smtClean="0">
-                <a:solidFill>
-                  <a:srgbClr val="000000"/>
-                </a:solidFill>
-                <a:latin typeface="Calibri"/>
-              </a:rPr>
-            </a:br>
-            <a:r>
-              <a:rPr lang="es-CO" sz="1200" dirty="0" smtClean="0">
-                <a:solidFill>
-                  <a:srgbClr val="000000"/>
-                </a:solidFill>
-                <a:latin typeface="Calibri"/>
-              </a:rPr>
-              <a:t>	Porcentaje: 22,05%</a:t>
-            </a:r>
-            <a:br>
-              <a:rPr lang="es-CO" sz="1200" dirty="0" smtClean="0">
-                <a:solidFill>
-                  <a:srgbClr val="000000"/>
-                </a:solidFill>
-                <a:latin typeface="Calibri"/>
-              </a:rPr>
-            </a:br>
-            <a:r>
-              <a:rPr lang="es-CO" sz="1200" dirty="0" smtClean="0">
-                <a:solidFill>
-                  <a:srgbClr val="000000"/>
-                </a:solidFill>
-                <a:latin typeface="Calibri"/>
-              </a:rPr>
-              <a:t>	Objetivo muy cerca de cumplirse. No se cumplió</a:t>
-            </a:r>
-          </a:p>
-          <a:p>
-            <a:pPr lvl="0"/>
-            <a:endParaRPr lang="es-CO" sz="1200" dirty="0" smtClean="0"/>
-          </a:p>
-          <a:p>
-            <a:r>
-              <a:rPr lang="es-CO" sz="1200" dirty="0" smtClean="0"/>
-              <a:t>Obj3: 	</a:t>
-            </a:r>
-            <a:r>
-              <a:rPr lang="es-CO" sz="1200" dirty="0" smtClean="0">
-                <a:solidFill>
-                  <a:srgbClr val="000000"/>
-                </a:solidFill>
-                <a:latin typeface="Calibri"/>
-              </a:rPr>
-              <a:t>Erik: 260</a:t>
-            </a:r>
-            <a:br>
-              <a:rPr lang="es-CO" sz="1200" dirty="0" smtClean="0">
-                <a:solidFill>
-                  <a:srgbClr val="000000"/>
-                </a:solidFill>
-                <a:latin typeface="Calibri"/>
-              </a:rPr>
-            </a:br>
-            <a:r>
-              <a:rPr lang="es-CO" sz="1200" dirty="0" smtClean="0">
-                <a:solidFill>
-                  <a:srgbClr val="000000"/>
-                </a:solidFill>
-                <a:latin typeface="Calibri"/>
-              </a:rPr>
-              <a:t>	Sandra: 212</a:t>
-            </a:r>
-            <a:br>
-              <a:rPr lang="es-CO" sz="1200" dirty="0" smtClean="0">
-                <a:solidFill>
-                  <a:srgbClr val="000000"/>
-                </a:solidFill>
-                <a:latin typeface="Calibri"/>
-              </a:rPr>
-            </a:br>
-            <a:r>
-              <a:rPr lang="es-CO" sz="1200" dirty="0" smtClean="0">
-                <a:solidFill>
-                  <a:srgbClr val="000000"/>
-                </a:solidFill>
-                <a:latin typeface="Calibri"/>
-              </a:rPr>
-              <a:t>	</a:t>
-            </a:r>
-            <a:r>
-              <a:rPr lang="es-CO" sz="1200" dirty="0" err="1" smtClean="0">
-                <a:solidFill>
-                  <a:srgbClr val="000000"/>
-                </a:solidFill>
-                <a:latin typeface="Calibri"/>
-              </a:rPr>
-              <a:t>Willian</a:t>
-            </a:r>
-            <a:r>
-              <a:rPr lang="es-CO" sz="1200" dirty="0" smtClean="0">
-                <a:solidFill>
-                  <a:srgbClr val="000000"/>
-                </a:solidFill>
-                <a:latin typeface="Calibri"/>
-              </a:rPr>
-              <a:t>: 234</a:t>
-            </a:r>
-            <a:br>
-              <a:rPr lang="es-CO" sz="1200" dirty="0" smtClean="0">
-                <a:solidFill>
-                  <a:srgbClr val="000000"/>
-                </a:solidFill>
-                <a:latin typeface="Calibri"/>
-              </a:rPr>
-            </a:br>
-            <a:r>
-              <a:rPr lang="es-CO" sz="1200" dirty="0" smtClean="0">
-                <a:solidFill>
-                  <a:srgbClr val="000000"/>
-                </a:solidFill>
-                <a:latin typeface="Calibri"/>
-              </a:rPr>
-              <a:t>	Carlos: 155</a:t>
-            </a:r>
-            <a:br>
-              <a:rPr lang="es-CO" sz="1200" dirty="0" smtClean="0">
-                <a:solidFill>
-                  <a:srgbClr val="000000"/>
-                </a:solidFill>
-                <a:latin typeface="Calibri"/>
-              </a:rPr>
-            </a:br>
-            <a:r>
-              <a:rPr lang="es-CO" sz="1200" dirty="0" smtClean="0">
-                <a:solidFill>
-                  <a:srgbClr val="000000"/>
-                </a:solidFill>
-                <a:latin typeface="Calibri"/>
-              </a:rPr>
-              <a:t>	David: 127</a:t>
-            </a:r>
-            <a:br>
-              <a:rPr lang="es-CO" sz="1200" dirty="0" smtClean="0">
-                <a:solidFill>
-                  <a:srgbClr val="000000"/>
-                </a:solidFill>
-                <a:latin typeface="Calibri"/>
-              </a:rPr>
-            </a:br>
-            <a:r>
-              <a:rPr lang="es-CO" sz="1200" dirty="0" smtClean="0">
-                <a:solidFill>
-                  <a:srgbClr val="000000"/>
-                </a:solidFill>
-                <a:latin typeface="Calibri"/>
-              </a:rPr>
-              <a:t>	Mauricio: 152</a:t>
-            </a:r>
-            <a:br>
-              <a:rPr lang="es-CO" sz="1200" dirty="0" smtClean="0">
-                <a:solidFill>
-                  <a:srgbClr val="000000"/>
-                </a:solidFill>
-                <a:latin typeface="Calibri"/>
-              </a:rPr>
-            </a:br>
-            <a:r>
-              <a:rPr lang="es-CO" sz="1200" dirty="0" smtClean="0">
-                <a:solidFill>
-                  <a:srgbClr val="000000"/>
-                </a:solidFill>
-                <a:latin typeface="Calibri"/>
-              </a:rPr>
-              <a:t>	Más de lo esperado:  Erik, Sandra, </a:t>
-            </a:r>
-            <a:r>
-              <a:rPr lang="es-CO" sz="1200" dirty="0" err="1" smtClean="0">
-                <a:solidFill>
-                  <a:srgbClr val="000000"/>
-                </a:solidFill>
-                <a:latin typeface="Calibri"/>
-              </a:rPr>
-              <a:t>Willian</a:t>
-            </a:r>
-            <a:r>
-              <a:rPr lang="es-CO" sz="1200" dirty="0" smtClean="0">
-                <a:solidFill>
-                  <a:srgbClr val="000000"/>
-                </a:solidFill>
-                <a:latin typeface="Calibri"/>
-              </a:rPr>
-              <a:t>.</a:t>
-            </a:r>
-            <a:br>
-              <a:rPr lang="es-CO" sz="1200" dirty="0" smtClean="0">
-                <a:solidFill>
-                  <a:srgbClr val="000000"/>
-                </a:solidFill>
-                <a:latin typeface="Calibri"/>
-              </a:rPr>
-            </a:br>
-            <a:r>
-              <a:rPr lang="es-CO" sz="1200" dirty="0" smtClean="0">
-                <a:solidFill>
-                  <a:srgbClr val="000000"/>
-                </a:solidFill>
-                <a:latin typeface="Calibri"/>
-              </a:rPr>
-              <a:t>	Objetivo no cumplido</a:t>
             </a:r>
             <a:endParaRPr lang="en-US" sz="1200" dirty="0" smtClean="0"/>
           </a:p>
@@ -8920,6 +8494,820 @@
           <a:p>
             <a:r>
               <a:rPr lang="es-CO" sz="2400" dirty="0" smtClean="0"/>
+              <a:t>EQUIPO</a:t>
+            </a:r>
+            <a:br>
+              <a:rPr lang="es-CO" sz="2400" dirty="0" smtClean="0"/>
+            </a:br>
+            <a:r>
+              <a:rPr lang="es-CO" sz="2400" dirty="0" err="1" smtClean="0"/>
+              <a:t>lider</a:t>
+            </a:r>
+            <a:r>
+              <a:rPr lang="es-CO" sz="2400" dirty="0" smtClean="0"/>
+              <a:t> de calidad y proceso</a:t>
+            </a:r>
+            <a:endParaRPr lang="en-US" sz="2400" dirty="0"/>
+          </a:p>
+        </p:txBody>
+      </p:sp>
+      <p:pic>
+        <p:nvPicPr>
+          <p:cNvPr id="4" name="3 Imagen" descr="ingenium-logo.png"/>
+          <p:cNvPicPr>
+            <a:picLocks noChangeAspect="1"/>
+          </p:cNvPicPr>
+          <p:nvPr/>
+        </p:nvPicPr>
+        <p:blipFill>
+          <a:blip r:embed="rId2" cstate="print"/>
+          <a:stretch>
+            <a:fillRect/>
+          </a:stretch>
+        </p:blipFill>
+        <p:spPr>
+          <a:xfrm>
+            <a:off x="5867400" y="228600"/>
+            <a:ext cx="3048006" cy="1021082"/>
+          </a:xfrm>
+          <a:prstGeom prst="rect">
+            <a:avLst/>
+          </a:prstGeom>
+        </p:spPr>
+      </p:pic>
+      <p:sp>
+        <p:nvSpPr>
+          <p:cNvPr id="5" name="4 CuadroTexto"/>
+          <p:cNvSpPr txBox="1"/>
+          <p:nvPr/>
+        </p:nvSpPr>
+        <p:spPr>
+          <a:xfrm>
+            <a:off x="304800" y="1981200"/>
+            <a:ext cx="8534400" cy="4062651"/>
+          </a:xfrm>
+          <a:prstGeom prst="rect">
+            <a:avLst/>
+          </a:prstGeom>
+          <a:noFill/>
+        </p:spPr>
+        <p:txBody>
+          <a:bodyPr wrap="square" rtlCol="0">
+            <a:spAutoFit/>
+          </a:bodyPr>
+          <a:lstStyle/>
+          <a:p>
+            <a:pPr lvl="0">
+              <a:lnSpc>
+                <a:spcPct val="150000"/>
+              </a:lnSpc>
+            </a:pPr>
+            <a:r>
+              <a:rPr lang="es-CO" sz="1200" b="1" dirty="0" smtClean="0"/>
+              <a:t>Objetivos: </a:t>
+            </a:r>
+          </a:p>
+          <a:p>
+            <a:pPr>
+              <a:lnSpc>
+                <a:spcPct val="150000"/>
+              </a:lnSpc>
+              <a:buFont typeface="Arial" pitchFamily="34" charset="0"/>
+              <a:buChar char="•"/>
+            </a:pPr>
+            <a:r>
+              <a:rPr lang="es-CO" sz="1200" b="1" dirty="0" smtClean="0"/>
+              <a:t>O1 </a:t>
+            </a:r>
+            <a:r>
+              <a:rPr lang="es-CO" sz="1200" dirty="0" smtClean="0"/>
+              <a:t>Todos los miembros reportan los datos de las actividades con exactitud.</a:t>
+            </a:r>
+          </a:p>
+          <a:p>
+            <a:pPr lvl="1">
+              <a:lnSpc>
+                <a:spcPct val="150000"/>
+              </a:lnSpc>
+              <a:buFont typeface="Arial" pitchFamily="34" charset="0"/>
+              <a:buChar char="•"/>
+            </a:pPr>
+            <a:r>
+              <a:rPr lang="es-CO" sz="1200" dirty="0" smtClean="0"/>
+              <a:t>M1: Reportar el 100%  de las tareas realizadas</a:t>
+            </a:r>
+          </a:p>
+          <a:p>
+            <a:pPr>
+              <a:lnSpc>
+                <a:spcPct val="150000"/>
+              </a:lnSpc>
+              <a:buFont typeface="Arial" pitchFamily="34" charset="0"/>
+              <a:buChar char="•"/>
+            </a:pPr>
+            <a:r>
+              <a:rPr lang="es-CO" sz="1200" b="1" dirty="0" smtClean="0"/>
+              <a:t>O2 </a:t>
+            </a:r>
+            <a:r>
+              <a:rPr lang="es-CO" sz="1200" dirty="0" smtClean="0"/>
+              <a:t>El equipo sigue el </a:t>
+            </a:r>
+            <a:r>
+              <a:rPr lang="es-CO" sz="1200" dirty="0" err="1" smtClean="0"/>
+              <a:t>TSPi</a:t>
+            </a:r>
+            <a:r>
+              <a:rPr lang="es-CO" sz="1200" dirty="0" smtClean="0"/>
+              <a:t> y produce un plan de cualidad.</a:t>
+            </a:r>
+          </a:p>
+          <a:p>
+            <a:pPr marL="457200" lvl="2">
+              <a:lnSpc>
+                <a:spcPct val="150000"/>
+              </a:lnSpc>
+              <a:buFont typeface="Arial" pitchFamily="34" charset="0"/>
+              <a:buChar char="•"/>
+            </a:pPr>
+            <a:r>
+              <a:rPr lang="es-CO" sz="1200" dirty="0" smtClean="0"/>
+              <a:t>M2:Cumplir con las reglas , horarios y tareas en mas del 90%  y producir el plan de calidad</a:t>
+            </a:r>
+          </a:p>
+          <a:p>
+            <a:pPr>
+              <a:lnSpc>
+                <a:spcPct val="150000"/>
+              </a:lnSpc>
+              <a:buFont typeface="Arial" pitchFamily="34" charset="0"/>
+              <a:buChar char="•"/>
+            </a:pPr>
+            <a:r>
+              <a:rPr lang="es-CO" sz="1200" b="1" dirty="0" smtClean="0"/>
+              <a:t>O3</a:t>
+            </a:r>
+            <a:r>
+              <a:rPr lang="es-CO" sz="1200" dirty="0" smtClean="0"/>
+              <a:t>Todo el equipo de inspección son correctamente moderado y reportado.</a:t>
+            </a:r>
+          </a:p>
+          <a:p>
+            <a:pPr marL="457200" lvl="3">
+              <a:lnSpc>
+                <a:spcPct val="150000"/>
+              </a:lnSpc>
+              <a:buFont typeface="Arial" pitchFamily="34" charset="0"/>
+              <a:buChar char="•"/>
+            </a:pPr>
+            <a:r>
+              <a:rPr lang="es-CO" sz="1200" dirty="0" smtClean="0"/>
+              <a:t>M3:Reportar el 70% de los defectos en codificación y que el resultado sea confiable.</a:t>
+            </a:r>
+            <a:r>
+              <a:rPr lang="es-CO" sz="1200" b="1" dirty="0" smtClean="0"/>
+              <a:t> </a:t>
+            </a:r>
+          </a:p>
+          <a:p>
+            <a:pPr marL="457200" lvl="3">
+              <a:lnSpc>
+                <a:spcPct val="150000"/>
+              </a:lnSpc>
+              <a:buFont typeface="Arial" pitchFamily="34" charset="0"/>
+              <a:buChar char="•"/>
+            </a:pPr>
+            <a:endParaRPr lang="es-CO" sz="1200" dirty="0" smtClean="0"/>
+          </a:p>
+          <a:p>
+            <a:pPr lvl="0">
+              <a:lnSpc>
+                <a:spcPct val="150000"/>
+              </a:lnSpc>
+            </a:pPr>
+            <a:r>
+              <a:rPr lang="es-CO" sz="1200" b="1" dirty="0" smtClean="0"/>
+              <a:t>Resultados:</a:t>
+            </a:r>
+          </a:p>
+          <a:p>
+            <a:pPr>
+              <a:lnSpc>
+                <a:spcPct val="150000"/>
+              </a:lnSpc>
+              <a:buFont typeface="Arial" pitchFamily="34" charset="0"/>
+              <a:buChar char="•"/>
+            </a:pPr>
+            <a:r>
+              <a:rPr lang="es-CO" sz="1200" b="1" dirty="0" smtClean="0"/>
+              <a:t>R1 </a:t>
+            </a:r>
+            <a:r>
+              <a:rPr lang="es-CO" sz="1200" dirty="0" smtClean="0"/>
+              <a:t>Se reportaron el 100% de las tareas realizadas</a:t>
+            </a:r>
+          </a:p>
+          <a:p>
+            <a:pPr>
+              <a:lnSpc>
+                <a:spcPct val="150000"/>
+              </a:lnSpc>
+              <a:buFont typeface="Arial" pitchFamily="34" charset="0"/>
+              <a:buChar char="•"/>
+            </a:pPr>
+            <a:r>
+              <a:rPr lang="es-CO" sz="1200" b="1" dirty="0" smtClean="0"/>
+              <a:t>R2 </a:t>
+            </a:r>
+            <a:r>
+              <a:rPr lang="es-CO" sz="1200" dirty="0" smtClean="0"/>
+              <a:t>Se produjo el plan de calidad y se cumplieron con las tareas , reglas y horarios en mas de 90 %</a:t>
+            </a:r>
+          </a:p>
+          <a:p>
+            <a:pPr>
+              <a:lnSpc>
+                <a:spcPct val="150000"/>
+              </a:lnSpc>
+              <a:buFont typeface="Arial" pitchFamily="34" charset="0"/>
+              <a:buChar char="•"/>
+            </a:pPr>
+            <a:r>
+              <a:rPr lang="es-CO" sz="1200" b="1" dirty="0" smtClean="0"/>
+              <a:t>R3 </a:t>
+            </a:r>
+            <a:r>
+              <a:rPr lang="es-CO" sz="1200" dirty="0" smtClean="0"/>
+              <a:t>Se reporto mas de l 70 %  de los defectos planeado para la inspección, pero el reporte no es confiable porque las coincidencias de defectos entre los inspectores no alcanzo el 70%</a:t>
+            </a:r>
+          </a:p>
+          <a:p>
+            <a:pPr lvl="0"/>
+            <a:endParaRPr lang="es-CO" sz="1200" b="1" dirty="0" smtClean="0"/>
+          </a:p>
+          <a:p>
+            <a:pPr lvl="0"/>
+            <a:r>
+              <a:rPr lang="en-US" sz="1200" b="1" dirty="0" smtClean="0"/>
+              <a:t>	</a:t>
+            </a:r>
+            <a:endParaRPr lang="es-CO" sz="1200" b="1" dirty="0" smtClean="0"/>
+          </a:p>
+        </p:txBody>
+      </p:sp>
+    </p:spTree>
+  </p:cSld>
+  <p:clrMapOvr>
+    <a:masterClrMapping/>
+  </p:clrMapOvr>
+  <p:timing>
+    <p:tnLst>
+      <p:par>
+        <p:cTn id="1" dur="indefinite" restart="never" nodeType="tmRoot"/>
+      </p:par>
+    </p:tnLst>
+  </p:timing>
+</p:sld>
+</file>
+
+<file path=ppt/slides/slide16.xml><?xml version="1.0" encoding="utf-8"?>
+<p:sld xmlns:a="http://schemas.openxmlformats.org/drawingml/2006/main" xmlns:r="http://schemas.openxmlformats.org/officeDocument/2006/relationships" xmlns:p="http://schemas.openxmlformats.org/presentationml/2006/main">
+  <p:cSld>
+    <p:spTree>
+      <p:nvGrpSpPr>
+        <p:cNvPr id="1" name=""/>
+        <p:cNvGrpSpPr/>
+        <p:nvPr/>
+      </p:nvGrpSpPr>
+      <p:grpSpPr>
+        <a:xfrm>
+          <a:off x="0" y="0"/>
+          <a:ext cx="0" cy="0"/>
+          <a:chOff x="0" y="0"/>
+          <a:chExt cx="0" cy="0"/>
+        </a:xfrm>
+      </p:grpSpPr>
+      <p:sp>
+        <p:nvSpPr>
+          <p:cNvPr id="2" name="1 Título"/>
+          <p:cNvSpPr>
+            <a:spLocks noGrp="1"/>
+          </p:cNvSpPr>
+          <p:nvPr>
+            <p:ph type="title"/>
+          </p:nvPr>
+        </p:nvSpPr>
+        <p:spPr/>
+        <p:txBody>
+          <a:bodyPr>
+            <a:normAutofit/>
+          </a:bodyPr>
+          <a:lstStyle/>
+          <a:p>
+            <a:r>
+              <a:rPr lang="es-CO" sz="2400" dirty="0" smtClean="0"/>
+              <a:t>EQUIPO</a:t>
+            </a:r>
+            <a:br>
+              <a:rPr lang="es-CO" sz="2400" dirty="0" smtClean="0"/>
+            </a:br>
+            <a:r>
+              <a:rPr lang="es-CO" sz="2400" dirty="0" err="1" smtClean="0"/>
+              <a:t>lider</a:t>
+            </a:r>
+            <a:r>
+              <a:rPr lang="es-CO" sz="2400" dirty="0" smtClean="0"/>
+              <a:t> de desarrollo</a:t>
+            </a:r>
+            <a:endParaRPr lang="en-US" sz="2400" dirty="0"/>
+          </a:p>
+        </p:txBody>
+      </p:sp>
+      <p:pic>
+        <p:nvPicPr>
+          <p:cNvPr id="4" name="3 Imagen" descr="ingenium-logo.png"/>
+          <p:cNvPicPr>
+            <a:picLocks noChangeAspect="1"/>
+          </p:cNvPicPr>
+          <p:nvPr/>
+        </p:nvPicPr>
+        <p:blipFill>
+          <a:blip r:embed="rId2" cstate="print"/>
+          <a:stretch>
+            <a:fillRect/>
+          </a:stretch>
+        </p:blipFill>
+        <p:spPr>
+          <a:xfrm>
+            <a:off x="5867400" y="228600"/>
+            <a:ext cx="3048006" cy="1021082"/>
+          </a:xfrm>
+          <a:prstGeom prst="rect">
+            <a:avLst/>
+          </a:prstGeom>
+        </p:spPr>
+      </p:pic>
+      <p:sp>
+        <p:nvSpPr>
+          <p:cNvPr id="5" name="4 CuadroTexto"/>
+          <p:cNvSpPr txBox="1"/>
+          <p:nvPr/>
+        </p:nvSpPr>
+        <p:spPr>
+          <a:xfrm>
+            <a:off x="228600" y="1676400"/>
+            <a:ext cx="8534400" cy="4708981"/>
+          </a:xfrm>
+          <a:prstGeom prst="rect">
+            <a:avLst/>
+          </a:prstGeom>
+          <a:noFill/>
+        </p:spPr>
+        <p:txBody>
+          <a:bodyPr wrap="square" rtlCol="0">
+            <a:spAutoFit/>
+          </a:bodyPr>
+          <a:lstStyle/>
+          <a:p>
+            <a:r>
+              <a:rPr lang="es-CO" sz="1200" b="1" dirty="0" smtClean="0"/>
+              <a:t>Objetivos Definidos por Rol: </a:t>
+            </a:r>
+            <a:r>
+              <a:rPr lang="es-CO" sz="1200" dirty="0" smtClean="0"/>
+              <a:t/>
+            </a:r>
+            <a:br>
+              <a:rPr lang="es-CO" sz="1200" dirty="0" smtClean="0"/>
+            </a:br>
+            <a:r>
+              <a:rPr lang="es-CO" sz="1200" dirty="0" smtClean="0"/>
+              <a:t>Obj1</a:t>
+            </a:r>
+            <a:r>
+              <a:rPr lang="es-CO" sz="1200" dirty="0" smtClean="0">
+                <a:solidFill>
+                  <a:srgbClr val="000000"/>
+                </a:solidFill>
+                <a:latin typeface="Calibri"/>
+              </a:rPr>
+              <a:t> Producir un producto dentro del tiempo establecido</a:t>
+            </a:r>
+            <a:endParaRPr lang="es-CO" sz="1200" dirty="0" smtClean="0"/>
+          </a:p>
+          <a:p>
+            <a:r>
+              <a:rPr lang="es-CO" sz="1200" dirty="0" smtClean="0"/>
+              <a:t>	M1: </a:t>
+            </a:r>
+            <a:r>
+              <a:rPr lang="es-CO" sz="1200" dirty="0" smtClean="0">
+                <a:solidFill>
+                  <a:srgbClr val="000000"/>
+                </a:solidFill>
+                <a:latin typeface="Calibri"/>
+              </a:rPr>
+              <a:t>Implementar el 100% de los requerimientos</a:t>
+            </a:r>
+            <a:endParaRPr lang="es-CO" sz="1200" dirty="0" smtClean="0"/>
+          </a:p>
+          <a:p>
+            <a:r>
+              <a:rPr lang="es-CO" sz="1200" dirty="0" smtClean="0"/>
+              <a:t>Obj2. </a:t>
+            </a:r>
+            <a:r>
+              <a:rPr lang="es-CO" sz="1200" dirty="0" smtClean="0">
+                <a:solidFill>
+                  <a:srgbClr val="000000"/>
+                </a:solidFill>
+                <a:latin typeface="Calibri"/>
+              </a:rPr>
+              <a:t>Estimar de una manera acertada.</a:t>
+            </a:r>
+            <a:endParaRPr lang="es-CO" sz="1200" dirty="0" smtClean="0"/>
+          </a:p>
+          <a:p>
+            <a:r>
+              <a:rPr lang="es-CO" sz="1200" dirty="0" smtClean="0"/>
+              <a:t>	M1: </a:t>
+            </a:r>
+            <a:r>
+              <a:rPr lang="es-CO" sz="1200" dirty="0" smtClean="0">
+                <a:solidFill>
+                  <a:srgbClr val="000000"/>
+                </a:solidFill>
+                <a:latin typeface="Calibri"/>
+              </a:rPr>
+              <a:t>Tener una estimación que no supere el 20% de desfase]</a:t>
+            </a:r>
+            <a:endParaRPr lang="es-CO" sz="1200" dirty="0" smtClean="0"/>
+          </a:p>
+          <a:p>
+            <a:r>
+              <a:rPr lang="es-CO" sz="1200" dirty="0" err="1" smtClean="0">
+                <a:solidFill>
+                  <a:srgbClr val="000000"/>
+                </a:solidFill>
+                <a:latin typeface="Calibri"/>
+              </a:rPr>
+              <a:t>Obj</a:t>
+            </a:r>
+            <a:r>
+              <a:rPr lang="es-CO" sz="1200" dirty="0" smtClean="0">
+                <a:solidFill>
+                  <a:srgbClr val="000000"/>
+                </a:solidFill>
+                <a:latin typeface="Calibri"/>
+              </a:rPr>
+              <a:t> 3. Asignar labores de desarrollo de una manera equitativa</a:t>
+            </a:r>
+          </a:p>
+          <a:p>
+            <a:r>
+              <a:rPr lang="es-CO" sz="1200" dirty="0" smtClean="0"/>
+              <a:t>	M1: </a:t>
+            </a:r>
+            <a:r>
+              <a:rPr lang="es-CO" sz="1200" dirty="0" smtClean="0">
+                <a:solidFill>
+                  <a:srgbClr val="000000"/>
+                </a:solidFill>
+                <a:latin typeface="Calibri"/>
+              </a:rPr>
+              <a:t>Cada integrante debería realizar 155,6 con un 20% de margen de error. [124,48 - 186,72]</a:t>
+            </a:r>
+          </a:p>
+          <a:p>
+            <a:endParaRPr lang="en-US" sz="1200" dirty="0" smtClean="0"/>
+          </a:p>
+          <a:p>
+            <a:r>
+              <a:rPr lang="es-CO" sz="1200" b="1" dirty="0" smtClean="0"/>
+              <a:t> </a:t>
+            </a:r>
+            <a:endParaRPr lang="en-US" sz="1200" dirty="0" smtClean="0"/>
+          </a:p>
+          <a:p>
+            <a:pPr lvl="0"/>
+            <a:r>
+              <a:rPr lang="es-CO" sz="1200" b="1" dirty="0" smtClean="0"/>
+              <a:t>Cumplimiento de los objetivos durante el ciclo: </a:t>
+            </a:r>
+          </a:p>
+          <a:p>
+            <a:r>
+              <a:rPr lang="es-CO" sz="1200" dirty="0" smtClean="0"/>
+              <a:t>Obj1: </a:t>
+            </a:r>
+            <a:r>
+              <a:rPr lang="es-CO" sz="1200" dirty="0" smtClean="0">
+                <a:solidFill>
+                  <a:srgbClr val="000000"/>
+                </a:solidFill>
+                <a:latin typeface="Calibri"/>
+              </a:rPr>
+              <a:t>Objetivo Cumplido. 100% de los requerimientos implementados</a:t>
+            </a:r>
+          </a:p>
+          <a:p>
+            <a:pPr lvl="0"/>
+            <a:endParaRPr lang="es-CO" sz="1200" dirty="0" smtClean="0"/>
+          </a:p>
+          <a:p>
+            <a:r>
+              <a:rPr lang="es-CO" sz="1200" dirty="0" smtClean="0"/>
+              <a:t>Obj2: 	</a:t>
+            </a:r>
+            <a:r>
+              <a:rPr lang="es-CO" sz="1200" dirty="0" smtClean="0">
+                <a:solidFill>
+                  <a:srgbClr val="000000"/>
+                </a:solidFill>
+                <a:latin typeface="Calibri"/>
+              </a:rPr>
+              <a:t>LOC Planeadas: 934</a:t>
+            </a:r>
+            <a:br>
+              <a:rPr lang="es-CO" sz="1200" dirty="0" smtClean="0">
+                <a:solidFill>
+                  <a:srgbClr val="000000"/>
+                </a:solidFill>
+                <a:latin typeface="Calibri"/>
+              </a:rPr>
+            </a:br>
+            <a:r>
+              <a:rPr lang="es-CO" sz="1200" dirty="0" smtClean="0">
+                <a:solidFill>
+                  <a:srgbClr val="000000"/>
+                </a:solidFill>
+                <a:latin typeface="Calibri"/>
+              </a:rPr>
+              <a:t>	LOC Reales: 1140</a:t>
+            </a:r>
+            <a:br>
+              <a:rPr lang="es-CO" sz="1200" dirty="0" smtClean="0">
+                <a:solidFill>
+                  <a:srgbClr val="000000"/>
+                </a:solidFill>
+                <a:latin typeface="Calibri"/>
+              </a:rPr>
+            </a:br>
+            <a:r>
+              <a:rPr lang="es-CO" sz="1200" dirty="0" smtClean="0">
+                <a:solidFill>
+                  <a:srgbClr val="000000"/>
+                </a:solidFill>
+                <a:latin typeface="Calibri"/>
+              </a:rPr>
+              <a:t>	Porcentaje: 22,05%</a:t>
+            </a:r>
+            <a:br>
+              <a:rPr lang="es-CO" sz="1200" dirty="0" smtClean="0">
+                <a:solidFill>
+                  <a:srgbClr val="000000"/>
+                </a:solidFill>
+                <a:latin typeface="Calibri"/>
+              </a:rPr>
+            </a:br>
+            <a:r>
+              <a:rPr lang="es-CO" sz="1200" dirty="0" smtClean="0">
+                <a:solidFill>
+                  <a:srgbClr val="000000"/>
+                </a:solidFill>
+                <a:latin typeface="Calibri"/>
+              </a:rPr>
+              <a:t>	Objetivo muy cerca de cumplirse. No se cumplió</a:t>
+            </a:r>
+          </a:p>
+          <a:p>
+            <a:pPr lvl="0"/>
+            <a:endParaRPr lang="es-CO" sz="1200" dirty="0" smtClean="0"/>
+          </a:p>
+          <a:p>
+            <a:r>
+              <a:rPr lang="es-CO" sz="1200" dirty="0" smtClean="0"/>
+              <a:t>Obj3: 	</a:t>
+            </a:r>
+            <a:r>
+              <a:rPr lang="es-CO" sz="1200" dirty="0" smtClean="0">
+                <a:solidFill>
+                  <a:srgbClr val="000000"/>
+                </a:solidFill>
+                <a:latin typeface="Calibri"/>
+              </a:rPr>
+              <a:t>Erik: 260</a:t>
+            </a:r>
+            <a:br>
+              <a:rPr lang="es-CO" sz="1200" dirty="0" smtClean="0">
+                <a:solidFill>
+                  <a:srgbClr val="000000"/>
+                </a:solidFill>
+                <a:latin typeface="Calibri"/>
+              </a:rPr>
+            </a:br>
+            <a:r>
+              <a:rPr lang="es-CO" sz="1200" dirty="0" smtClean="0">
+                <a:solidFill>
+                  <a:srgbClr val="000000"/>
+                </a:solidFill>
+                <a:latin typeface="Calibri"/>
+              </a:rPr>
+              <a:t>	Sandra: 212</a:t>
+            </a:r>
+            <a:br>
+              <a:rPr lang="es-CO" sz="1200" dirty="0" smtClean="0">
+                <a:solidFill>
+                  <a:srgbClr val="000000"/>
+                </a:solidFill>
+                <a:latin typeface="Calibri"/>
+              </a:rPr>
+            </a:br>
+            <a:r>
+              <a:rPr lang="es-CO" sz="1200" dirty="0" smtClean="0">
+                <a:solidFill>
+                  <a:srgbClr val="000000"/>
+                </a:solidFill>
+                <a:latin typeface="Calibri"/>
+              </a:rPr>
+              <a:t>	</a:t>
+            </a:r>
+            <a:r>
+              <a:rPr lang="es-CO" sz="1200" dirty="0" err="1" smtClean="0">
+                <a:solidFill>
+                  <a:srgbClr val="000000"/>
+                </a:solidFill>
+                <a:latin typeface="Calibri"/>
+              </a:rPr>
+              <a:t>Willian</a:t>
+            </a:r>
+            <a:r>
+              <a:rPr lang="es-CO" sz="1200" dirty="0" smtClean="0">
+                <a:solidFill>
+                  <a:srgbClr val="000000"/>
+                </a:solidFill>
+                <a:latin typeface="Calibri"/>
+              </a:rPr>
+              <a:t>: 234</a:t>
+            </a:r>
+            <a:br>
+              <a:rPr lang="es-CO" sz="1200" dirty="0" smtClean="0">
+                <a:solidFill>
+                  <a:srgbClr val="000000"/>
+                </a:solidFill>
+                <a:latin typeface="Calibri"/>
+              </a:rPr>
+            </a:br>
+            <a:r>
+              <a:rPr lang="es-CO" sz="1200" dirty="0" smtClean="0">
+                <a:solidFill>
+                  <a:srgbClr val="000000"/>
+                </a:solidFill>
+                <a:latin typeface="Calibri"/>
+              </a:rPr>
+              <a:t>	Carlos: 155</a:t>
+            </a:r>
+            <a:br>
+              <a:rPr lang="es-CO" sz="1200" dirty="0" smtClean="0">
+                <a:solidFill>
+                  <a:srgbClr val="000000"/>
+                </a:solidFill>
+                <a:latin typeface="Calibri"/>
+              </a:rPr>
+            </a:br>
+            <a:r>
+              <a:rPr lang="es-CO" sz="1200" dirty="0" smtClean="0">
+                <a:solidFill>
+                  <a:srgbClr val="000000"/>
+                </a:solidFill>
+                <a:latin typeface="Calibri"/>
+              </a:rPr>
+              <a:t>	David: 127</a:t>
+            </a:r>
+            <a:br>
+              <a:rPr lang="es-CO" sz="1200" dirty="0" smtClean="0">
+                <a:solidFill>
+                  <a:srgbClr val="000000"/>
+                </a:solidFill>
+                <a:latin typeface="Calibri"/>
+              </a:rPr>
+            </a:br>
+            <a:r>
+              <a:rPr lang="es-CO" sz="1200" dirty="0" smtClean="0">
+                <a:solidFill>
+                  <a:srgbClr val="000000"/>
+                </a:solidFill>
+                <a:latin typeface="Calibri"/>
+              </a:rPr>
+              <a:t>	Mauricio: 152</a:t>
+            </a:r>
+            <a:br>
+              <a:rPr lang="es-CO" sz="1200" dirty="0" smtClean="0">
+                <a:solidFill>
+                  <a:srgbClr val="000000"/>
+                </a:solidFill>
+                <a:latin typeface="Calibri"/>
+              </a:rPr>
+            </a:br>
+            <a:r>
+              <a:rPr lang="es-CO" sz="1200" dirty="0" smtClean="0">
+                <a:solidFill>
+                  <a:srgbClr val="000000"/>
+                </a:solidFill>
+                <a:latin typeface="Calibri"/>
+              </a:rPr>
+              <a:t>	Más de lo esperado:  Erik, Sandra, </a:t>
+            </a:r>
+            <a:r>
+              <a:rPr lang="es-CO" sz="1200" dirty="0" err="1" smtClean="0">
+                <a:solidFill>
+                  <a:srgbClr val="000000"/>
+                </a:solidFill>
+                <a:latin typeface="Calibri"/>
+              </a:rPr>
+              <a:t>Willian</a:t>
+            </a:r>
+            <a:r>
+              <a:rPr lang="es-CO" sz="1200" dirty="0" smtClean="0">
+                <a:solidFill>
+                  <a:srgbClr val="000000"/>
+                </a:solidFill>
+                <a:latin typeface="Calibri"/>
+              </a:rPr>
+              <a:t>.</a:t>
+            </a:r>
+            <a:br>
+              <a:rPr lang="es-CO" sz="1200" dirty="0" smtClean="0">
+                <a:solidFill>
+                  <a:srgbClr val="000000"/>
+                </a:solidFill>
+                <a:latin typeface="Calibri"/>
+              </a:rPr>
+            </a:br>
+            <a:r>
+              <a:rPr lang="es-CO" sz="1200" dirty="0" smtClean="0">
+                <a:solidFill>
+                  <a:srgbClr val="000000"/>
+                </a:solidFill>
+                <a:latin typeface="Calibri"/>
+              </a:rPr>
+              <a:t>	Objetivo no cumplido</a:t>
+            </a:r>
+            <a:endParaRPr lang="en-US" sz="1200" dirty="0" smtClean="0"/>
+          </a:p>
+        </p:txBody>
+      </p:sp>
+    </p:spTree>
+  </p:cSld>
+  <p:clrMapOvr>
+    <a:masterClrMapping/>
+  </p:clrMapOvr>
+  <p:timing>
+    <p:tnLst>
+      <p:par>
+        <p:cTn id="1" dur="indefinite" restart="never" nodeType="tmRoot"/>
+      </p:par>
+    </p:tnLst>
+  </p:timing>
+</p:sld>
+</file>
+
+<file path=ppt/slides/slide17.xml><?xml version="1.0" encoding="utf-8"?>
+<p:sld xmlns:a="http://schemas.openxmlformats.org/drawingml/2006/main" xmlns:r="http://schemas.openxmlformats.org/officeDocument/2006/relationships" xmlns:p="http://schemas.openxmlformats.org/presentationml/2006/main">
+  <p:cSld>
+    <p:spTree>
+      <p:nvGrpSpPr>
+        <p:cNvPr id="1" name=""/>
+        <p:cNvGrpSpPr/>
+        <p:nvPr/>
+      </p:nvGrpSpPr>
+      <p:grpSpPr>
+        <a:xfrm>
+          <a:off x="0" y="0"/>
+          <a:ext cx="0" cy="0"/>
+          <a:chOff x="0" y="0"/>
+          <a:chExt cx="0" cy="0"/>
+        </a:xfrm>
+      </p:grpSpPr>
+      <p:sp>
+        <p:nvSpPr>
+          <p:cNvPr id="2" name="1 Título"/>
+          <p:cNvSpPr>
+            <a:spLocks noGrp="1"/>
+          </p:cNvSpPr>
+          <p:nvPr>
+            <p:ph type="title"/>
+          </p:nvPr>
+        </p:nvSpPr>
+        <p:spPr/>
+        <p:txBody>
+          <a:bodyPr>
+            <a:normAutofit/>
+          </a:bodyPr>
+          <a:lstStyle/>
+          <a:p>
+            <a:r>
+              <a:rPr lang="es-CO" sz="2400" dirty="0" smtClean="0"/>
               <a:t>PROPUESTA  DE MEJORAMIENTO</a:t>
             </a:r>
             <a:endParaRPr lang="en-US" sz="2400" dirty="0"/>
@@ -8955,7 +9343,7 @@
           <p:nvPr/>
         </p:nvPicPr>
         <p:blipFill>
-          <a:blip r:embed="rId7" cstate="print"/>
+          <a:blip r:embed="rId6" cstate="print"/>
           <a:stretch>
             <a:fillRect/>
           </a:stretch>
@@ -15595,18 +15983,7 @@
           <a:p>
             <a:r>
               <a:rPr lang="es-CO" sz="2400" dirty="0" smtClean="0"/>
-              <a:t>EQUIPO</a:t>
-            </a:r>
-            <a:br>
-              <a:rPr lang="es-CO" sz="2400" dirty="0" smtClean="0"/>
-            </a:br>
-            <a:r>
-              <a:rPr lang="es-CO" sz="2400" dirty="0" err="1" smtClean="0"/>
-              <a:t>lider</a:t>
-            </a:r>
-            <a:r>
-              <a:rPr lang="es-CO" sz="2400" dirty="0" smtClean="0"/>
-              <a:t> del grupo</a:t>
+              <a:t>Evolución del Producto</a:t>
             </a:r>
             <a:endParaRPr lang="en-US" sz="2400" dirty="0"/>
           </a:p>
@@ -15636,6 +16013,228 @@
           </a:prstGeom>
         </p:spPr>
       </p:pic>
+      <p:pic>
+        <p:nvPicPr>
+          <p:cNvPr id="1026" name="Picture 2"/>
+          <p:cNvPicPr>
+            <a:picLocks noChangeAspect="1" noChangeArrowheads="1"/>
+          </p:cNvPicPr>
+          <p:nvPr/>
+        </p:nvPicPr>
+        <p:blipFill>
+          <a:blip r:embed="rId3"/>
+          <a:srcRect/>
+          <a:stretch>
+            <a:fillRect/>
+          </a:stretch>
+        </p:blipFill>
+        <p:spPr bwMode="auto">
+          <a:xfrm>
+            <a:off x="228600" y="1676400"/>
+            <a:ext cx="3276600" cy="2678570"/>
+          </a:xfrm>
+          <a:prstGeom prst="rect">
+            <a:avLst/>
+          </a:prstGeom>
+          <a:noFill/>
+          <a:ln w="9525">
+            <a:noFill/>
+            <a:miter lim="800000"/>
+            <a:headEnd/>
+            <a:tailEnd/>
+          </a:ln>
+          <a:effectLst/>
+        </p:spPr>
+      </p:pic>
+      <p:pic>
+        <p:nvPicPr>
+          <p:cNvPr id="6" name="5 Imagen"/>
+          <p:cNvPicPr>
+            <a:picLocks noChangeAspect="1"/>
+          </p:cNvPicPr>
+          <p:nvPr/>
+        </p:nvPicPr>
+        <p:blipFill>
+          <a:blip r:embed="rId4"/>
+          <a:srcRect/>
+          <a:stretch>
+            <a:fillRect/>
+          </a:stretch>
+        </p:blipFill>
+        <p:spPr bwMode="auto">
+          <a:xfrm>
+            <a:off x="3733800" y="3505200"/>
+            <a:ext cx="5214709" cy="3200400"/>
+          </a:xfrm>
+          <a:prstGeom prst="rect">
+            <a:avLst/>
+          </a:prstGeom>
+          <a:noFill/>
+          <a:ln w="9525">
+            <a:noFill/>
+            <a:miter lim="800000"/>
+            <a:headEnd/>
+            <a:tailEnd/>
+          </a:ln>
+        </p:spPr>
+      </p:pic>
+      <p:sp>
+        <p:nvSpPr>
+          <p:cNvPr id="8" name="7 Flecha derecha"/>
+          <p:cNvSpPr/>
+          <p:nvPr/>
+        </p:nvSpPr>
+        <p:spPr>
+          <a:xfrm rot="2133576">
+            <a:off x="3528666" y="2285111"/>
+            <a:ext cx="2362200" cy="838200"/>
+          </a:xfrm>
+          <a:prstGeom prst="rightArrow">
+            <a:avLst>
+              <a:gd name="adj1" fmla="val 37510"/>
+              <a:gd name="adj2" fmla="val 85875"/>
+            </a:avLst>
+          </a:prstGeom>
+        </p:spPr>
+        <p:style>
+          <a:lnRef idx="1">
+            <a:schemeClr val="accent1"/>
+          </a:lnRef>
+          <a:fillRef idx="3">
+            <a:schemeClr val="accent1"/>
+          </a:fillRef>
+          <a:effectRef idx="2">
+            <a:schemeClr val="accent1"/>
+          </a:effectRef>
+          <a:fontRef idx="minor">
+            <a:schemeClr val="lt1"/>
+          </a:fontRef>
+        </p:style>
+        <p:txBody>
+          <a:bodyPr rtlCol="0" anchor="ctr"/>
+          <a:lstStyle/>
+          <a:p>
+            <a:pPr algn="ctr"/>
+            <a:endParaRPr lang="es-CO"/>
+          </a:p>
+        </p:txBody>
+      </p:sp>
+      <p:sp>
+        <p:nvSpPr>
+          <p:cNvPr id="7" name="6 Rectángulo"/>
+          <p:cNvSpPr/>
+          <p:nvPr/>
+        </p:nvSpPr>
+        <p:spPr>
+          <a:xfrm>
+            <a:off x="228600" y="4419600"/>
+            <a:ext cx="1066800" cy="304800"/>
+          </a:xfrm>
+          <a:prstGeom prst="rect">
+            <a:avLst/>
+          </a:prstGeom>
+        </p:spPr>
+        <p:style>
+          <a:lnRef idx="1">
+            <a:schemeClr val="accent1"/>
+          </a:lnRef>
+          <a:fillRef idx="3">
+            <a:schemeClr val="accent1"/>
+          </a:fillRef>
+          <a:effectRef idx="2">
+            <a:schemeClr val="accent1"/>
+          </a:effectRef>
+          <a:fontRef idx="minor">
+            <a:schemeClr val="lt1"/>
+          </a:fontRef>
+        </p:style>
+        <p:txBody>
+          <a:bodyPr rtlCol="0" anchor="ctr"/>
+          <a:lstStyle/>
+          <a:p>
+            <a:pPr algn="ctr"/>
+            <a:r>
+              <a:rPr lang="es-CO" sz="1600" b="1" dirty="0" smtClean="0">
+                <a:effectLst>
+                  <a:outerShdw blurRad="38100" dist="38100" dir="2700000" algn="tl">
+                    <a:srgbClr val="000000">
+                      <a:alpha val="43137"/>
+                    </a:srgbClr>
+                  </a:outerShdw>
+                </a:effectLst>
+              </a:rPr>
+              <a:t>Ciclo 1</a:t>
+            </a:r>
+            <a:endParaRPr lang="es-CO" sz="1600" b="1" dirty="0">
+              <a:effectLst>
+                <a:outerShdw blurRad="38100" dist="38100" dir="2700000" algn="tl">
+                  <a:srgbClr val="000000">
+                    <a:alpha val="43137"/>
+                  </a:srgbClr>
+                </a:outerShdw>
+              </a:effectLst>
+            </a:endParaRPr>
+          </a:p>
+        </p:txBody>
+      </p:sp>
+      <p:sp>
+        <p:nvSpPr>
+          <p:cNvPr id="9" name="8 Rectángulo"/>
+          <p:cNvSpPr/>
+          <p:nvPr/>
+        </p:nvSpPr>
+        <p:spPr>
+          <a:xfrm>
+            <a:off x="7848600" y="3124200"/>
+            <a:ext cx="1066800" cy="304800"/>
+          </a:xfrm>
+          <a:prstGeom prst="rect">
+            <a:avLst/>
+          </a:prstGeom>
+        </p:spPr>
+        <p:style>
+          <a:lnRef idx="1">
+            <a:schemeClr val="accent1"/>
+          </a:lnRef>
+          <a:fillRef idx="3">
+            <a:schemeClr val="accent1"/>
+          </a:fillRef>
+          <a:effectRef idx="2">
+            <a:schemeClr val="accent1"/>
+          </a:effectRef>
+          <a:fontRef idx="minor">
+            <a:schemeClr val="lt1"/>
+          </a:fontRef>
+        </p:style>
+        <p:txBody>
+          <a:bodyPr rtlCol="0" anchor="ctr"/>
+          <a:lstStyle/>
+          <a:p>
+            <a:pPr algn="ctr"/>
+            <a:r>
+              <a:rPr lang="es-CO" sz="1600" b="1" dirty="0" smtClean="0">
+                <a:effectLst>
+                  <a:outerShdw blurRad="38100" dist="38100" dir="2700000" algn="tl">
+                    <a:srgbClr val="000000">
+                      <a:alpha val="43137"/>
+                    </a:srgbClr>
+                  </a:outerShdw>
+                </a:effectLst>
+              </a:rPr>
+              <a:t>Ciclo 2</a:t>
+            </a:r>
+            <a:endParaRPr lang="es-CO" sz="1600" b="1" dirty="0">
+              <a:effectLst>
+                <a:outerShdw blurRad="38100" dist="38100" dir="2700000" algn="tl">
+                  <a:srgbClr val="000000">
+                    <a:alpha val="43137"/>
+                  </a:srgbClr>
+                </a:outerShdw>
+              </a:effectLst>
+            </a:endParaRPr>
+          </a:p>
+        </p:txBody>
+      </p:sp>
     </p:spTree>
   </p:cSld>
   <p:clrMapOvr>
@@ -15687,18 +16286,7 @@
           <a:p>
             <a:r>
               <a:rPr lang="es-CO" sz="2400" dirty="0" smtClean="0"/>
-              <a:t>EQUIPO</a:t>
-            </a:r>
-            <a:br>
-              <a:rPr lang="es-CO" sz="2400" dirty="0" smtClean="0"/>
-            </a:br>
-            <a:r>
-              <a:rPr lang="es-CO" sz="2400" dirty="0" err="1" smtClean="0"/>
-              <a:t>lider</a:t>
-            </a:r>
-            <a:r>
-              <a:rPr lang="es-CO" sz="2400" dirty="0" smtClean="0"/>
-              <a:t> de planeación</a:t>
+              <a:t>Evolución del Producto</a:t>
             </a:r>
             <a:endParaRPr lang="en-US" sz="2400" dirty="0"/>
           </a:p>
@@ -15728,178 +16316,125 @@
           </a:prstGeom>
         </p:spPr>
       </p:pic>
-      <p:sp>
-        <p:nvSpPr>
-          <p:cNvPr id="6" name="5 CuadroTexto"/>
-          <p:cNvSpPr txBox="1"/>
+      <p:pic>
+        <p:nvPicPr>
+          <p:cNvPr id="9" name="8 Imagen"/>
+          <p:cNvPicPr>
+            <a:picLocks noChangeAspect="1"/>
+          </p:cNvPicPr>
           <p:nvPr/>
-        </p:nvSpPr>
-        <p:spPr>
+        </p:nvPicPr>
+        <p:blipFill>
+          <a:blip r:embed="rId3"/>
+          <a:srcRect/>
+          <a:stretch>
+            <a:fillRect/>
+          </a:stretch>
+        </p:blipFill>
+        <p:spPr bwMode="auto">
           <a:xfrm>
-            <a:off x="228600" y="1676400"/>
-            <a:ext cx="8534400" cy="4524315"/>
+            <a:off x="3266887" y="2743200"/>
+            <a:ext cx="5724713" cy="3962400"/>
           </a:xfrm>
           <a:prstGeom prst="rect">
             <a:avLst/>
           </a:prstGeom>
           <a:noFill/>
+          <a:ln w="9525">
+            <a:noFill/>
+            <a:miter lim="800000"/>
+            <a:headEnd/>
+            <a:tailEnd/>
+          </a:ln>
         </p:spPr>
+      </p:pic>
+      <p:pic>
+        <p:nvPicPr>
+          <p:cNvPr id="10" name="9 Imagen"/>
+          <p:cNvPicPr>
+            <a:picLocks noChangeAspect="1"/>
+          </p:cNvPicPr>
+          <p:nvPr/>
+        </p:nvPicPr>
+        <p:blipFill>
+          <a:blip r:embed="rId4"/>
+          <a:srcRect/>
+          <a:stretch>
+            <a:fillRect/>
+          </a:stretch>
+        </p:blipFill>
+        <p:spPr bwMode="auto">
+          <a:xfrm>
+            <a:off x="228600" y="1618577"/>
+            <a:ext cx="5257800" cy="3639223"/>
+          </a:xfrm>
+          <a:prstGeom prst="rect">
+            <a:avLst/>
+          </a:prstGeom>
+          <a:noFill/>
+          <a:ln w="9525">
+            <a:noFill/>
+            <a:miter lim="800000"/>
+            <a:headEnd/>
+            <a:tailEnd/>
+          </a:ln>
+        </p:spPr>
+      </p:pic>
+      <p:sp>
+        <p:nvSpPr>
+          <p:cNvPr id="11" name="10 Rectángulo"/>
+          <p:cNvSpPr/>
+          <p:nvPr/>
+        </p:nvSpPr>
+        <p:spPr>
+          <a:xfrm>
+            <a:off x="5562600" y="2362200"/>
+            <a:ext cx="1066800" cy="304800"/>
+          </a:xfrm>
+          <a:prstGeom prst="rect">
+            <a:avLst/>
+          </a:prstGeom>
+        </p:spPr>
+        <p:style>
+          <a:lnRef idx="1">
+            <a:schemeClr val="accent1"/>
+          </a:lnRef>
+          <a:fillRef idx="3">
+            <a:schemeClr val="accent1"/>
+          </a:fillRef>
+          <a:effectRef idx="2">
+            <a:schemeClr val="accent1"/>
+          </a:effectRef>
+          <a:fontRef idx="minor">
+            <a:schemeClr val="lt1"/>
+          </a:fontRef>
+        </p:style>
         <p:txBody>
-          <a:bodyPr wrap="square" rtlCol="0">
-            <a:spAutoFit/>
-          </a:bodyPr>
+          <a:bodyPr rtlCol="0" anchor="ctr"/>
           <a:lstStyle/>
           <a:p>
-            <a:r>
-              <a:rPr lang="es-CO" sz="1200" b="1" dirty="0" smtClean="0"/>
-              <a:t>Objetivos Definidos por Rol: </a:t>
-            </a:r>
-            <a:r>
-              <a:rPr lang="es-CO" sz="1200" dirty="0" smtClean="0"/>
-              <a:t/>
-            </a:r>
-            <a:br>
-              <a:rPr lang="es-CO" sz="1200" dirty="0" smtClean="0"/>
-            </a:br>
-            <a:r>
-              <a:rPr lang="es-CO" sz="1200" dirty="0" smtClean="0"/>
-              <a:t>Obj1. Aplicar al ciclo 3 mejoras de acuerdo a la retroalimentación del primer ciclo</a:t>
-            </a:r>
-          </a:p>
-          <a:p>
-            <a:r>
-              <a:rPr lang="es-CO" sz="1200" dirty="0" smtClean="0"/>
-              <a:t>	M1: El desfase de tiempo  estimado del ciclo 3 debe ser menor al 30%</a:t>
-            </a:r>
-          </a:p>
-          <a:p>
-            <a:r>
-              <a:rPr lang="es-CO" sz="1200" dirty="0" smtClean="0"/>
-              <a:t>	M2: El desfase de tiempo  estimado por fase debe ser menor al 30%</a:t>
-            </a:r>
-          </a:p>
-          <a:p>
-            <a:r>
-              <a:rPr lang="es-CO" sz="1200" dirty="0" smtClean="0"/>
-              <a:t>Obj2. Realizar seguimiento para el cumplimiento  de actividades</a:t>
-            </a:r>
-          </a:p>
-          <a:p>
-            <a:r>
-              <a:rPr lang="es-CO" sz="1200" dirty="0" smtClean="0"/>
-              <a:t>	M1: Todos los integrantes deberán entregar sus asignaciones máximo con un día de retraso de la fecha  de entrega 	planeada.</a:t>
-            </a:r>
-            <a:endParaRPr lang="en-US" sz="1200" dirty="0" smtClean="0"/>
-          </a:p>
-          <a:p>
-            <a:r>
-              <a:rPr lang="es-CO" sz="1200" b="1" dirty="0" smtClean="0"/>
-              <a:t> </a:t>
-            </a:r>
-            <a:endParaRPr lang="en-US" sz="1200" dirty="0" smtClean="0"/>
-          </a:p>
-          <a:p>
-            <a:pPr lvl="0"/>
-            <a:r>
-              <a:rPr lang="es-CO" sz="1200" b="1" dirty="0" smtClean="0"/>
-              <a:t>Cumplimiento de los objetivos durante el ciclo: </a:t>
-            </a:r>
-          </a:p>
-          <a:p>
-            <a:pPr lvl="0"/>
-            <a:r>
-              <a:rPr lang="es-CO" sz="1200" dirty="0" smtClean="0"/>
-              <a:t>Obj1: No se cumplió ya que fue del 37%</a:t>
-            </a:r>
-          </a:p>
-          <a:p>
-            <a:pPr lvl="0"/>
-            <a:r>
-              <a:rPr lang="es-CO" sz="1200" dirty="0" smtClean="0"/>
-              <a:t>Obj2: Se cumplió exitosamente</a:t>
-            </a:r>
-          </a:p>
-          <a:p>
-            <a:pPr lvl="0"/>
-            <a:r>
-              <a:rPr lang="es-CO" sz="1200" b="1" dirty="0" smtClean="0"/>
-              <a:t> </a:t>
-            </a:r>
-            <a:endParaRPr lang="en-US" sz="1200" dirty="0" smtClean="0"/>
-          </a:p>
-          <a:p>
-            <a:pPr lvl="0"/>
-            <a:r>
-              <a:rPr lang="es-CO" sz="1200" b="1" dirty="0" smtClean="0"/>
-              <a:t>Inconvenientes:  </a:t>
-            </a:r>
-            <a:r>
-              <a:rPr lang="es-CO" sz="1200" dirty="0" smtClean="0"/>
-              <a:t>Disponibilidad de los integrantes, registro de actividades por el formulario general.</a:t>
-            </a:r>
-          </a:p>
-          <a:p>
-            <a:pPr lvl="0"/>
-            <a:endParaRPr lang="es-CO" sz="1200" b="1" dirty="0" smtClean="0"/>
-          </a:p>
-          <a:p>
-            <a:pPr lvl="0"/>
-            <a:r>
-              <a:rPr lang="es-CO" sz="1200" b="1" dirty="0" smtClean="0"/>
-              <a:t>Aspectos a Mejorar: </a:t>
-            </a:r>
-            <a:r>
-              <a:rPr lang="es-CO" sz="1200" dirty="0" smtClean="0"/>
-              <a:t>Seguimiento del registro de actividades, y consultar disponibilidad de tiempos de cada integrante.</a:t>
-            </a:r>
-          </a:p>
-          <a:p>
-            <a:endParaRPr lang="es-CO" sz="1200" dirty="0" smtClean="0"/>
-          </a:p>
-          <a:p>
-            <a:pPr lvl="0"/>
-            <a:r>
-              <a:rPr lang="es-CO" sz="1200" b="1" dirty="0" smtClean="0"/>
-              <a:t>¿Qué nos faltó como grupo en este ciclo?: </a:t>
-            </a:r>
-            <a:r>
-              <a:rPr lang="es-CO" sz="1200" dirty="0" smtClean="0"/>
-              <a:t>Todos los integrantes  mostraron un alto  interés y acompañamiento a los demás integrantes..</a:t>
-            </a:r>
-            <a:endParaRPr lang="en-US" sz="1200" dirty="0" smtClean="0"/>
-          </a:p>
-          <a:p>
-            <a:pPr lvl="0"/>
-            <a:endParaRPr lang="es-CO" sz="1200" b="1" dirty="0" smtClean="0"/>
-          </a:p>
-          <a:p>
-            <a:r>
-              <a:rPr lang="es-CO" sz="1200" b="1" dirty="0" smtClean="0"/>
-              <a:t>¿Qué etapas fueron las más difíciles? Porqué? : </a:t>
-            </a:r>
-            <a:r>
-              <a:rPr lang="es-CO" sz="1200" dirty="0" smtClean="0"/>
-              <a:t>Retroalimentación debido al análisis que se debía hacer del ciclo anterior y encontrar los puntos que se deben mejorar de acuerdo a eso.</a:t>
-            </a:r>
-          </a:p>
-          <a:p>
-            <a:pPr lvl="0"/>
-            <a:r>
-              <a:rPr lang="es-CO" sz="1200" dirty="0" smtClean="0"/>
-              <a:t/>
-            </a:r>
-            <a:br>
-              <a:rPr lang="es-CO" sz="1200" dirty="0" smtClean="0"/>
-            </a:br>
-            <a:r>
-              <a:rPr lang="es-CO" sz="1200" b="1" dirty="0" smtClean="0"/>
-              <a:t>¿Qué no me gustó del ciclo?: </a:t>
-            </a:r>
-            <a:r>
-              <a:rPr lang="es-CO" sz="1200" dirty="0" smtClean="0"/>
-              <a:t>Colaboración por parte de los integrantes, y  seguridad en el desarrollo de las actividades debido a un diseño más estable.</a:t>
-            </a:r>
-            <a:endParaRPr lang="en-US" sz="1200" dirty="0" smtClean="0"/>
+            <a:pPr algn="ctr"/>
+            <a:r>
+              <a:rPr lang="es-CO" sz="1600" b="1" dirty="0" smtClean="0">
+                <a:effectLst>
+                  <a:outerShdw blurRad="38100" dist="38100" dir="2700000" algn="tl">
+                    <a:srgbClr val="000000">
+                      <a:alpha val="43137"/>
+                    </a:srgbClr>
+                  </a:outerShdw>
+                </a:effectLst>
+              </a:rPr>
+              <a:t>Ciclo 3</a:t>
+            </a:r>
+            <a:endParaRPr lang="es-CO" sz="1600" b="1" dirty="0">
+              <a:effectLst>
+                <a:outerShdw blurRad="38100" dist="38100" dir="2700000" algn="tl">
+                  <a:srgbClr val="000000">
+                    <a:alpha val="43137"/>
+                  </a:srgbClr>
+                </a:outerShdw>
+              </a:effectLst>
+            </a:endParaRPr>
           </a:p>
         </p:txBody>
       </p:sp>
@@ -15960,8 +16495,12 @@
               <a:rPr lang="es-CO" sz="2400" dirty="0" smtClean="0"/>
             </a:br>
             <a:r>
+              <a:rPr lang="es-CO" sz="2400" dirty="0" err="1" smtClean="0"/>
+              <a:t>lider</a:t>
+            </a:r>
+            <a:r>
               <a:rPr lang="es-CO" sz="2400" dirty="0" smtClean="0"/>
-              <a:t> Progreso en el ajuste de datos</a:t>
+              <a:t> del grupo</a:t>
             </a:r>
             <a:endParaRPr lang="en-US" sz="2400" dirty="0"/>
           </a:p>
@@ -15991,69 +16530,6 @@
           </a:prstGeom>
         </p:spPr>
       </p:pic>
-      <p:pic>
-        <p:nvPicPr>
-          <p:cNvPr id="1026" name="Picture 2"/>
-          <p:cNvPicPr>
-            <a:picLocks noChangeAspect="1" noChangeArrowheads="1"/>
-          </p:cNvPicPr>
-          <p:nvPr/>
-        </p:nvPicPr>
-        <p:blipFill>
-          <a:blip r:embed="rId3" cstate="print"/>
-          <a:srcRect/>
-          <a:stretch>
-            <a:fillRect/>
-          </a:stretch>
-        </p:blipFill>
-        <p:spPr bwMode="auto">
-          <a:xfrm>
-            <a:off x="1328738" y="2466975"/>
-            <a:ext cx="6486525" cy="4010025"/>
-          </a:xfrm>
-          <a:prstGeom prst="rect">
-            <a:avLst/>
-          </a:prstGeom>
-          <a:noFill/>
-          <a:ln w="9525">
-            <a:noFill/>
-            <a:miter lim="800000"/>
-            <a:headEnd/>
-            <a:tailEnd/>
-          </a:ln>
-          <a:effectLst/>
-        </p:spPr>
-      </p:pic>
-      <p:sp>
-        <p:nvSpPr>
-          <p:cNvPr id="6" name="5 CuadroTexto"/>
-          <p:cNvSpPr txBox="1"/>
-          <p:nvPr/>
-        </p:nvSpPr>
-        <p:spPr>
-          <a:xfrm>
-            <a:off x="609600" y="1752600"/>
-            <a:ext cx="825867" cy="369332"/>
-          </a:xfrm>
-          <a:prstGeom prst="rect">
-            <a:avLst/>
-          </a:prstGeom>
-          <a:noFill/>
-        </p:spPr>
-        <p:txBody>
-          <a:bodyPr wrap="none" rtlCol="0">
-            <a:spAutoFit/>
-          </a:bodyPr>
-          <a:lstStyle/>
-          <a:p>
-            <a:r>
-              <a:rPr lang="es-CO" b="1" dirty="0" smtClean="0"/>
-              <a:t>Ciclo 1</a:t>
-            </a:r>
-            <a:endParaRPr lang="es-CO" b="1" dirty="0"/>
-          </a:p>
-        </p:txBody>
-      </p:sp>
     </p:spTree>
   </p:cSld>
   <p:clrMapOvr>

</xml_diff>

<commit_message>
Version final de la presentacion
</commit_message>
<xml_diff>
--- a/CSOF5101 Ingeniera de Software/TSP/0330PostMortemTSPCiclo3.pptx
+++ b/CSOF5101 Ingeniera de Software/TSP/0330PostMortemTSPCiclo3.pptx
@@ -127,7 +127,7 @@
 <file path=ppt/charts/chart1.xml><?xml version="1.0" encoding="utf-8"?>
 <c:chartSpace xmlns:c="http://schemas.openxmlformats.org/drawingml/2006/chart" xmlns:a="http://schemas.openxmlformats.org/drawingml/2006/main" xmlns:r="http://schemas.openxmlformats.org/officeDocument/2006/relationships">
   <c:date1904 val="1"/>
-  <c:lang val="en-US"/>
+  <c:lang val="es-CO"/>
   <c:chart>
     <c:autoTitleDeleted val="1"/>
     <c:plotArea>
@@ -222,25 +222,25 @@
                   <c:v>0</c:v>
                 </c:pt>
                 <c:pt idx="1">
-                  <c:v>7.118333333333339E-2</c:v>
+                  <c:v>7.1183333333333404E-2</c:v>
                 </c:pt>
                 <c:pt idx="2">
                   <c:v>0.1423666666666667</c:v>
                 </c:pt>
                 <c:pt idx="3">
-                  <c:v>0.21355000000000013</c:v>
+                  <c:v>0.21355000000000016</c:v>
                 </c:pt>
                 <c:pt idx="4">
                   <c:v>0.28473333333333323</c:v>
                 </c:pt>
                 <c:pt idx="5">
-                  <c:v>0.35591666666666705</c:v>
+                  <c:v>0.35591666666666716</c:v>
                 </c:pt>
                 <c:pt idx="6">
-                  <c:v>0.4271000000000002</c:v>
+                  <c:v>0.42710000000000026</c:v>
                 </c:pt>
                 <c:pt idx="7">
-                  <c:v>0.4271000000000002</c:v>
+                  <c:v>0.42710000000000026</c:v>
                 </c:pt>
                 <c:pt idx="8">
                   <c:v>0.50433577235772353</c:v>
@@ -249,19 +249,19 @@
                   <c:v>0.50433577235772353</c:v>
                 </c:pt>
                 <c:pt idx="10">
-                  <c:v>0.62831951219512261</c:v>
+                  <c:v>0.62831951219512272</c:v>
                 </c:pt>
                 <c:pt idx="11">
-                  <c:v>0.6852300813008132</c:v>
+                  <c:v>0.68523008130081331</c:v>
                 </c:pt>
                 <c:pt idx="12">
-                  <c:v>0.69742520325203283</c:v>
+                  <c:v>0.69742520325203294</c:v>
                 </c:pt>
                 <c:pt idx="13">
-                  <c:v>0.71571788617886223</c:v>
+                  <c:v>0.71571788617886234</c:v>
                 </c:pt>
                 <c:pt idx="14">
-                  <c:v>0.71571788617886223</c:v>
+                  <c:v>0.71571788617886234</c:v>
                 </c:pt>
                 <c:pt idx="15">
                   <c:v>0.7441731707317073</c:v>
@@ -270,7 +270,7 @@
                   <c:v>0.7441731707317073</c:v>
                 </c:pt>
                 <c:pt idx="17">
-                  <c:v>0.81734390243902477</c:v>
+                  <c:v>0.81734390243902488</c:v>
                 </c:pt>
                 <c:pt idx="18">
                   <c:v>0.95758780487804851</c:v>
@@ -373,49 +373,49 @@
                   <c:v>0</c:v>
                 </c:pt>
                 <c:pt idx="1">
-                  <c:v>7.118333333333339E-2</c:v>
+                  <c:v>7.1183333333333404E-2</c:v>
                 </c:pt>
                 <c:pt idx="2">
                   <c:v>0.1423666666666667</c:v>
                 </c:pt>
                 <c:pt idx="3">
-                  <c:v>0.21355000000000013</c:v>
+                  <c:v>0.21355000000000016</c:v>
                 </c:pt>
                 <c:pt idx="4">
                   <c:v>0.28473333333333323</c:v>
                 </c:pt>
                 <c:pt idx="5">
-                  <c:v>0.35591666666666705</c:v>
+                  <c:v>0.35591666666666716</c:v>
                 </c:pt>
                 <c:pt idx="6">
-                  <c:v>0.4271000000000002</c:v>
+                  <c:v>0.42710000000000026</c:v>
                 </c:pt>
                 <c:pt idx="7">
-                  <c:v>0.4271000000000002</c:v>
+                  <c:v>0.42710000000000026</c:v>
                 </c:pt>
                 <c:pt idx="8">
-                  <c:v>0.45555528455284572</c:v>
+                  <c:v>0.45555528455284577</c:v>
                 </c:pt>
                 <c:pt idx="9">
-                  <c:v>0.45555528455284572</c:v>
+                  <c:v>0.45555528455284577</c:v>
                 </c:pt>
                 <c:pt idx="10">
                   <c:v>0.58563658536585328</c:v>
                 </c:pt>
                 <c:pt idx="11">
-                  <c:v>0.6100268292682931</c:v>
+                  <c:v>0.61002682926829321</c:v>
                 </c:pt>
                 <c:pt idx="12">
-                  <c:v>0.6689699186991882</c:v>
+                  <c:v>0.66896991869918854</c:v>
                 </c:pt>
                 <c:pt idx="13">
-                  <c:v>0.71571788617886223</c:v>
+                  <c:v>0.71571788617886234</c:v>
                 </c:pt>
                 <c:pt idx="14">
-                  <c:v>0.71571788617886223</c:v>
+                  <c:v>0.71571788617886234</c:v>
                 </c:pt>
                 <c:pt idx="15">
-                  <c:v>0.71571788617886223</c:v>
+                  <c:v>0.71571788617886234</c:v>
                 </c:pt>
                 <c:pt idx="16">
                   <c:v>0.7462056910569107</c:v>
@@ -437,11 +437,11 @@
           </c:val>
         </c:ser>
         <c:marker val="1"/>
-        <c:axId val="36721024"/>
-        <c:axId val="36722560"/>
+        <c:axId val="66529920"/>
+        <c:axId val="66552192"/>
       </c:lineChart>
       <c:catAx>
-        <c:axId val="36721024"/>
+        <c:axId val="66529920"/>
         <c:scaling>
           <c:orientation val="minMax"/>
         </c:scaling>
@@ -449,14 +449,24 @@
         <c:numFmt formatCode="General" sourceLinked="1"/>
         <c:majorTickMark val="none"/>
         <c:tickLblPos val="nextTo"/>
-        <c:crossAx val="36722560"/>
+        <c:txPr>
+          <a:bodyPr/>
+          <a:lstStyle/>
+          <a:p>
+            <a:pPr>
+              <a:defRPr lang="en-US"/>
+            </a:pPr>
+            <a:endParaRPr lang="es-CO"/>
+          </a:p>
+        </c:txPr>
+        <c:crossAx val="66552192"/>
         <c:crosses val="autoZero"/>
         <c:auto val="1"/>
         <c:lblAlgn val="ctr"/>
         <c:lblOffset val="100"/>
       </c:catAx>
       <c:valAx>
-        <c:axId val="36722560"/>
+        <c:axId val="66552192"/>
         <c:scaling>
           <c:orientation val="minMax"/>
         </c:scaling>
@@ -469,7 +479,7 @@
               <a:lstStyle/>
               <a:p>
                 <a:pPr>
-                  <a:defRPr/>
+                  <a:defRPr lang="en-US"/>
                 </a:pPr>
                 <a:r>
                   <a:rPr lang="en-US"/>
@@ -483,7 +493,17 @@
         <c:numFmt formatCode="0.0%" sourceLinked="1"/>
         <c:majorTickMark val="none"/>
         <c:tickLblPos val="nextTo"/>
-        <c:crossAx val="36721024"/>
+        <c:txPr>
+          <a:bodyPr/>
+          <a:lstStyle/>
+          <a:p>
+            <a:pPr>
+              <a:defRPr lang="en-US"/>
+            </a:pPr>
+            <a:endParaRPr lang="es-CO"/>
+          </a:p>
+        </c:txPr>
+        <c:crossAx val="66529920"/>
         <c:crosses val="autoZero"/>
         <c:crossBetween val="between"/>
       </c:valAx>
@@ -492,6 +512,16 @@
         <c:showVertBorder val="1"/>
         <c:showOutline val="1"/>
         <c:showKeys val="1"/>
+        <c:txPr>
+          <a:bodyPr/>
+          <a:lstStyle/>
+          <a:p>
+            <a:pPr rtl="0">
+              <a:defRPr lang="en-US"/>
+            </a:pPr>
+            <a:endParaRPr lang="es-CO"/>
+          </a:p>
+        </c:txPr>
       </c:dTable>
     </c:plotArea>
     <c:plotVisOnly val="1"/>
@@ -502,7 +532,7 @@
 
 <file path=ppt/charts/chart2.xml><?xml version="1.0" encoding="utf-8"?>
 <c:chartSpace xmlns:c="http://schemas.openxmlformats.org/drawingml/2006/chart" xmlns:a="http://schemas.openxmlformats.org/drawingml/2006/main" xmlns:r="http://schemas.openxmlformats.org/officeDocument/2006/relationships">
-  <c:lang val="en-US"/>
+  <c:lang val="es-CO"/>
   <c:style val="34"/>
   <c:chart>
     <c:title>
@@ -512,7 +542,7 @@
           <a:lstStyle/>
           <a:p>
             <a:pPr>
-              <a:defRPr sz="1100"/>
+              <a:defRPr lang="en-US" sz="1100"/>
             </a:pPr>
             <a:r>
               <a:rPr lang="es-CO" sz="1100"/>
@@ -800,11 +830,11 @@
             </c:numRef>
           </c:val>
         </c:ser>
-        <c:axId val="74752384"/>
-        <c:axId val="74754304"/>
+        <c:axId val="67279488"/>
+        <c:axId val="67293952"/>
       </c:barChart>
       <c:catAx>
-        <c:axId val="74752384"/>
+        <c:axId val="67279488"/>
         <c:scaling>
           <c:orientation val="minMax"/>
         </c:scaling>
@@ -816,7 +846,7 @@
               <a:lstStyle/>
               <a:p>
                 <a:pPr>
-                  <a:defRPr/>
+                  <a:defRPr lang="en-US"/>
                 </a:pPr>
                 <a:r>
                   <a:rPr lang="es-CO"/>
@@ -829,14 +859,24 @@
         </c:title>
         <c:numFmt formatCode="General" sourceLinked="1"/>
         <c:tickLblPos val="nextTo"/>
-        <c:crossAx val="74754304"/>
+        <c:txPr>
+          <a:bodyPr/>
+          <a:lstStyle/>
+          <a:p>
+            <a:pPr>
+              <a:defRPr lang="en-US"/>
+            </a:pPr>
+            <a:endParaRPr lang="es-CO"/>
+          </a:p>
+        </c:txPr>
+        <c:crossAx val="67293952"/>
         <c:crosses val="autoZero"/>
         <c:auto val="1"/>
         <c:lblAlgn val="ctr"/>
         <c:lblOffset val="100"/>
       </c:catAx>
       <c:valAx>
-        <c:axId val="74754304"/>
+        <c:axId val="67293952"/>
         <c:scaling>
           <c:orientation val="minMax"/>
           <c:max val="5"/>
@@ -851,7 +891,7 @@
               <a:lstStyle/>
               <a:p>
                 <a:pPr>
-                  <a:defRPr/>
+                  <a:defRPr lang="en-US"/>
                 </a:pPr>
                 <a:r>
                   <a:rPr lang="es-CO"/>
@@ -864,7 +904,17 @@
         </c:title>
         <c:numFmt formatCode="0.00" sourceLinked="1"/>
         <c:tickLblPos val="nextTo"/>
-        <c:crossAx val="74752384"/>
+        <c:txPr>
+          <a:bodyPr/>
+          <a:lstStyle/>
+          <a:p>
+            <a:pPr>
+              <a:defRPr lang="en-US"/>
+            </a:pPr>
+            <a:endParaRPr lang="es-CO"/>
+          </a:p>
+        </c:txPr>
+        <c:crossAx val="67279488"/>
         <c:crosses val="autoZero"/>
         <c:crossBetween val="between"/>
       </c:valAx>
@@ -872,6 +922,16 @@
     <c:legend>
       <c:legendPos val="r"/>
       <c:layout/>
+      <c:txPr>
+        <a:bodyPr/>
+        <a:lstStyle/>
+        <a:p>
+          <a:pPr>
+            <a:defRPr lang="en-US"/>
+          </a:pPr>
+          <a:endParaRPr lang="es-CO"/>
+        </a:p>
+      </c:txPr>
     </c:legend>
     <c:plotVisOnly val="1"/>
   </c:chart>
@@ -2071,7 +2131,7 @@
   <dgm:whole/>
   <dgm:extLst>
     <a:ext uri="http://schemas.microsoft.com/office/drawing/2008/diagram">
-      <dsp:dataModelExt xmlns:dsp="http://schemas.microsoft.com/office/drawing/2008/diagram" xmlns="" relId="rId6" minVer="http://schemas.openxmlformats.org/drawingml/2006/diagram"/>
+      <dsp:dataModelExt xmlns="" xmlns:dsp="http://schemas.microsoft.com/office/drawing/2008/diagram" relId="rId6" minVer="http://schemas.openxmlformats.org/drawingml/2006/diagram"/>
     </a:ext>
   </dgm:extLst>
 </dgm:dataModel>
@@ -10285,7 +10345,7 @@
           <p:nvPr/>
         </p:nvPicPr>
         <p:blipFill>
-          <a:blip r:embed="rId7" cstate="print"/>
+          <a:blip r:embed="rId6" cstate="print"/>
           <a:stretch>
             <a:fillRect/>
           </a:stretch>
@@ -10664,11 +10724,15 @@
                     <a:p>
                       <a:pPr algn="ctr" fontAlgn="b"/>
                       <a:r>
-                        <a:rPr lang="en-US" sz="1200" u="none" strike="noStrike" dirty="0" err="1"/>
+                        <a:rPr lang="en-US" sz="1200" u="none" strike="noStrike" dirty="0" err="1">
+                          <a:latin typeface="Calibri" pitchFamily="34" charset="0"/>
+                        </a:rPr>
                         <a:t>Ciclo</a:t>
                       </a:r>
                       <a:r>
-                        <a:rPr lang="en-US" sz="1200" u="none" strike="noStrike" dirty="0"/>
+                        <a:rPr lang="en-US" sz="1200" u="none" strike="noStrike" dirty="0">
+                          <a:latin typeface="Calibri" pitchFamily="34" charset="0"/>
+                        </a:rPr>
                         <a:t> 1</a:t>
                       </a:r>
                       <a:endParaRPr lang="en-US" sz="1200" b="1" i="0" u="none" strike="noStrike" dirty="0">
@@ -10705,11 +10769,15 @@
                     <a:p>
                       <a:pPr algn="ctr" fontAlgn="b"/>
                       <a:r>
-                        <a:rPr lang="en-US" sz="1200" u="none" strike="noStrike" dirty="0" err="1"/>
+                        <a:rPr lang="en-US" sz="1200" u="none" strike="noStrike" dirty="0" err="1">
+                          <a:latin typeface="Calibri" pitchFamily="34" charset="0"/>
+                        </a:rPr>
                         <a:t>Ciclo</a:t>
                       </a:r>
                       <a:r>
-                        <a:rPr lang="en-US" sz="1200" u="none" strike="noStrike" dirty="0"/>
+                        <a:rPr lang="en-US" sz="1200" u="none" strike="noStrike" dirty="0">
+                          <a:latin typeface="Calibri" pitchFamily="34" charset="0"/>
+                        </a:rPr>
                         <a:t> 2</a:t>
                       </a:r>
                       <a:endParaRPr lang="en-US" sz="1200" b="1" i="0" u="none" strike="noStrike" dirty="0">
@@ -10746,11 +10814,15 @@
                     <a:p>
                       <a:pPr algn="ctr" fontAlgn="b"/>
                       <a:r>
-                        <a:rPr lang="en-US" sz="1200" u="none" strike="noStrike" dirty="0" err="1"/>
+                        <a:rPr lang="en-US" sz="1200" u="none" strike="noStrike" dirty="0" err="1">
+                          <a:latin typeface="Calibri" pitchFamily="34" charset="0"/>
+                        </a:rPr>
                         <a:t>Ciclo</a:t>
                       </a:r>
                       <a:r>
-                        <a:rPr lang="en-US" sz="1200" u="none" strike="noStrike" dirty="0"/>
+                        <a:rPr lang="en-US" sz="1200" u="none" strike="noStrike" dirty="0">
+                          <a:latin typeface="Calibri" pitchFamily="34" charset="0"/>
+                        </a:rPr>
                         <a:t> 3</a:t>
                       </a:r>
                       <a:endParaRPr lang="en-US" sz="1200" b="1" i="0" u="none" strike="noStrike" dirty="0">
@@ -10787,7 +10859,9 @@
                     <a:p>
                       <a:pPr algn="ctr" fontAlgn="b"/>
                       <a:r>
-                        <a:rPr lang="en-US" sz="1200" u="none" strike="noStrike" dirty="0"/>
+                        <a:rPr lang="en-US" sz="1200" u="none" strike="noStrike" dirty="0">
+                          <a:latin typeface="Calibri" pitchFamily="34" charset="0"/>
+                        </a:rPr>
                         <a:t>Total</a:t>
                       </a:r>
                       <a:endParaRPr lang="en-US" sz="1200" b="1" i="0" u="none" strike="noStrike" dirty="0">
@@ -10858,7 +10932,9 @@
                     <a:p>
                       <a:pPr algn="ctr" fontAlgn="b"/>
                       <a:r>
-                        <a:rPr lang="en-US" sz="1200" u="none" strike="noStrike" dirty="0"/>
+                        <a:rPr lang="en-US" sz="1200" u="none" strike="noStrike" dirty="0">
+                          <a:latin typeface="Calibri" pitchFamily="34" charset="0"/>
+                        </a:rPr>
                         <a:t>Plan</a:t>
                       </a:r>
                       <a:endParaRPr lang="en-US" sz="1200" b="1" i="0" u="none" strike="noStrike" dirty="0">
@@ -10885,7 +10961,9 @@
                     <a:p>
                       <a:pPr algn="ctr" fontAlgn="b"/>
                       <a:r>
-                        <a:rPr lang="en-US" sz="1200" u="none" strike="noStrike" dirty="0"/>
+                        <a:rPr lang="en-US" sz="1200" u="none" strike="noStrike" dirty="0">
+                          <a:latin typeface="Calibri" pitchFamily="34" charset="0"/>
+                        </a:rPr>
                         <a:t>Real</a:t>
                       </a:r>
                       <a:endParaRPr lang="en-US" sz="1200" b="1" i="0" u="none" strike="noStrike" dirty="0">
@@ -10912,7 +10990,9 @@
                     <a:p>
                       <a:pPr algn="ctr" fontAlgn="b"/>
                       <a:r>
-                        <a:rPr lang="en-US" sz="1200" u="none" strike="noStrike"/>
+                        <a:rPr lang="en-US" sz="1200" u="none" strike="noStrike">
+                          <a:latin typeface="Calibri" pitchFamily="34" charset="0"/>
+                        </a:rPr>
                         <a:t>Plan</a:t>
                       </a:r>
                       <a:endParaRPr lang="en-US" sz="1200" b="1" i="0" u="none" strike="noStrike">
@@ -10939,7 +11019,9 @@
                     <a:p>
                       <a:pPr algn="ctr" fontAlgn="b"/>
                       <a:r>
-                        <a:rPr lang="en-US" sz="1200" u="none" strike="noStrike"/>
+                        <a:rPr lang="en-US" sz="1200" u="none" strike="noStrike">
+                          <a:latin typeface="Calibri" pitchFamily="34" charset="0"/>
+                        </a:rPr>
                         <a:t>Real</a:t>
                       </a:r>
                       <a:endParaRPr lang="en-US" sz="1200" b="1" i="0" u="none" strike="noStrike">
@@ -10966,7 +11048,9 @@
                     <a:p>
                       <a:pPr algn="ctr" fontAlgn="b"/>
                       <a:r>
-                        <a:rPr lang="en-US" sz="1200" u="none" strike="noStrike" dirty="0"/>
+                        <a:rPr lang="en-US" sz="1200" u="none" strike="noStrike" dirty="0">
+                          <a:latin typeface="Calibri" pitchFamily="34" charset="0"/>
+                        </a:rPr>
                         <a:t>Plan</a:t>
                       </a:r>
                       <a:endParaRPr lang="en-US" sz="1200" b="1" i="0" u="none" strike="noStrike" dirty="0">
@@ -10993,7 +11077,9 @@
                     <a:p>
                       <a:pPr algn="ctr" fontAlgn="b"/>
                       <a:r>
-                        <a:rPr lang="en-US" sz="1200" u="none" strike="noStrike" dirty="0"/>
+                        <a:rPr lang="en-US" sz="1200" u="none" strike="noStrike" dirty="0">
+                          <a:latin typeface="Calibri" pitchFamily="34" charset="0"/>
+                        </a:rPr>
                         <a:t>Real</a:t>
                       </a:r>
                       <a:endParaRPr lang="en-US" sz="1200" b="1" i="0" u="none" strike="noStrike" dirty="0">
@@ -11020,7 +11106,9 @@
                     <a:p>
                       <a:pPr algn="ctr" fontAlgn="b"/>
                       <a:r>
-                        <a:rPr lang="en-US" sz="1200" u="none" strike="noStrike" dirty="0"/>
+                        <a:rPr lang="en-US" sz="1200" u="none" strike="noStrike" dirty="0">
+                          <a:latin typeface="Calibri" pitchFamily="34" charset="0"/>
+                        </a:rPr>
                         <a:t>Plan</a:t>
                       </a:r>
                       <a:endParaRPr lang="en-US" sz="1200" b="1" i="0" u="none" strike="noStrike" dirty="0">
@@ -11047,7 +11135,9 @@
                     <a:p>
                       <a:pPr algn="ctr" fontAlgn="b"/>
                       <a:r>
-                        <a:rPr lang="en-US" sz="1200" u="none" strike="noStrike" dirty="0"/>
+                        <a:rPr lang="en-US" sz="1200" u="none" strike="noStrike" dirty="0">
+                          <a:latin typeface="Calibri" pitchFamily="34" charset="0"/>
+                        </a:rPr>
                         <a:t>Real</a:t>
                       </a:r>
                       <a:endParaRPr lang="en-US" sz="1200" b="1" i="0" u="none" strike="noStrike" dirty="0">
@@ -11074,7 +11164,9 @@
                     <a:p>
                       <a:pPr algn="ctr" fontAlgn="b"/>
                       <a:r>
-                        <a:rPr lang="es-CO" sz="1200" u="none" strike="noStrike" dirty="0" smtClean="0"/>
+                        <a:rPr lang="es-CO" sz="1200" u="none" strike="noStrike" dirty="0" smtClean="0">
+                          <a:latin typeface="Calibri" pitchFamily="34" charset="0"/>
+                        </a:rPr>
                         <a:t>Error</a:t>
                       </a:r>
                       <a:endParaRPr lang="en-US" sz="1200" b="1" i="0" u="none" strike="noStrike" dirty="0">
@@ -11103,19 +11195,27 @@
                     <a:p>
                       <a:pPr algn="ctr" fontAlgn="b"/>
                       <a:r>
-                        <a:rPr lang="en-US" sz="1200" u="none" strike="noStrike" dirty="0" err="1" smtClean="0"/>
+                        <a:rPr lang="en-US" sz="1200" u="none" strike="noStrike" dirty="0" err="1" smtClean="0">
+                          <a:latin typeface="Calibri" pitchFamily="34" charset="0"/>
+                        </a:rPr>
                         <a:t>Tiempo</a:t>
                       </a:r>
                       <a:r>
-                        <a:rPr lang="en-US" sz="1200" u="none" strike="noStrike" dirty="0" smtClean="0"/>
+                        <a:rPr lang="en-US" sz="1200" u="none" strike="noStrike" dirty="0" smtClean="0">
+                          <a:latin typeface="Calibri" pitchFamily="34" charset="0"/>
+                        </a:rPr>
                         <a:t> (</a:t>
                       </a:r>
                       <a:r>
-                        <a:rPr lang="en-US" sz="1200" u="none" strike="noStrike" dirty="0" err="1" smtClean="0"/>
+                        <a:rPr lang="en-US" sz="1200" u="none" strike="noStrike" dirty="0" err="1" smtClean="0">
+                          <a:latin typeface="Calibri" pitchFamily="34" charset="0"/>
+                        </a:rPr>
                         <a:t>Horas</a:t>
                       </a:r>
                       <a:r>
-                        <a:rPr lang="en-US" sz="1200" u="none" strike="noStrike" dirty="0" smtClean="0"/>
+                        <a:rPr lang="en-US" sz="1200" u="none" strike="noStrike" dirty="0" smtClean="0">
+                          <a:latin typeface="Calibri" pitchFamily="34" charset="0"/>
+                        </a:rPr>
                         <a:t>)</a:t>
                       </a:r>
                       <a:endParaRPr lang="en-US" sz="1200" b="1" i="0" u="none" strike="noStrike" dirty="0">
@@ -11142,18 +11242,20 @@
                     <a:p>
                       <a:pPr algn="ctr" fontAlgn="b"/>
                       <a:r>
-                        <a:rPr lang="en-US" sz="1100" u="none" strike="noStrike"/>
+                        <a:rPr lang="en-US" sz="1200" u="none" strike="noStrike" dirty="0">
+                          <a:latin typeface="Calibri" pitchFamily="34" charset="0"/>
+                        </a:rPr>
                         <a:t>105</a:t>
                       </a:r>
-                      <a:endParaRPr lang="en-US" sz="1100" b="0" i="0" u="none" strike="noStrike">
+                      <a:endParaRPr lang="en-US" sz="1200" b="0" i="0" u="none" strike="noStrike" dirty="0">
                         <a:solidFill>
                           <a:srgbClr val="000000"/>
                         </a:solidFill>
-                        <a:latin typeface="Calibri"/>
+                        <a:latin typeface="Calibri" pitchFamily="34" charset="0"/>
                       </a:endParaRPr>
                     </a:p>
                   </a:txBody>
-                  <a:tcPr marL="0" marR="0" marT="0" marB="0" anchor="b"/>
+                  <a:tcPr marL="0" marR="0" marT="0" marB="0" anchor="ctr"/>
                 </a:tc>
                 <a:tc>
                   <a:txBody>
@@ -11162,18 +11264,20 @@
                     <a:p>
                       <a:pPr algn="ctr" fontAlgn="b"/>
                       <a:r>
-                        <a:rPr lang="en-US" sz="1100" u="none" strike="noStrike"/>
+                        <a:rPr lang="en-US" sz="1200" u="none" strike="noStrike" dirty="0">
+                          <a:latin typeface="Calibri" pitchFamily="34" charset="0"/>
+                        </a:rPr>
                         <a:t>54</a:t>
                       </a:r>
-                      <a:endParaRPr lang="en-US" sz="1100" b="0" i="0" u="none" strike="noStrike">
+                      <a:endParaRPr lang="en-US" sz="1200" b="0" i="0" u="none" strike="noStrike" dirty="0">
                         <a:solidFill>
                           <a:srgbClr val="000000"/>
                         </a:solidFill>
-                        <a:latin typeface="Calibri"/>
+                        <a:latin typeface="Calibri" pitchFamily="34" charset="0"/>
                       </a:endParaRPr>
                     </a:p>
                   </a:txBody>
-                  <a:tcPr marL="0" marR="0" marT="0" marB="0" anchor="b"/>
+                  <a:tcPr marL="0" marR="0" marT="0" marB="0" anchor="ctr"/>
                 </a:tc>
                 <a:tc>
                   <a:txBody>
@@ -11182,18 +11286,20 @@
                     <a:p>
                       <a:pPr algn="ctr" fontAlgn="b"/>
                       <a:r>
-                        <a:rPr lang="en-US" sz="1100" u="none" strike="noStrike" dirty="0"/>
+                        <a:rPr lang="en-US" sz="1200" u="none" strike="noStrike" dirty="0">
+                          <a:latin typeface="Calibri" pitchFamily="34" charset="0"/>
+                        </a:rPr>
                         <a:t>71</a:t>
                       </a:r>
-                      <a:endParaRPr lang="en-US" sz="1100" b="0" i="0" u="none" strike="noStrike" dirty="0">
+                      <a:endParaRPr lang="en-US" sz="1200" b="0" i="0" u="none" strike="noStrike" dirty="0">
                         <a:solidFill>
                           <a:srgbClr val="000000"/>
                         </a:solidFill>
-                        <a:latin typeface="Calibri"/>
+                        <a:latin typeface="Calibri" pitchFamily="34" charset="0"/>
                       </a:endParaRPr>
                     </a:p>
                   </a:txBody>
-                  <a:tcPr marL="0" marR="0" marT="0" marB="0" anchor="b"/>
+                  <a:tcPr marL="0" marR="0" marT="0" marB="0" anchor="ctr"/>
                 </a:tc>
                 <a:tc>
                   <a:txBody>
@@ -11202,18 +11308,20 @@
                     <a:p>
                       <a:pPr algn="ctr" fontAlgn="b"/>
                       <a:r>
-                        <a:rPr lang="en-US" sz="1100" u="none" strike="noStrike" dirty="0"/>
+                        <a:rPr lang="en-US" sz="1200" u="none" strike="noStrike" dirty="0">
+                          <a:latin typeface="Calibri" pitchFamily="34" charset="0"/>
+                        </a:rPr>
                         <a:t>59.42</a:t>
                       </a:r>
-                      <a:endParaRPr lang="en-US" sz="1100" b="0" i="0" u="none" strike="noStrike" dirty="0">
+                      <a:endParaRPr lang="en-US" sz="1200" b="0" i="0" u="none" strike="noStrike" dirty="0">
                         <a:solidFill>
                           <a:srgbClr val="000000"/>
                         </a:solidFill>
-                        <a:latin typeface="Calibri"/>
+                        <a:latin typeface="Calibri" pitchFamily="34" charset="0"/>
                       </a:endParaRPr>
                     </a:p>
                   </a:txBody>
-                  <a:tcPr marL="0" marR="0" marT="0" marB="0" anchor="b"/>
+                  <a:tcPr marL="0" marR="0" marT="0" marB="0" anchor="ctr"/>
                 </a:tc>
                 <a:tc>
                   <a:txBody>
@@ -11222,18 +11330,20 @@
                     <a:p>
                       <a:pPr algn="ctr" fontAlgn="b"/>
                       <a:r>
-                        <a:rPr lang="en-US" sz="1100" u="none" strike="noStrike" dirty="0"/>
+                        <a:rPr lang="en-US" sz="1200" u="none" strike="noStrike" dirty="0">
+                          <a:latin typeface="Calibri" pitchFamily="34" charset="0"/>
+                        </a:rPr>
                         <a:t>70</a:t>
                       </a:r>
-                      <a:endParaRPr lang="en-US" sz="1100" b="0" i="0" u="none" strike="noStrike" dirty="0">
+                      <a:endParaRPr lang="en-US" sz="1200" b="0" i="0" u="none" strike="noStrike" dirty="0">
                         <a:solidFill>
                           <a:srgbClr val="000000"/>
                         </a:solidFill>
-                        <a:latin typeface="Calibri"/>
+                        <a:latin typeface="Calibri" pitchFamily="34" charset="0"/>
                       </a:endParaRPr>
                     </a:p>
                   </a:txBody>
-                  <a:tcPr marL="0" marR="0" marT="0" marB="0" anchor="b"/>
+                  <a:tcPr marL="0" marR="0" marT="0" marB="0" anchor="ctr"/>
                 </a:tc>
                 <a:tc>
                   <a:txBody>
@@ -11242,18 +11352,20 @@
                     <a:p>
                       <a:pPr algn="ctr" fontAlgn="b"/>
                       <a:r>
-                        <a:rPr lang="en-US" sz="1100" u="none" strike="noStrike"/>
+                        <a:rPr lang="en-US" sz="1200" u="none" strike="noStrike">
+                          <a:latin typeface="Calibri" pitchFamily="34" charset="0"/>
+                        </a:rPr>
                         <a:t>44.43</a:t>
                       </a:r>
-                      <a:endParaRPr lang="en-US" sz="1100" b="0" i="0" u="none" strike="noStrike">
+                      <a:endParaRPr lang="en-US" sz="1200" b="0" i="0" u="none" strike="noStrike">
                         <a:solidFill>
                           <a:srgbClr val="000000"/>
                         </a:solidFill>
-                        <a:latin typeface="Calibri"/>
+                        <a:latin typeface="Calibri" pitchFamily="34" charset="0"/>
                       </a:endParaRPr>
                     </a:p>
                   </a:txBody>
-                  <a:tcPr marL="0" marR="0" marT="0" marB="0" anchor="b"/>
+                  <a:tcPr marL="0" marR="0" marT="0" marB="0" anchor="ctr"/>
                 </a:tc>
                 <a:tc>
                   <a:txBody>
@@ -11262,18 +11374,20 @@
                     <a:p>
                       <a:pPr algn="ctr" fontAlgn="b"/>
                       <a:r>
-                        <a:rPr lang="en-US" sz="1100" u="none" strike="noStrike" dirty="0"/>
+                        <a:rPr lang="en-US" sz="1200" u="none" strike="noStrike" dirty="0">
+                          <a:latin typeface="Calibri" pitchFamily="34" charset="0"/>
+                        </a:rPr>
                         <a:t>246</a:t>
                       </a:r>
-                      <a:endParaRPr lang="en-US" sz="1100" b="1" i="0" u="none" strike="noStrike" dirty="0">
+                      <a:endParaRPr lang="en-US" sz="1200" b="1" i="0" u="none" strike="noStrike" dirty="0">
                         <a:solidFill>
                           <a:srgbClr val="000000"/>
                         </a:solidFill>
-                        <a:latin typeface="Calibri"/>
+                        <a:latin typeface="Calibri" pitchFamily="34" charset="0"/>
                       </a:endParaRPr>
                     </a:p>
                   </a:txBody>
-                  <a:tcPr marL="0" marR="0" marT="0" marB="0" anchor="b">
+                  <a:tcPr marL="0" marR="0" marT="0" marB="0" anchor="ctr">
                     <a:solidFill>
                       <a:schemeClr val="accent2">
                         <a:lumMod val="40000"/>
@@ -11289,18 +11403,20 @@
                     <a:p>
                       <a:pPr algn="ctr" fontAlgn="b"/>
                       <a:r>
-                        <a:rPr lang="en-US" sz="1100" u="none" strike="noStrike" dirty="0"/>
+                        <a:rPr lang="en-US" sz="1200" u="none" strike="noStrike" dirty="0">
+                          <a:latin typeface="Calibri" pitchFamily="34" charset="0"/>
+                        </a:rPr>
                         <a:t>157.85</a:t>
                       </a:r>
-                      <a:endParaRPr lang="en-US" sz="1100" b="1" i="0" u="none" strike="noStrike" dirty="0">
+                      <a:endParaRPr lang="en-US" sz="1200" b="1" i="0" u="none" strike="noStrike" dirty="0">
                         <a:solidFill>
                           <a:srgbClr val="000000"/>
                         </a:solidFill>
-                        <a:latin typeface="Calibri"/>
+                        <a:latin typeface="Calibri" pitchFamily="34" charset="0"/>
                       </a:endParaRPr>
                     </a:p>
                   </a:txBody>
-                  <a:tcPr marL="0" marR="0" marT="0" marB="0" anchor="b">
+                  <a:tcPr marL="0" marR="0" marT="0" marB="0" anchor="ctr">
                     <a:solidFill>
                       <a:schemeClr val="accent2">
                         <a:lumMod val="40000"/>
@@ -11316,18 +11432,20 @@
                     <a:p>
                       <a:pPr algn="ctr" fontAlgn="b"/>
                       <a:r>
-                        <a:rPr lang="en-US" sz="1100" u="none" strike="noStrike" dirty="0"/>
+                        <a:rPr lang="en-US" sz="1200" u="none" strike="noStrike" dirty="0">
+                          <a:latin typeface="Calibri" pitchFamily="34" charset="0"/>
+                        </a:rPr>
                         <a:t>35.83%</a:t>
                       </a:r>
-                      <a:endParaRPr lang="en-US" sz="1100" b="1" i="0" u="none" strike="noStrike" dirty="0">
+                      <a:endParaRPr lang="en-US" sz="1200" b="1" i="0" u="none" strike="noStrike" dirty="0">
                         <a:solidFill>
                           <a:srgbClr val="000000"/>
                         </a:solidFill>
-                        <a:latin typeface="Calibri"/>
+                        <a:latin typeface="Calibri" pitchFamily="34" charset="0"/>
                       </a:endParaRPr>
                     </a:p>
                   </a:txBody>
-                  <a:tcPr marL="0" marR="0" marT="0" marB="0" anchor="b">
+                  <a:tcPr marL="0" marR="0" marT="0" marB="0" anchor="ctr">
                     <a:solidFill>
                       <a:schemeClr val="accent2">
                         <a:lumMod val="60000"/>
@@ -11345,7 +11463,9 @@
                     <a:p>
                       <a:pPr algn="ctr" fontAlgn="b"/>
                       <a:r>
-                        <a:rPr lang="en-US" sz="1200" u="none" strike="noStrike" dirty="0"/>
+                        <a:rPr lang="en-US" sz="1200" u="none" strike="noStrike" dirty="0">
+                          <a:latin typeface="Calibri" pitchFamily="34" charset="0"/>
+                        </a:rPr>
                         <a:t>Loc</a:t>
                       </a:r>
                       <a:endParaRPr lang="en-US" sz="1200" b="1" i="0" u="none" strike="noStrike" dirty="0">
@@ -11372,18 +11492,20 @@
                     <a:p>
                       <a:pPr algn="ctr" fontAlgn="b"/>
                       <a:r>
-                        <a:rPr lang="en-US" sz="1100" u="none" strike="noStrike"/>
+                        <a:rPr lang="en-US" sz="1200" u="none" strike="noStrike">
+                          <a:latin typeface="Calibri" pitchFamily="34" charset="0"/>
+                        </a:rPr>
                         <a:t>187</a:t>
                       </a:r>
-                      <a:endParaRPr lang="en-US" sz="1100" b="0" i="0" u="none" strike="noStrike">
+                      <a:endParaRPr lang="en-US" sz="1200" b="0" i="0" u="none" strike="noStrike">
                         <a:solidFill>
                           <a:srgbClr val="000000"/>
                         </a:solidFill>
-                        <a:latin typeface="Calibri"/>
+                        <a:latin typeface="Calibri" pitchFamily="34" charset="0"/>
                       </a:endParaRPr>
                     </a:p>
                   </a:txBody>
-                  <a:tcPr marL="0" marR="0" marT="0" marB="0" anchor="b"/>
+                  <a:tcPr marL="0" marR="0" marT="0" marB="0" anchor="ctr"/>
                 </a:tc>
                 <a:tc>
                   <a:txBody>
@@ -11392,18 +11514,20 @@
                     <a:p>
                       <a:pPr algn="ctr" fontAlgn="b"/>
                       <a:r>
-                        <a:rPr lang="en-US" sz="1100" u="none" strike="noStrike"/>
+                        <a:rPr lang="en-US" sz="1200" u="none" strike="noStrike">
+                          <a:latin typeface="Calibri" pitchFamily="34" charset="0"/>
+                        </a:rPr>
                         <a:t>81</a:t>
                       </a:r>
-                      <a:endParaRPr lang="en-US" sz="1100" b="0" i="0" u="none" strike="noStrike">
+                      <a:endParaRPr lang="en-US" sz="1200" b="0" i="0" u="none" strike="noStrike">
                         <a:solidFill>
                           <a:srgbClr val="000000"/>
                         </a:solidFill>
-                        <a:latin typeface="Calibri"/>
+                        <a:latin typeface="Calibri" pitchFamily="34" charset="0"/>
                       </a:endParaRPr>
                     </a:p>
                   </a:txBody>
-                  <a:tcPr marL="0" marR="0" marT="0" marB="0" anchor="b"/>
+                  <a:tcPr marL="0" marR="0" marT="0" marB="0" anchor="ctr"/>
                 </a:tc>
                 <a:tc>
                   <a:txBody>
@@ -11412,18 +11536,20 @@
                     <a:p>
                       <a:pPr algn="ctr" fontAlgn="b"/>
                       <a:r>
-                        <a:rPr lang="en-US" sz="1100" u="none" strike="noStrike" dirty="0"/>
+                        <a:rPr lang="en-US" sz="1200" u="none" strike="noStrike" dirty="0">
+                          <a:latin typeface="Calibri" pitchFamily="34" charset="0"/>
+                        </a:rPr>
                         <a:t>374</a:t>
                       </a:r>
-                      <a:endParaRPr lang="en-US" sz="1100" b="0" i="0" u="none" strike="noStrike" dirty="0">
+                      <a:endParaRPr lang="en-US" sz="1200" b="0" i="0" u="none" strike="noStrike" dirty="0">
                         <a:solidFill>
                           <a:srgbClr val="000000"/>
                         </a:solidFill>
-                        <a:latin typeface="Calibri"/>
+                        <a:latin typeface="Calibri" pitchFamily="34" charset="0"/>
                       </a:endParaRPr>
                     </a:p>
                   </a:txBody>
-                  <a:tcPr marL="0" marR="0" marT="0" marB="0" anchor="b"/>
+                  <a:tcPr marL="0" marR="0" marT="0" marB="0" anchor="ctr"/>
                 </a:tc>
                 <a:tc>
                   <a:txBody>
@@ -11432,18 +11558,20 @@
                     <a:p>
                       <a:pPr algn="ctr" fontAlgn="b"/>
                       <a:r>
-                        <a:rPr lang="en-US" sz="1100" u="none" strike="noStrike"/>
+                        <a:rPr lang="en-US" sz="1200" u="none" strike="noStrike" dirty="0">
+                          <a:latin typeface="Calibri" pitchFamily="34" charset="0"/>
+                        </a:rPr>
                         <a:t>592</a:t>
                       </a:r>
-                      <a:endParaRPr lang="en-US" sz="1100" b="0" i="0" u="none" strike="noStrike">
+                      <a:endParaRPr lang="en-US" sz="1200" b="0" i="0" u="none" strike="noStrike" dirty="0">
                         <a:solidFill>
                           <a:srgbClr val="000000"/>
                         </a:solidFill>
-                        <a:latin typeface="Calibri"/>
+                        <a:latin typeface="Calibri" pitchFamily="34" charset="0"/>
                       </a:endParaRPr>
                     </a:p>
                   </a:txBody>
-                  <a:tcPr marL="0" marR="0" marT="0" marB="0" anchor="b"/>
+                  <a:tcPr marL="0" marR="0" marT="0" marB="0" anchor="ctr"/>
                 </a:tc>
                 <a:tc>
                   <a:txBody>
@@ -11452,18 +11580,20 @@
                     <a:p>
                       <a:pPr algn="ctr" fontAlgn="b"/>
                       <a:r>
-                        <a:rPr lang="en-US" sz="1100" u="none" strike="noStrike"/>
+                        <a:rPr lang="en-US" sz="1200" u="none" strike="noStrike">
+                          <a:latin typeface="Calibri" pitchFamily="34" charset="0"/>
+                        </a:rPr>
                         <a:t>374</a:t>
                       </a:r>
-                      <a:endParaRPr lang="en-US" sz="1100" b="0" i="0" u="none" strike="noStrike">
+                      <a:endParaRPr lang="en-US" sz="1200" b="0" i="0" u="none" strike="noStrike">
                         <a:solidFill>
                           <a:srgbClr val="000000"/>
                         </a:solidFill>
-                        <a:latin typeface="Calibri"/>
+                        <a:latin typeface="Calibri" pitchFamily="34" charset="0"/>
                       </a:endParaRPr>
                     </a:p>
                   </a:txBody>
-                  <a:tcPr marL="0" marR="0" marT="0" marB="0" anchor="b"/>
+                  <a:tcPr marL="0" marR="0" marT="0" marB="0" anchor="ctr"/>
                 </a:tc>
                 <a:tc>
                   <a:txBody>
@@ -11472,18 +11602,20 @@
                     <a:p>
                       <a:pPr algn="ctr" fontAlgn="b"/>
                       <a:r>
-                        <a:rPr lang="en-US" sz="1100" u="none" strike="noStrike" dirty="0"/>
+                        <a:rPr lang="en-US" sz="1200" u="none" strike="noStrike" dirty="0">
+                          <a:latin typeface="Calibri" pitchFamily="34" charset="0"/>
+                        </a:rPr>
                         <a:t>467</a:t>
                       </a:r>
-                      <a:endParaRPr lang="en-US" sz="1100" b="0" i="0" u="none" strike="noStrike" dirty="0">
+                      <a:endParaRPr lang="en-US" sz="1200" b="0" i="0" u="none" strike="noStrike" dirty="0">
                         <a:solidFill>
                           <a:srgbClr val="000000"/>
                         </a:solidFill>
-                        <a:latin typeface="Calibri"/>
+                        <a:latin typeface="Calibri" pitchFamily="34" charset="0"/>
                       </a:endParaRPr>
                     </a:p>
                   </a:txBody>
-                  <a:tcPr marL="0" marR="0" marT="0" marB="0" anchor="b"/>
+                  <a:tcPr marL="0" marR="0" marT="0" marB="0" anchor="ctr"/>
                 </a:tc>
                 <a:tc>
                   <a:txBody>
@@ -11492,18 +11624,20 @@
                     <a:p>
                       <a:pPr algn="ctr" fontAlgn="b"/>
                       <a:r>
-                        <a:rPr lang="en-US" sz="1100" u="none" strike="noStrike" dirty="0"/>
+                        <a:rPr lang="en-US" sz="1200" u="none" strike="noStrike" dirty="0">
+                          <a:latin typeface="Calibri" pitchFamily="34" charset="0"/>
+                        </a:rPr>
                         <a:t>935</a:t>
                       </a:r>
-                      <a:endParaRPr lang="en-US" sz="1100" b="1" i="0" u="none" strike="noStrike" dirty="0">
+                      <a:endParaRPr lang="en-US" sz="1200" b="1" i="0" u="none" strike="noStrike" dirty="0">
                         <a:solidFill>
                           <a:srgbClr val="000000"/>
                         </a:solidFill>
-                        <a:latin typeface="Calibri"/>
+                        <a:latin typeface="Calibri" pitchFamily="34" charset="0"/>
                       </a:endParaRPr>
                     </a:p>
                   </a:txBody>
-                  <a:tcPr marL="0" marR="0" marT="0" marB="0" anchor="b">
+                  <a:tcPr marL="0" marR="0" marT="0" marB="0" anchor="ctr">
                     <a:solidFill>
                       <a:schemeClr val="accent2">
                         <a:lumMod val="40000"/>
@@ -11519,18 +11653,20 @@
                     <a:p>
                       <a:pPr algn="ctr" fontAlgn="b"/>
                       <a:r>
-                        <a:rPr lang="en-US" sz="1100" u="none" strike="noStrike" dirty="0"/>
+                        <a:rPr lang="en-US" sz="1200" u="none" strike="noStrike" dirty="0">
+                          <a:latin typeface="Calibri" pitchFamily="34" charset="0"/>
+                        </a:rPr>
                         <a:t>1140</a:t>
                       </a:r>
-                      <a:endParaRPr lang="en-US" sz="1100" b="1" i="0" u="none" strike="noStrike" dirty="0">
+                      <a:endParaRPr lang="en-US" sz="1200" b="1" i="0" u="none" strike="noStrike" dirty="0">
                         <a:solidFill>
                           <a:srgbClr val="000000"/>
                         </a:solidFill>
-                        <a:latin typeface="Calibri"/>
+                        <a:latin typeface="Calibri" pitchFamily="34" charset="0"/>
                       </a:endParaRPr>
                     </a:p>
                   </a:txBody>
-                  <a:tcPr marL="0" marR="0" marT="0" marB="0" anchor="b">
+                  <a:tcPr marL="0" marR="0" marT="0" marB="0" anchor="ctr">
                     <a:solidFill>
                       <a:schemeClr val="accent2">
                         <a:lumMod val="40000"/>
@@ -11546,18 +11682,20 @@
                     <a:p>
                       <a:pPr algn="ctr" fontAlgn="b"/>
                       <a:r>
-                        <a:rPr lang="en-US" sz="1100" u="none" strike="noStrike" dirty="0"/>
+                        <a:rPr lang="en-US" sz="1200" u="none" strike="noStrike" dirty="0">
+                          <a:latin typeface="Calibri" pitchFamily="34" charset="0"/>
+                        </a:rPr>
                         <a:t>21.93%</a:t>
                       </a:r>
-                      <a:endParaRPr lang="en-US" sz="1100" b="1" i="0" u="none" strike="noStrike" dirty="0">
+                      <a:endParaRPr lang="en-US" sz="1200" b="1" i="0" u="none" strike="noStrike" dirty="0">
                         <a:solidFill>
                           <a:srgbClr val="000000"/>
                         </a:solidFill>
-                        <a:latin typeface="Calibri"/>
+                        <a:latin typeface="Calibri" pitchFamily="34" charset="0"/>
                       </a:endParaRPr>
                     </a:p>
                   </a:txBody>
-                  <a:tcPr marL="0" marR="0" marT="0" marB="0" anchor="b">
+                  <a:tcPr marL="0" marR="0" marT="0" marB="0" anchor="ctr">
                     <a:solidFill>
                       <a:schemeClr val="accent2">
                         <a:lumMod val="60000"/>
@@ -11575,23 +11713,33 @@
                     <a:p>
                       <a:pPr algn="ctr" fontAlgn="b"/>
                       <a:r>
-                        <a:rPr lang="en-US" sz="1200" u="none" strike="noStrike" dirty="0" err="1" smtClean="0"/>
+                        <a:rPr lang="en-US" sz="1200" u="none" strike="noStrike" dirty="0" err="1" smtClean="0">
+                          <a:latin typeface="Calibri" pitchFamily="34" charset="0"/>
+                        </a:rPr>
                         <a:t>Productividad</a:t>
                       </a:r>
-                      <a:endParaRPr lang="en-US" sz="1200" u="none" strike="noStrike" dirty="0" smtClean="0"/>
+                      <a:endParaRPr lang="en-US" sz="1200" u="none" strike="noStrike" dirty="0" smtClean="0">
+                        <a:latin typeface="Calibri" pitchFamily="34" charset="0"/>
+                      </a:endParaRPr>
                     </a:p>
                     <a:p>
                       <a:pPr algn="ctr" fontAlgn="b"/>
                       <a:r>
-                        <a:rPr lang="es-CO" sz="1200" u="none" strike="noStrike" dirty="0" smtClean="0"/>
+                        <a:rPr lang="es-CO" sz="1200" u="none" strike="noStrike" dirty="0" smtClean="0">
+                          <a:latin typeface="Calibri" pitchFamily="34" charset="0"/>
+                        </a:rPr>
                         <a:t>(</a:t>
                       </a:r>
                       <a:r>
-                        <a:rPr lang="es-CO" sz="1200" u="none" strike="noStrike" dirty="0" err="1" smtClean="0"/>
+                        <a:rPr lang="es-CO" sz="1200" u="none" strike="noStrike" dirty="0" err="1" smtClean="0">
+                          <a:latin typeface="Calibri" pitchFamily="34" charset="0"/>
+                        </a:rPr>
                         <a:t>loc</a:t>
                       </a:r>
                       <a:r>
-                        <a:rPr lang="es-CO" sz="1200" u="none" strike="noStrike" dirty="0" smtClean="0"/>
+                        <a:rPr lang="es-CO" sz="1200" u="none" strike="noStrike" dirty="0" smtClean="0">
+                          <a:latin typeface="Calibri" pitchFamily="34" charset="0"/>
+                        </a:rPr>
                         <a:t>/h)</a:t>
                       </a:r>
                       <a:endParaRPr lang="en-US" sz="1200" b="1" i="0" u="none" strike="noStrike" dirty="0">
@@ -11618,18 +11766,20 @@
                     <a:p>
                       <a:pPr algn="ctr" fontAlgn="b"/>
                       <a:r>
-                        <a:rPr lang="en-US" sz="1100" u="none" strike="noStrike" dirty="0"/>
-                        <a:t>               1.78 </a:t>
+                        <a:rPr lang="en-US" sz="1200" u="none" strike="noStrike" dirty="0" smtClean="0">
+                          <a:latin typeface="Calibri" pitchFamily="34" charset="0"/>
+                        </a:rPr>
+                        <a:t>1.78 </a:t>
                       </a:r>
-                      <a:endParaRPr lang="en-US" sz="1100" b="1" i="0" u="none" strike="noStrike" dirty="0">
+                      <a:endParaRPr lang="en-US" sz="1200" b="1" i="0" u="none" strike="noStrike" dirty="0">
                         <a:solidFill>
                           <a:srgbClr val="000000"/>
                         </a:solidFill>
-                        <a:latin typeface="Calibri"/>
+                        <a:latin typeface="Calibri" pitchFamily="34" charset="0"/>
                       </a:endParaRPr>
                     </a:p>
                   </a:txBody>
-                  <a:tcPr marL="0" marR="0" marT="0" marB="0" anchor="b">
+                  <a:tcPr marL="0" marR="0" marT="0" marB="0" anchor="ctr">
                     <a:solidFill>
                       <a:schemeClr val="accent2">
                         <a:lumMod val="20000"/>
@@ -11645,18 +11795,20 @@
                     <a:p>
                       <a:pPr algn="ctr" fontAlgn="b"/>
                       <a:r>
-                        <a:rPr lang="en-US" sz="1100" u="none" strike="noStrike" dirty="0"/>
-                        <a:t>               1.50 </a:t>
+                        <a:rPr lang="en-US" sz="1200" u="none" strike="noStrike" dirty="0" smtClean="0">
+                          <a:latin typeface="Calibri" pitchFamily="34" charset="0"/>
+                        </a:rPr>
+                        <a:t>1.50 </a:t>
                       </a:r>
-                      <a:endParaRPr lang="en-US" sz="1100" b="1" i="0" u="none" strike="noStrike" dirty="0">
+                      <a:endParaRPr lang="en-US" sz="1200" b="1" i="0" u="none" strike="noStrike" dirty="0">
                         <a:solidFill>
                           <a:srgbClr val="000000"/>
                         </a:solidFill>
-                        <a:latin typeface="Calibri"/>
+                        <a:latin typeface="Calibri" pitchFamily="34" charset="0"/>
                       </a:endParaRPr>
                     </a:p>
                   </a:txBody>
-                  <a:tcPr marL="0" marR="0" marT="0" marB="0" anchor="b">
+                  <a:tcPr marL="0" marR="0" marT="0" marB="0" anchor="ctr">
                     <a:solidFill>
                       <a:schemeClr val="accent2">
                         <a:lumMod val="20000"/>
@@ -11672,18 +11824,20 @@
                     <a:p>
                       <a:pPr algn="ctr" fontAlgn="b"/>
                       <a:r>
-                        <a:rPr lang="en-US" sz="1100" u="none" strike="noStrike" dirty="0"/>
-                        <a:t>               5.27 </a:t>
+                        <a:rPr lang="en-US" sz="1200" u="none" strike="noStrike" dirty="0" smtClean="0">
+                          <a:latin typeface="Calibri" pitchFamily="34" charset="0"/>
+                        </a:rPr>
+                        <a:t>5.27 </a:t>
                       </a:r>
-                      <a:endParaRPr lang="en-US" sz="1100" b="1" i="0" u="none" strike="noStrike" dirty="0">
+                      <a:endParaRPr lang="en-US" sz="1200" b="1" i="0" u="none" strike="noStrike" dirty="0">
                         <a:solidFill>
                           <a:srgbClr val="000000"/>
                         </a:solidFill>
-                        <a:latin typeface="Calibri"/>
+                        <a:latin typeface="Calibri" pitchFamily="34" charset="0"/>
                       </a:endParaRPr>
                     </a:p>
                   </a:txBody>
-                  <a:tcPr marL="0" marR="0" marT="0" marB="0" anchor="b">
+                  <a:tcPr marL="0" marR="0" marT="0" marB="0" anchor="ctr">
                     <a:solidFill>
                       <a:schemeClr val="accent2">
                         <a:lumMod val="20000"/>
@@ -11699,18 +11853,20 @@
                     <a:p>
                       <a:pPr algn="ctr" fontAlgn="b"/>
                       <a:r>
-                        <a:rPr lang="en-US" sz="1100" u="none" strike="noStrike" dirty="0"/>
-                        <a:t>               9.96 </a:t>
+                        <a:rPr lang="en-US" sz="1200" u="none" strike="noStrike" dirty="0" smtClean="0">
+                          <a:latin typeface="Calibri" pitchFamily="34" charset="0"/>
+                        </a:rPr>
+                        <a:t>9.96 </a:t>
                       </a:r>
-                      <a:endParaRPr lang="en-US" sz="1100" b="1" i="0" u="none" strike="noStrike" dirty="0">
+                      <a:endParaRPr lang="en-US" sz="1200" b="1" i="0" u="none" strike="noStrike" dirty="0">
                         <a:solidFill>
                           <a:srgbClr val="000000"/>
                         </a:solidFill>
-                        <a:latin typeface="Calibri"/>
+                        <a:latin typeface="Calibri" pitchFamily="34" charset="0"/>
                       </a:endParaRPr>
                     </a:p>
                   </a:txBody>
-                  <a:tcPr marL="0" marR="0" marT="0" marB="0" anchor="b">
+                  <a:tcPr marL="0" marR="0" marT="0" marB="0" anchor="ctr">
                     <a:solidFill>
                       <a:schemeClr val="accent2">
                         <a:lumMod val="20000"/>
@@ -11726,18 +11882,20 @@
                     <a:p>
                       <a:pPr algn="ctr" fontAlgn="b"/>
                       <a:r>
-                        <a:rPr lang="en-US" sz="1100" u="none" strike="noStrike" dirty="0"/>
-                        <a:t>               5.34 </a:t>
+                        <a:rPr lang="en-US" sz="1200" u="none" strike="noStrike" dirty="0" smtClean="0">
+                          <a:latin typeface="Calibri" pitchFamily="34" charset="0"/>
+                        </a:rPr>
+                        <a:t>5.34 </a:t>
                       </a:r>
-                      <a:endParaRPr lang="en-US" sz="1100" b="1" i="0" u="none" strike="noStrike" dirty="0">
+                      <a:endParaRPr lang="en-US" sz="1200" b="1" i="0" u="none" strike="noStrike" dirty="0">
                         <a:solidFill>
                           <a:srgbClr val="000000"/>
                         </a:solidFill>
-                        <a:latin typeface="Calibri"/>
+                        <a:latin typeface="Calibri" pitchFamily="34" charset="0"/>
                       </a:endParaRPr>
                     </a:p>
                   </a:txBody>
-                  <a:tcPr marL="0" marR="0" marT="0" marB="0" anchor="b">
+                  <a:tcPr marL="0" marR="0" marT="0" marB="0" anchor="ctr">
                     <a:solidFill>
                       <a:schemeClr val="accent2">
                         <a:lumMod val="20000"/>
@@ -11753,18 +11911,20 @@
                     <a:p>
                       <a:pPr algn="ctr" fontAlgn="b"/>
                       <a:r>
-                        <a:rPr lang="en-US" sz="1100" u="none" strike="noStrike" dirty="0"/>
-                        <a:t>             10.51 </a:t>
+                        <a:rPr lang="en-US" sz="1200" u="none" strike="noStrike" dirty="0" smtClean="0">
+                          <a:latin typeface="Calibri" pitchFamily="34" charset="0"/>
+                        </a:rPr>
+                        <a:t>10.51 </a:t>
                       </a:r>
-                      <a:endParaRPr lang="en-US" sz="1100" b="1" i="0" u="none" strike="noStrike" dirty="0">
+                      <a:endParaRPr lang="en-US" sz="1200" b="1" i="0" u="none" strike="noStrike" dirty="0">
                         <a:solidFill>
                           <a:srgbClr val="000000"/>
                         </a:solidFill>
-                        <a:latin typeface="Calibri"/>
+                        <a:latin typeface="Calibri" pitchFamily="34" charset="0"/>
                       </a:endParaRPr>
                     </a:p>
                   </a:txBody>
-                  <a:tcPr marL="0" marR="0" marT="0" marB="0" anchor="b">
+                  <a:tcPr marL="0" marR="0" marT="0" marB="0" anchor="ctr">
                     <a:solidFill>
                       <a:schemeClr val="accent2">
                         <a:lumMod val="20000"/>
@@ -11780,18 +11940,20 @@
                     <a:p>
                       <a:pPr algn="ctr" fontAlgn="b"/>
                       <a:r>
-                        <a:rPr lang="en-US" sz="1100" u="none" strike="noStrike" dirty="0"/>
-                        <a:t>               3.80 </a:t>
+                        <a:rPr lang="en-US" sz="1200" u="none" strike="noStrike" dirty="0" smtClean="0">
+                          <a:latin typeface="Calibri" pitchFamily="34" charset="0"/>
+                        </a:rPr>
+                        <a:t>3.80 </a:t>
                       </a:r>
-                      <a:endParaRPr lang="en-US" sz="1100" b="1" i="0" u="none" strike="noStrike" dirty="0">
+                      <a:endParaRPr lang="en-US" sz="1200" b="1" i="0" u="none" strike="noStrike" dirty="0">
                         <a:solidFill>
                           <a:srgbClr val="000000"/>
                         </a:solidFill>
-                        <a:latin typeface="Calibri"/>
+                        <a:latin typeface="Calibri" pitchFamily="34" charset="0"/>
                       </a:endParaRPr>
                     </a:p>
                   </a:txBody>
-                  <a:tcPr marL="0" marR="0" marT="0" marB="0" anchor="b">
+                  <a:tcPr marL="0" marR="0" marT="0" marB="0" anchor="ctr">
                     <a:solidFill>
                       <a:schemeClr val="accent2">
                         <a:lumMod val="20000"/>
@@ -11807,18 +11969,20 @@
                     <a:p>
                       <a:pPr algn="ctr" fontAlgn="b"/>
                       <a:r>
-                        <a:rPr lang="en-US" sz="1100" u="none" strike="noStrike" dirty="0"/>
-                        <a:t>               7.22 </a:t>
+                        <a:rPr lang="en-US" sz="1200" u="none" strike="noStrike" dirty="0" smtClean="0">
+                          <a:latin typeface="Calibri" pitchFamily="34" charset="0"/>
+                        </a:rPr>
+                        <a:t>7.22 </a:t>
                       </a:r>
-                      <a:endParaRPr lang="en-US" sz="1100" b="1" i="0" u="none" strike="noStrike" dirty="0">
+                      <a:endParaRPr lang="en-US" sz="1200" b="1" i="0" u="none" strike="noStrike" dirty="0">
                         <a:solidFill>
                           <a:srgbClr val="000000"/>
                         </a:solidFill>
-                        <a:latin typeface="Calibri"/>
+                        <a:latin typeface="Calibri" pitchFamily="34" charset="0"/>
                       </a:endParaRPr>
                     </a:p>
                   </a:txBody>
-                  <a:tcPr marL="0" marR="0" marT="0" marB="0" anchor="b">
+                  <a:tcPr marL="0" marR="0" marT="0" marB="0" anchor="ctr">
                     <a:solidFill>
                       <a:schemeClr val="accent2">
                         <a:lumMod val="20000"/>
@@ -11833,15 +11997,15 @@
                     <a:lstStyle/>
                     <a:p>
                       <a:pPr algn="ctr" fontAlgn="b"/>
-                      <a:endParaRPr lang="en-US" sz="1100" b="1" i="0" u="none" strike="noStrike" dirty="0">
+                      <a:endParaRPr lang="en-US" sz="1200" b="1" i="0" u="none" strike="noStrike" dirty="0">
                         <a:solidFill>
                           <a:srgbClr val="000000"/>
                         </a:solidFill>
-                        <a:latin typeface="Calibri"/>
+                        <a:latin typeface="Calibri" pitchFamily="34" charset="0"/>
                       </a:endParaRPr>
                     </a:p>
                   </a:txBody>
-                  <a:tcPr marL="0" marR="0" marT="0" marB="0" anchor="b"/>
+                  <a:tcPr marL="0" marR="0" marT="0" marB="0" anchor="ctr"/>
                 </a:tc>
               </a:tr>
             </a:tbl>

</xml_diff>